<commit_message>
Started with first steps
</commit_message>
<xml_diff>
--- a/Presentation/02 - First Steps.pptx
+++ b/Presentation/02 - First Steps.pptx
@@ -5,14 +5,19 @@
     <p:sldMasterId id="2147483660" r:id="rId1"/>
   </p:sldMasterIdLst>
   <p:notesMasterIdLst>
-    <p:notesMasterId r:id="rId7"/>
+    <p:notesMasterId r:id="rId12"/>
   </p:notesMasterIdLst>
   <p:sldIdLst>
     <p:sldId id="256" r:id="rId2"/>
     <p:sldId id="299" r:id="rId3"/>
-    <p:sldId id="258" r:id="rId4"/>
-    <p:sldId id="298" r:id="rId5"/>
-    <p:sldId id="300" r:id="rId6"/>
+    <p:sldId id="302" r:id="rId4"/>
+    <p:sldId id="303" r:id="rId5"/>
+    <p:sldId id="304" r:id="rId6"/>
+    <p:sldId id="305" r:id="rId7"/>
+    <p:sldId id="301" r:id="rId8"/>
+    <p:sldId id="258" r:id="rId9"/>
+    <p:sldId id="298" r:id="rId10"/>
+    <p:sldId id="300" r:id="rId11"/>
   </p:sldIdLst>
   <p:sldSz cx="12192000" cy="6858000"/>
   <p:notesSz cx="6858000" cy="9144000"/>
@@ -201,7 +206,7 @@
           <a:p>
             <a:fld id="{F85A15D0-0C7F-477F-8E21-433DC682CA0E}" type="datetimeFigureOut">
               <a:rPr lang="de-DE" smtClean="0"/>
-              <a:t>15.09.2021</a:t>
+              <a:t>13.10.2021</a:t>
             </a:fld>
             <a:endParaRPr lang="de-DE"/>
           </a:p>
@@ -617,7 +622,427 @@
           <a:p>
             <a:fld id="{6E18CE8E-CE8C-4ADF-A1D6-2FBF145918C0}" type="slidenum">
               <a:rPr lang="de-DE" smtClean="0"/>
+              <a:t>3</a:t>
+            </a:fld>
+            <a:endParaRPr lang="de-DE"/>
+          </a:p>
+        </p:txBody>
+      </p:sp>
+    </p:spTree>
+    <p:extLst>
+      <p:ext uri="{BB962C8B-B14F-4D97-AF65-F5344CB8AC3E}">
+        <p14:creationId xmlns:p14="http://schemas.microsoft.com/office/powerpoint/2010/main" val="3299531655"/>
+      </p:ext>
+    </p:extLst>
+  </p:cSld>
+  <p:clrMapOvr>
+    <a:masterClrMapping/>
+  </p:clrMapOvr>
+</p:notes>
+</file>
+
+<file path=ppt/notesSlides/notesSlide3.xml><?xml version="1.0" encoding="utf-8"?>
+<p:notes xmlns:a="http://schemas.openxmlformats.org/drawingml/2006/main" xmlns:r="http://schemas.openxmlformats.org/officeDocument/2006/relationships" xmlns:p="http://schemas.openxmlformats.org/presentationml/2006/main">
+  <p:cSld>
+    <p:spTree>
+      <p:nvGrpSpPr>
+        <p:cNvPr id="1" name=""/>
+        <p:cNvGrpSpPr/>
+        <p:nvPr/>
+      </p:nvGrpSpPr>
+      <p:grpSpPr>
+        <a:xfrm>
+          <a:off x="0" y="0"/>
+          <a:ext cx="0" cy="0"/>
+          <a:chOff x="0" y="0"/>
+          <a:chExt cx="0" cy="0"/>
+        </a:xfrm>
+      </p:grpSpPr>
+      <p:sp>
+        <p:nvSpPr>
+          <p:cNvPr id="2" name="Folienbildplatzhalter 1"/>
+          <p:cNvSpPr>
+            <a:spLocks noGrp="1" noRot="1" noChangeAspect="1"/>
+          </p:cNvSpPr>
+          <p:nvPr>
+            <p:ph type="sldImg"/>
+          </p:nvPr>
+        </p:nvSpPr>
+        <p:spPr/>
+      </p:sp>
+      <p:sp>
+        <p:nvSpPr>
+          <p:cNvPr id="3" name="Notizenplatzhalter 2"/>
+          <p:cNvSpPr>
+            <a:spLocks noGrp="1"/>
+          </p:cNvSpPr>
+          <p:nvPr>
+            <p:ph type="body" idx="1"/>
+          </p:nvPr>
+        </p:nvSpPr>
+        <p:spPr/>
+        <p:txBody>
+          <a:bodyPr/>
+          <a:lstStyle/>
+          <a:p>
+            <a:endParaRPr lang="de-DE" dirty="0"/>
+          </a:p>
+        </p:txBody>
+      </p:sp>
+      <p:sp>
+        <p:nvSpPr>
+          <p:cNvPr id="4" name="Foliennummernplatzhalter 3"/>
+          <p:cNvSpPr>
+            <a:spLocks noGrp="1"/>
+          </p:cNvSpPr>
+          <p:nvPr>
+            <p:ph type="sldNum" sz="quarter" idx="5"/>
+          </p:nvPr>
+        </p:nvSpPr>
+        <p:spPr/>
+        <p:txBody>
+          <a:bodyPr/>
+          <a:lstStyle/>
+          <a:p>
+            <a:fld id="{6E18CE8E-CE8C-4ADF-A1D6-2FBF145918C0}" type="slidenum">
+              <a:rPr lang="de-DE" smtClean="0"/>
               <a:t>4</a:t>
+            </a:fld>
+            <a:endParaRPr lang="de-DE"/>
+          </a:p>
+        </p:txBody>
+      </p:sp>
+    </p:spTree>
+    <p:extLst>
+      <p:ext uri="{BB962C8B-B14F-4D97-AF65-F5344CB8AC3E}">
+        <p14:creationId xmlns:p14="http://schemas.microsoft.com/office/powerpoint/2010/main" val="3762117378"/>
+      </p:ext>
+    </p:extLst>
+  </p:cSld>
+  <p:clrMapOvr>
+    <a:masterClrMapping/>
+  </p:clrMapOvr>
+</p:notes>
+</file>
+
+<file path=ppt/notesSlides/notesSlide4.xml><?xml version="1.0" encoding="utf-8"?>
+<p:notes xmlns:a="http://schemas.openxmlformats.org/drawingml/2006/main" xmlns:r="http://schemas.openxmlformats.org/officeDocument/2006/relationships" xmlns:p="http://schemas.openxmlformats.org/presentationml/2006/main">
+  <p:cSld>
+    <p:spTree>
+      <p:nvGrpSpPr>
+        <p:cNvPr id="1" name=""/>
+        <p:cNvGrpSpPr/>
+        <p:nvPr/>
+      </p:nvGrpSpPr>
+      <p:grpSpPr>
+        <a:xfrm>
+          <a:off x="0" y="0"/>
+          <a:ext cx="0" cy="0"/>
+          <a:chOff x="0" y="0"/>
+          <a:chExt cx="0" cy="0"/>
+        </a:xfrm>
+      </p:grpSpPr>
+      <p:sp>
+        <p:nvSpPr>
+          <p:cNvPr id="2" name="Folienbildplatzhalter 1"/>
+          <p:cNvSpPr>
+            <a:spLocks noGrp="1" noRot="1" noChangeAspect="1"/>
+          </p:cNvSpPr>
+          <p:nvPr>
+            <p:ph type="sldImg"/>
+          </p:nvPr>
+        </p:nvSpPr>
+        <p:spPr/>
+      </p:sp>
+      <p:sp>
+        <p:nvSpPr>
+          <p:cNvPr id="3" name="Notizenplatzhalter 2"/>
+          <p:cNvSpPr>
+            <a:spLocks noGrp="1"/>
+          </p:cNvSpPr>
+          <p:nvPr>
+            <p:ph type="body" idx="1"/>
+          </p:nvPr>
+        </p:nvSpPr>
+        <p:spPr/>
+        <p:txBody>
+          <a:bodyPr/>
+          <a:lstStyle/>
+          <a:p>
+            <a:endParaRPr lang="de-DE" dirty="0"/>
+          </a:p>
+        </p:txBody>
+      </p:sp>
+      <p:sp>
+        <p:nvSpPr>
+          <p:cNvPr id="4" name="Foliennummernplatzhalter 3"/>
+          <p:cNvSpPr>
+            <a:spLocks noGrp="1"/>
+          </p:cNvSpPr>
+          <p:nvPr>
+            <p:ph type="sldNum" sz="quarter" idx="5"/>
+          </p:nvPr>
+        </p:nvSpPr>
+        <p:spPr/>
+        <p:txBody>
+          <a:bodyPr/>
+          <a:lstStyle/>
+          <a:p>
+            <a:fld id="{6E18CE8E-CE8C-4ADF-A1D6-2FBF145918C0}" type="slidenum">
+              <a:rPr lang="de-DE" smtClean="0"/>
+              <a:t>5</a:t>
+            </a:fld>
+            <a:endParaRPr lang="de-DE"/>
+          </a:p>
+        </p:txBody>
+      </p:sp>
+    </p:spTree>
+    <p:extLst>
+      <p:ext uri="{BB962C8B-B14F-4D97-AF65-F5344CB8AC3E}">
+        <p14:creationId xmlns:p14="http://schemas.microsoft.com/office/powerpoint/2010/main" val="1886247785"/>
+      </p:ext>
+    </p:extLst>
+  </p:cSld>
+  <p:clrMapOvr>
+    <a:masterClrMapping/>
+  </p:clrMapOvr>
+</p:notes>
+</file>
+
+<file path=ppt/notesSlides/notesSlide5.xml><?xml version="1.0" encoding="utf-8"?>
+<p:notes xmlns:a="http://schemas.openxmlformats.org/drawingml/2006/main" xmlns:r="http://schemas.openxmlformats.org/officeDocument/2006/relationships" xmlns:p="http://schemas.openxmlformats.org/presentationml/2006/main">
+  <p:cSld>
+    <p:spTree>
+      <p:nvGrpSpPr>
+        <p:cNvPr id="1" name=""/>
+        <p:cNvGrpSpPr/>
+        <p:nvPr/>
+      </p:nvGrpSpPr>
+      <p:grpSpPr>
+        <a:xfrm>
+          <a:off x="0" y="0"/>
+          <a:ext cx="0" cy="0"/>
+          <a:chOff x="0" y="0"/>
+          <a:chExt cx="0" cy="0"/>
+        </a:xfrm>
+      </p:grpSpPr>
+      <p:sp>
+        <p:nvSpPr>
+          <p:cNvPr id="2" name="Folienbildplatzhalter 1"/>
+          <p:cNvSpPr>
+            <a:spLocks noGrp="1" noRot="1" noChangeAspect="1"/>
+          </p:cNvSpPr>
+          <p:nvPr>
+            <p:ph type="sldImg"/>
+          </p:nvPr>
+        </p:nvSpPr>
+        <p:spPr/>
+      </p:sp>
+      <p:sp>
+        <p:nvSpPr>
+          <p:cNvPr id="3" name="Notizenplatzhalter 2"/>
+          <p:cNvSpPr>
+            <a:spLocks noGrp="1"/>
+          </p:cNvSpPr>
+          <p:nvPr>
+            <p:ph type="body" idx="1"/>
+          </p:nvPr>
+        </p:nvSpPr>
+        <p:spPr/>
+        <p:txBody>
+          <a:bodyPr/>
+          <a:lstStyle/>
+          <a:p>
+            <a:endParaRPr lang="de-DE" dirty="0"/>
+          </a:p>
+        </p:txBody>
+      </p:sp>
+      <p:sp>
+        <p:nvSpPr>
+          <p:cNvPr id="4" name="Foliennummernplatzhalter 3"/>
+          <p:cNvSpPr>
+            <a:spLocks noGrp="1"/>
+          </p:cNvSpPr>
+          <p:nvPr>
+            <p:ph type="sldNum" sz="quarter" idx="5"/>
+          </p:nvPr>
+        </p:nvSpPr>
+        <p:spPr/>
+        <p:txBody>
+          <a:bodyPr/>
+          <a:lstStyle/>
+          <a:p>
+            <a:fld id="{6E18CE8E-CE8C-4ADF-A1D6-2FBF145918C0}" type="slidenum">
+              <a:rPr lang="de-DE" smtClean="0"/>
+              <a:t>6</a:t>
+            </a:fld>
+            <a:endParaRPr lang="de-DE"/>
+          </a:p>
+        </p:txBody>
+      </p:sp>
+    </p:spTree>
+    <p:extLst>
+      <p:ext uri="{BB962C8B-B14F-4D97-AF65-F5344CB8AC3E}">
+        <p14:creationId xmlns:p14="http://schemas.microsoft.com/office/powerpoint/2010/main" val="2379853193"/>
+      </p:ext>
+    </p:extLst>
+  </p:cSld>
+  <p:clrMapOvr>
+    <a:masterClrMapping/>
+  </p:clrMapOvr>
+</p:notes>
+</file>
+
+<file path=ppt/notesSlides/notesSlide6.xml><?xml version="1.0" encoding="utf-8"?>
+<p:notes xmlns:a="http://schemas.openxmlformats.org/drawingml/2006/main" xmlns:r="http://schemas.openxmlformats.org/officeDocument/2006/relationships" xmlns:p="http://schemas.openxmlformats.org/presentationml/2006/main">
+  <p:cSld>
+    <p:spTree>
+      <p:nvGrpSpPr>
+        <p:cNvPr id="1" name=""/>
+        <p:cNvGrpSpPr/>
+        <p:nvPr/>
+      </p:nvGrpSpPr>
+      <p:grpSpPr>
+        <a:xfrm>
+          <a:off x="0" y="0"/>
+          <a:ext cx="0" cy="0"/>
+          <a:chOff x="0" y="0"/>
+          <a:chExt cx="0" cy="0"/>
+        </a:xfrm>
+      </p:grpSpPr>
+      <p:sp>
+        <p:nvSpPr>
+          <p:cNvPr id="2" name="Folienbildplatzhalter 1"/>
+          <p:cNvSpPr>
+            <a:spLocks noGrp="1" noRot="1" noChangeAspect="1"/>
+          </p:cNvSpPr>
+          <p:nvPr>
+            <p:ph type="sldImg"/>
+          </p:nvPr>
+        </p:nvSpPr>
+        <p:spPr/>
+      </p:sp>
+      <p:sp>
+        <p:nvSpPr>
+          <p:cNvPr id="3" name="Notizenplatzhalter 2"/>
+          <p:cNvSpPr>
+            <a:spLocks noGrp="1"/>
+          </p:cNvSpPr>
+          <p:nvPr>
+            <p:ph type="body" idx="1"/>
+          </p:nvPr>
+        </p:nvSpPr>
+        <p:spPr/>
+        <p:txBody>
+          <a:bodyPr/>
+          <a:lstStyle/>
+          <a:p>
+            <a:endParaRPr lang="de-DE" dirty="0"/>
+          </a:p>
+        </p:txBody>
+      </p:sp>
+      <p:sp>
+        <p:nvSpPr>
+          <p:cNvPr id="4" name="Foliennummernplatzhalter 3"/>
+          <p:cNvSpPr>
+            <a:spLocks noGrp="1"/>
+          </p:cNvSpPr>
+          <p:nvPr>
+            <p:ph type="sldNum" sz="quarter" idx="5"/>
+          </p:nvPr>
+        </p:nvSpPr>
+        <p:spPr/>
+        <p:txBody>
+          <a:bodyPr/>
+          <a:lstStyle/>
+          <a:p>
+            <a:fld id="{6E18CE8E-CE8C-4ADF-A1D6-2FBF145918C0}" type="slidenum">
+              <a:rPr lang="de-DE" smtClean="0"/>
+              <a:t>7</a:t>
+            </a:fld>
+            <a:endParaRPr lang="de-DE"/>
+          </a:p>
+        </p:txBody>
+      </p:sp>
+    </p:spTree>
+    <p:extLst>
+      <p:ext uri="{BB962C8B-B14F-4D97-AF65-F5344CB8AC3E}">
+        <p14:creationId xmlns:p14="http://schemas.microsoft.com/office/powerpoint/2010/main" val="3977780074"/>
+      </p:ext>
+    </p:extLst>
+  </p:cSld>
+  <p:clrMapOvr>
+    <a:masterClrMapping/>
+  </p:clrMapOvr>
+</p:notes>
+</file>
+
+<file path=ppt/notesSlides/notesSlide7.xml><?xml version="1.0" encoding="utf-8"?>
+<p:notes xmlns:a="http://schemas.openxmlformats.org/drawingml/2006/main" xmlns:r="http://schemas.openxmlformats.org/officeDocument/2006/relationships" xmlns:p="http://schemas.openxmlformats.org/presentationml/2006/main">
+  <p:cSld>
+    <p:spTree>
+      <p:nvGrpSpPr>
+        <p:cNvPr id="1" name=""/>
+        <p:cNvGrpSpPr/>
+        <p:nvPr/>
+      </p:nvGrpSpPr>
+      <p:grpSpPr>
+        <a:xfrm>
+          <a:off x="0" y="0"/>
+          <a:ext cx="0" cy="0"/>
+          <a:chOff x="0" y="0"/>
+          <a:chExt cx="0" cy="0"/>
+        </a:xfrm>
+      </p:grpSpPr>
+      <p:sp>
+        <p:nvSpPr>
+          <p:cNvPr id="2" name="Folienbildplatzhalter 1"/>
+          <p:cNvSpPr>
+            <a:spLocks noGrp="1" noRot="1" noChangeAspect="1"/>
+          </p:cNvSpPr>
+          <p:nvPr>
+            <p:ph type="sldImg"/>
+          </p:nvPr>
+        </p:nvSpPr>
+        <p:spPr/>
+      </p:sp>
+      <p:sp>
+        <p:nvSpPr>
+          <p:cNvPr id="3" name="Notizenplatzhalter 2"/>
+          <p:cNvSpPr>
+            <a:spLocks noGrp="1"/>
+          </p:cNvSpPr>
+          <p:nvPr>
+            <p:ph type="body" idx="1"/>
+          </p:nvPr>
+        </p:nvSpPr>
+        <p:spPr/>
+        <p:txBody>
+          <a:bodyPr/>
+          <a:lstStyle/>
+          <a:p>
+            <a:endParaRPr lang="de-DE" dirty="0"/>
+          </a:p>
+        </p:txBody>
+      </p:sp>
+      <p:sp>
+        <p:nvSpPr>
+          <p:cNvPr id="4" name="Foliennummernplatzhalter 3"/>
+          <p:cNvSpPr>
+            <a:spLocks noGrp="1"/>
+          </p:cNvSpPr>
+          <p:nvPr>
+            <p:ph type="sldNum" sz="quarter" idx="5"/>
+          </p:nvPr>
+        </p:nvSpPr>
+        <p:spPr/>
+        <p:txBody>
+          <a:bodyPr/>
+          <a:lstStyle/>
+          <a:p>
+            <a:fld id="{6E18CE8E-CE8C-4ADF-A1D6-2FBF145918C0}" type="slidenum">
+              <a:rPr lang="de-DE" smtClean="0"/>
+              <a:t>9</a:t>
             </a:fld>
             <a:endParaRPr lang="de-DE"/>
           </a:p>
@@ -874,7 +1299,7 @@
           <a:p>
             <a:fld id="{D252E8F7-771C-44A4-BEBF-CC2E3470BEE3}" type="datetime1">
               <a:rPr lang="de-DE" smtClean="0"/>
-              <a:t>15.09.2021</a:t>
+              <a:t>13.10.2021</a:t>
             </a:fld>
             <a:endParaRPr lang="de-DE" dirty="0"/>
           </a:p>
@@ -1102,7 +1527,7 @@
           <a:p>
             <a:fld id="{0E29679B-A22C-460F-97FA-D29310F4F9CA}" type="datetime1">
               <a:rPr lang="de-DE" smtClean="0"/>
-              <a:t>15.09.2021</a:t>
+              <a:t>13.10.2021</a:t>
             </a:fld>
             <a:endParaRPr lang="de-DE"/>
           </a:p>
@@ -1377,7 +1802,7 @@
           <a:p>
             <a:fld id="{BA071D2A-9FD6-4E1A-974F-D1F0E036738A}" type="datetime1">
               <a:rPr lang="de-DE" smtClean="0"/>
-              <a:t>15.09.2021</a:t>
+              <a:t>13.10.2021</a:t>
             </a:fld>
             <a:endParaRPr lang="de-DE"/>
           </a:p>
@@ -1574,7 +1999,7 @@
           <a:p>
             <a:fld id="{7778186D-7CAD-425C-A5EB-B223AE6329F4}" type="datetime1">
               <a:rPr lang="de-DE" smtClean="0"/>
-              <a:t>15.09.2021</a:t>
+              <a:t>13.10.2021</a:t>
             </a:fld>
             <a:endParaRPr lang="de-DE" dirty="0"/>
           </a:p>
@@ -2011,7 +2436,7 @@
           <a:p>
             <a:fld id="{431330C1-C74B-49E7-BFEE-CFFFDCD11AC1}" type="datetime1">
               <a:rPr lang="de-DE" smtClean="0"/>
-              <a:t>15.09.2021</a:t>
+              <a:t>13.10.2021</a:t>
             </a:fld>
             <a:endParaRPr lang="de-DE" dirty="0"/>
           </a:p>
@@ -2646,7 +3071,7 @@
           <a:p>
             <a:fld id="{B5379164-64D3-4DBF-A35A-0193A17390D6}" type="datetime1">
               <a:rPr lang="de-DE" smtClean="0"/>
-              <a:t>15.09.2021</a:t>
+              <a:t>13.10.2021</a:t>
             </a:fld>
             <a:endParaRPr lang="de-DE"/>
           </a:p>
@@ -2836,7 +3261,7 @@
           <a:p>
             <a:fld id="{CE1B32AF-E997-41D3-9EB7-CBF2DBF5A72B}" type="datetime1">
               <a:rPr lang="de-DE" smtClean="0"/>
-              <a:t>15.09.2021</a:t>
+              <a:t>13.10.2021</a:t>
             </a:fld>
             <a:endParaRPr lang="de-DE"/>
           </a:p>
@@ -3204,7 +3629,7 @@
           <a:p>
             <a:fld id="{F3EF3E2E-44DA-428A-849A-0C00F4B856E5}" type="datetime1">
               <a:rPr lang="de-DE" smtClean="0"/>
-              <a:t>15.09.2021</a:t>
+              <a:t>13.10.2021</a:t>
             </a:fld>
             <a:endParaRPr lang="de-DE"/>
           </a:p>
@@ -3600,7 +4025,7 @@
           <a:p>
             <a:fld id="{A8F5AFF9-D60D-4BF2-893C-19D3B6C1F40C}" type="datetime1">
               <a:rPr lang="de-DE" smtClean="0"/>
-              <a:t>15.09.2021</a:t>
+              <a:t>13.10.2021</a:t>
             </a:fld>
             <a:endParaRPr lang="de-DE"/>
           </a:p>
@@ -3935,7 +4360,7 @@
           <a:p>
             <a:fld id="{3662B911-C7FF-498F-8649-7D98DE155FD2}" type="datetime1">
               <a:rPr lang="de-DE" smtClean="0"/>
-              <a:t>15.09.2021</a:t>
+              <a:t>13.10.2021</a:t>
             </a:fld>
             <a:endParaRPr lang="de-DE" dirty="0"/>
           </a:p>
@@ -4413,9 +4838,18 @@
           <a:lstStyle/>
           <a:p>
             <a:r>
+              <a:rPr lang="de-DE" sz="4800" dirty="0" err="1"/>
+              <a:t>Git</a:t>
+            </a:r>
+            <a:r>
               <a:rPr lang="de-DE" sz="4800" dirty="0"/>
-              <a:t>Template</a:t>
-            </a:r>
+              <a:t> – First </a:t>
+            </a:r>
+            <a:r>
+              <a:rPr lang="de-DE" sz="4800" dirty="0" err="1"/>
+              <a:t>Steps</a:t>
+            </a:r>
+            <a:endParaRPr lang="de-DE" sz="4800" dirty="0"/>
           </a:p>
         </p:txBody>
       </p:sp>
@@ -4460,1337 +4894,7 @@
 </p:sld>
 </file>
 
-<file path=ppt/slides/slide2.xml><?xml version="1.0" encoding="utf-8"?>
-<p:sld xmlns:a="http://schemas.openxmlformats.org/drawingml/2006/main" xmlns:r="http://schemas.openxmlformats.org/officeDocument/2006/relationships" xmlns:p="http://schemas.openxmlformats.org/presentationml/2006/main">
-  <p:cSld>
-    <p:spTree>
-      <p:nvGrpSpPr>
-        <p:cNvPr id="1" name=""/>
-        <p:cNvGrpSpPr/>
-        <p:nvPr/>
-      </p:nvGrpSpPr>
-      <p:grpSpPr>
-        <a:xfrm>
-          <a:off x="0" y="0"/>
-          <a:ext cx="0" cy="0"/>
-          <a:chOff x="0" y="0"/>
-          <a:chExt cx="0" cy="0"/>
-        </a:xfrm>
-      </p:grpSpPr>
-      <p:sp>
-        <p:nvSpPr>
-          <p:cNvPr id="2" name="Titel 1">
-            <a:extLst>
-              <a:ext uri="{FF2B5EF4-FFF2-40B4-BE49-F238E27FC236}">
-                <a16:creationId xmlns:a16="http://schemas.microsoft.com/office/drawing/2014/main" id="{F6E41F0A-2E2D-4FC5-9F43-4600FAEFA395}"/>
-              </a:ext>
-            </a:extLst>
-          </p:cNvPr>
-          <p:cNvSpPr>
-            <a:spLocks noGrp="1"/>
-          </p:cNvSpPr>
-          <p:nvPr>
-            <p:ph type="title"/>
-          </p:nvPr>
-        </p:nvSpPr>
-        <p:spPr/>
-        <p:txBody>
-          <a:bodyPr/>
-          <a:lstStyle/>
-          <a:p>
-            <a:r>
-              <a:rPr lang="de-DE" dirty="0"/>
-              <a:t>TEXT ONLY</a:t>
-            </a:r>
-          </a:p>
-        </p:txBody>
-      </p:sp>
-      <p:sp>
-        <p:nvSpPr>
-          <p:cNvPr id="3" name="Inhaltsplatzhalter 2">
-            <a:extLst>
-              <a:ext uri="{FF2B5EF4-FFF2-40B4-BE49-F238E27FC236}">
-                <a16:creationId xmlns:a16="http://schemas.microsoft.com/office/drawing/2014/main" id="{EAC75DC9-155E-4132-B159-673C386F5A43}"/>
-              </a:ext>
-            </a:extLst>
-          </p:cNvPr>
-          <p:cNvSpPr>
-            <a:spLocks noGrp="1"/>
-          </p:cNvSpPr>
-          <p:nvPr>
-            <p:ph idx="1"/>
-          </p:nvPr>
-        </p:nvSpPr>
-        <p:spPr>
-          <a:xfrm>
-            <a:off x="1097279" y="1845734"/>
-            <a:ext cx="9966959" cy="4023360"/>
-          </a:xfrm>
-        </p:spPr>
-        <p:txBody>
-          <a:bodyPr/>
-          <a:lstStyle/>
-          <a:p>
-            <a:pPr>
-              <a:buFont typeface="Arial" panose="020B0604020202020204" pitchFamily="34" charset="0"/>
-              <a:buChar char="•"/>
-            </a:pPr>
-            <a:r>
-              <a:rPr lang="de-DE" dirty="0"/>
-              <a:t>TEXT</a:t>
-            </a:r>
-          </a:p>
-        </p:txBody>
-      </p:sp>
-      <p:sp>
-        <p:nvSpPr>
-          <p:cNvPr id="4" name="Datumsplatzhalter 3">
-            <a:extLst>
-              <a:ext uri="{FF2B5EF4-FFF2-40B4-BE49-F238E27FC236}">
-                <a16:creationId xmlns:a16="http://schemas.microsoft.com/office/drawing/2014/main" id="{C463F406-173E-488D-A788-00333B5AE97E}"/>
-              </a:ext>
-            </a:extLst>
-          </p:cNvPr>
-          <p:cNvSpPr>
-            <a:spLocks noGrp="1"/>
-          </p:cNvSpPr>
-          <p:nvPr>
-            <p:ph type="dt" sz="half" idx="10"/>
-          </p:nvPr>
-        </p:nvSpPr>
-        <p:spPr/>
-        <p:txBody>
-          <a:bodyPr/>
-          <a:lstStyle/>
-          <a:p>
-            <a:fld id="{7778186D-7CAD-425C-A5EB-B223AE6329F4}" type="datetime1">
-              <a:rPr lang="de-DE" smtClean="0"/>
-              <a:t>15.09.2021</a:t>
-            </a:fld>
-            <a:endParaRPr lang="de-DE" dirty="0"/>
-          </a:p>
-        </p:txBody>
-      </p:sp>
-      <p:sp>
-        <p:nvSpPr>
-          <p:cNvPr id="5" name="Fußzeilenplatzhalter 4">
-            <a:extLst>
-              <a:ext uri="{FF2B5EF4-FFF2-40B4-BE49-F238E27FC236}">
-                <a16:creationId xmlns:a16="http://schemas.microsoft.com/office/drawing/2014/main" id="{F6590142-F7C8-4816-BA0F-F63B394887CE}"/>
-              </a:ext>
-            </a:extLst>
-          </p:cNvPr>
-          <p:cNvSpPr>
-            <a:spLocks noGrp="1"/>
-          </p:cNvSpPr>
-          <p:nvPr>
-            <p:ph type="ftr" sz="quarter" idx="11"/>
-          </p:nvPr>
-        </p:nvSpPr>
-        <p:spPr/>
-        <p:txBody>
-          <a:bodyPr/>
-          <a:lstStyle/>
-          <a:p>
-            <a:r>
-              <a:rPr lang="de-DE" dirty="0"/>
-              <a:t>Moritz Flüchter: TSN Inter-Domain Communication</a:t>
-            </a:r>
-          </a:p>
-        </p:txBody>
-      </p:sp>
-      <p:sp>
-        <p:nvSpPr>
-          <p:cNvPr id="6" name="Foliennummernplatzhalter 5">
-            <a:extLst>
-              <a:ext uri="{FF2B5EF4-FFF2-40B4-BE49-F238E27FC236}">
-                <a16:creationId xmlns:a16="http://schemas.microsoft.com/office/drawing/2014/main" id="{7E703547-174F-44ED-AE14-A037549BC75F}"/>
-              </a:ext>
-            </a:extLst>
-          </p:cNvPr>
-          <p:cNvSpPr>
-            <a:spLocks noGrp="1"/>
-          </p:cNvSpPr>
-          <p:nvPr>
-            <p:ph type="sldNum" sz="quarter" idx="12"/>
-          </p:nvPr>
-        </p:nvSpPr>
-        <p:spPr/>
-        <p:txBody>
-          <a:bodyPr/>
-          <a:lstStyle/>
-          <a:p>
-            <a:fld id="{489ECDB1-2E24-4918-B7B1-E72EEFEDE6FE}" type="slidenum">
-              <a:rPr lang="de-DE" smtClean="0"/>
-              <a:t>2</a:t>
-            </a:fld>
-            <a:endParaRPr lang="de-DE" dirty="0"/>
-          </a:p>
-        </p:txBody>
-      </p:sp>
-      <p:sp>
-        <p:nvSpPr>
-          <p:cNvPr id="9" name="Textplatzhalter 2">
-            <a:extLst>
-              <a:ext uri="{FF2B5EF4-FFF2-40B4-BE49-F238E27FC236}">
-                <a16:creationId xmlns:a16="http://schemas.microsoft.com/office/drawing/2014/main" id="{2BBB3040-5284-4B4F-A563-7C876497D4D0}"/>
-              </a:ext>
-            </a:extLst>
-          </p:cNvPr>
-          <p:cNvSpPr txBox="1">
-            <a:spLocks/>
-          </p:cNvSpPr>
-          <p:nvPr/>
-        </p:nvSpPr>
-        <p:spPr>
-          <a:xfrm>
-            <a:off x="1008638" y="1293840"/>
-            <a:ext cx="9847621" cy="736282"/>
-          </a:xfrm>
-          <a:prstGeom prst="rect">
-            <a:avLst/>
-          </a:prstGeom>
-        </p:spPr>
-        <p:txBody>
-          <a:bodyPr vert="horz" lIns="91440" tIns="45720" rIns="91440" bIns="45720" rtlCol="0" anchor="ctr">
-            <a:normAutofit/>
-          </a:bodyPr>
-          <a:lstStyle>
-            <a:lvl1pPr marL="0" indent="0" algn="l" defTabSz="914400" rtl="0" eaLnBrk="1" latinLnBrk="0" hangingPunct="1">
-              <a:lnSpc>
-                <a:spcPct val="90000"/>
-              </a:lnSpc>
-              <a:spcBef>
-                <a:spcPts val="1200"/>
-              </a:spcBef>
-              <a:spcAft>
-                <a:spcPts val="200"/>
-              </a:spcAft>
-              <a:buClr>
-                <a:schemeClr val="accent1"/>
-              </a:buClr>
-              <a:buSzPct val="100000"/>
-              <a:buFont typeface="Calibri" panose="020F0502020204030204" pitchFamily="34" charset="0"/>
-              <a:buNone/>
-              <a:defRPr sz="2000" b="0" kern="1200" cap="all" baseline="0">
-                <a:solidFill>
-                  <a:schemeClr val="tx2"/>
-                </a:solidFill>
-                <a:latin typeface="Arial" panose="020B0604020202020204" pitchFamily="34" charset="0"/>
-                <a:ea typeface="+mn-ea"/>
-                <a:cs typeface="Arial" panose="020B0604020202020204" pitchFamily="34" charset="0"/>
-              </a:defRPr>
-            </a:lvl1pPr>
-            <a:lvl2pPr marL="457200" indent="0" algn="l" defTabSz="914400" rtl="0" eaLnBrk="1" latinLnBrk="0" hangingPunct="1">
-              <a:lnSpc>
-                <a:spcPct val="90000"/>
-              </a:lnSpc>
-              <a:spcBef>
-                <a:spcPts val="200"/>
-              </a:spcBef>
-              <a:spcAft>
-                <a:spcPts val="400"/>
-              </a:spcAft>
-              <a:buClr>
-                <a:schemeClr val="accent1"/>
-              </a:buClr>
-              <a:buFont typeface="Calibri" pitchFamily="34" charset="0"/>
-              <a:buNone/>
-              <a:defRPr sz="2000" b="1" kern="1200">
-                <a:solidFill>
-                  <a:schemeClr val="tx1">
-                    <a:lumMod val="75000"/>
-                    <a:lumOff val="25000"/>
-                  </a:schemeClr>
-                </a:solidFill>
-                <a:latin typeface="Arial" panose="020B0604020202020204" pitchFamily="34" charset="0"/>
-                <a:ea typeface="+mn-ea"/>
-                <a:cs typeface="Arial" panose="020B0604020202020204" pitchFamily="34" charset="0"/>
-              </a:defRPr>
-            </a:lvl2pPr>
-            <a:lvl3pPr marL="914400" indent="0" algn="l" defTabSz="914400" rtl="0" eaLnBrk="1" latinLnBrk="0" hangingPunct="1">
-              <a:lnSpc>
-                <a:spcPct val="90000"/>
-              </a:lnSpc>
-              <a:spcBef>
-                <a:spcPts val="200"/>
-              </a:spcBef>
-              <a:spcAft>
-                <a:spcPts val="400"/>
-              </a:spcAft>
-              <a:buClr>
-                <a:schemeClr val="accent1"/>
-              </a:buClr>
-              <a:buFont typeface="Calibri" pitchFamily="34" charset="0"/>
-              <a:buNone/>
-              <a:defRPr sz="1800" b="1" kern="1200">
-                <a:solidFill>
-                  <a:schemeClr val="tx1">
-                    <a:lumMod val="75000"/>
-                    <a:lumOff val="25000"/>
-                  </a:schemeClr>
-                </a:solidFill>
-                <a:latin typeface="Arial" panose="020B0604020202020204" pitchFamily="34" charset="0"/>
-                <a:ea typeface="+mn-ea"/>
-                <a:cs typeface="Arial" panose="020B0604020202020204" pitchFamily="34" charset="0"/>
-              </a:defRPr>
-            </a:lvl3pPr>
-            <a:lvl4pPr marL="1371600" indent="0" algn="l" defTabSz="914400" rtl="0" eaLnBrk="1" latinLnBrk="0" hangingPunct="1">
-              <a:lnSpc>
-                <a:spcPct val="90000"/>
-              </a:lnSpc>
-              <a:spcBef>
-                <a:spcPts val="200"/>
-              </a:spcBef>
-              <a:spcAft>
-                <a:spcPts val="400"/>
-              </a:spcAft>
-              <a:buClr>
-                <a:schemeClr val="accent1"/>
-              </a:buClr>
-              <a:buFont typeface="Calibri" pitchFamily="34" charset="0"/>
-              <a:buNone/>
-              <a:defRPr sz="1600" b="1" kern="1200">
-                <a:solidFill>
-                  <a:schemeClr val="tx1">
-                    <a:lumMod val="75000"/>
-                    <a:lumOff val="25000"/>
-                  </a:schemeClr>
-                </a:solidFill>
-                <a:latin typeface="Arial" panose="020B0604020202020204" pitchFamily="34" charset="0"/>
-                <a:ea typeface="+mn-ea"/>
-                <a:cs typeface="Arial" panose="020B0604020202020204" pitchFamily="34" charset="0"/>
-              </a:defRPr>
-            </a:lvl4pPr>
-            <a:lvl5pPr marL="1828800" indent="0" algn="l" defTabSz="914400" rtl="0" eaLnBrk="1" latinLnBrk="0" hangingPunct="1">
-              <a:lnSpc>
-                <a:spcPct val="90000"/>
-              </a:lnSpc>
-              <a:spcBef>
-                <a:spcPts val="200"/>
-              </a:spcBef>
-              <a:spcAft>
-                <a:spcPts val="400"/>
-              </a:spcAft>
-              <a:buClr>
-                <a:schemeClr val="accent1"/>
-              </a:buClr>
-              <a:buFont typeface="Calibri" pitchFamily="34" charset="0"/>
-              <a:buNone/>
-              <a:defRPr sz="1600" b="1" kern="1200">
-                <a:solidFill>
-                  <a:schemeClr val="tx1">
-                    <a:lumMod val="75000"/>
-                    <a:lumOff val="25000"/>
-                  </a:schemeClr>
-                </a:solidFill>
-                <a:latin typeface="Arial" panose="020B0604020202020204" pitchFamily="34" charset="0"/>
-                <a:ea typeface="+mn-ea"/>
-                <a:cs typeface="Arial" panose="020B0604020202020204" pitchFamily="34" charset="0"/>
-              </a:defRPr>
-            </a:lvl5pPr>
-            <a:lvl6pPr marL="2286000" indent="0" algn="l" defTabSz="914400" rtl="0" eaLnBrk="1" latinLnBrk="0" hangingPunct="1">
-              <a:lnSpc>
-                <a:spcPct val="90000"/>
-              </a:lnSpc>
-              <a:spcBef>
-                <a:spcPts val="200"/>
-              </a:spcBef>
-              <a:spcAft>
-                <a:spcPts val="400"/>
-              </a:spcAft>
-              <a:buClr>
-                <a:schemeClr val="accent1"/>
-              </a:buClr>
-              <a:buFont typeface="Calibri" pitchFamily="34" charset="0"/>
-              <a:buNone/>
-              <a:defRPr sz="1600" b="1" kern="1200">
-                <a:solidFill>
-                  <a:schemeClr val="tx1">
-                    <a:lumMod val="75000"/>
-                    <a:lumOff val="25000"/>
-                  </a:schemeClr>
-                </a:solidFill>
-                <a:latin typeface="+mn-lt"/>
-                <a:ea typeface="+mn-ea"/>
-                <a:cs typeface="+mn-cs"/>
-              </a:defRPr>
-            </a:lvl6pPr>
-            <a:lvl7pPr marL="2743200" indent="0" algn="l" defTabSz="914400" rtl="0" eaLnBrk="1" latinLnBrk="0" hangingPunct="1">
-              <a:lnSpc>
-                <a:spcPct val="90000"/>
-              </a:lnSpc>
-              <a:spcBef>
-                <a:spcPts val="200"/>
-              </a:spcBef>
-              <a:spcAft>
-                <a:spcPts val="400"/>
-              </a:spcAft>
-              <a:buClr>
-                <a:schemeClr val="accent1"/>
-              </a:buClr>
-              <a:buFont typeface="Calibri" pitchFamily="34" charset="0"/>
-              <a:buNone/>
-              <a:defRPr sz="1600" b="1" kern="1200">
-                <a:solidFill>
-                  <a:schemeClr val="tx1">
-                    <a:lumMod val="75000"/>
-                    <a:lumOff val="25000"/>
-                  </a:schemeClr>
-                </a:solidFill>
-                <a:latin typeface="+mn-lt"/>
-                <a:ea typeface="+mn-ea"/>
-                <a:cs typeface="+mn-cs"/>
-              </a:defRPr>
-            </a:lvl7pPr>
-            <a:lvl8pPr marL="3200400" indent="0" algn="l" defTabSz="914400" rtl="0" eaLnBrk="1" latinLnBrk="0" hangingPunct="1">
-              <a:lnSpc>
-                <a:spcPct val="90000"/>
-              </a:lnSpc>
-              <a:spcBef>
-                <a:spcPts val="200"/>
-              </a:spcBef>
-              <a:spcAft>
-                <a:spcPts val="400"/>
-              </a:spcAft>
-              <a:buClr>
-                <a:schemeClr val="accent1"/>
-              </a:buClr>
-              <a:buFont typeface="Calibri" pitchFamily="34" charset="0"/>
-              <a:buNone/>
-              <a:defRPr sz="1600" b="1" kern="1200">
-                <a:solidFill>
-                  <a:schemeClr val="tx1">
-                    <a:lumMod val="75000"/>
-                    <a:lumOff val="25000"/>
-                  </a:schemeClr>
-                </a:solidFill>
-                <a:latin typeface="+mn-lt"/>
-                <a:ea typeface="+mn-ea"/>
-                <a:cs typeface="+mn-cs"/>
-              </a:defRPr>
-            </a:lvl8pPr>
-            <a:lvl9pPr marL="3657600" indent="0" algn="l" defTabSz="914400" rtl="0" eaLnBrk="1" latinLnBrk="0" hangingPunct="1">
-              <a:lnSpc>
-                <a:spcPct val="90000"/>
-              </a:lnSpc>
-              <a:spcBef>
-                <a:spcPts val="200"/>
-              </a:spcBef>
-              <a:spcAft>
-                <a:spcPts val="400"/>
-              </a:spcAft>
-              <a:buClr>
-                <a:schemeClr val="accent1"/>
-              </a:buClr>
-              <a:buFont typeface="Calibri" pitchFamily="34" charset="0"/>
-              <a:buNone/>
-              <a:defRPr sz="1600" b="1" kern="1200">
-                <a:solidFill>
-                  <a:schemeClr val="tx1">
-                    <a:lumMod val="75000"/>
-                    <a:lumOff val="25000"/>
-                  </a:schemeClr>
-                </a:solidFill>
-                <a:latin typeface="+mn-lt"/>
-                <a:ea typeface="+mn-ea"/>
-                <a:cs typeface="+mn-cs"/>
-              </a:defRPr>
-            </a:lvl9pPr>
-          </a:lstStyle>
-          <a:p>
-            <a:r>
-              <a:rPr lang="de-DE" sz="1900" dirty="0"/>
-              <a:t>HEADING</a:t>
-            </a:r>
-          </a:p>
-        </p:txBody>
-      </p:sp>
-    </p:spTree>
-    <p:extLst>
-      <p:ext uri="{BB962C8B-B14F-4D97-AF65-F5344CB8AC3E}">
-        <p14:creationId xmlns:p14="http://schemas.microsoft.com/office/powerpoint/2010/main" val="1483543906"/>
-      </p:ext>
-    </p:extLst>
-  </p:cSld>
-  <p:clrMapOvr>
-    <a:masterClrMapping/>
-  </p:clrMapOvr>
-</p:sld>
-</file>
-
-<file path=ppt/slides/slide3.xml><?xml version="1.0" encoding="utf-8"?>
-<p:sld xmlns:a="http://schemas.openxmlformats.org/drawingml/2006/main" xmlns:r="http://schemas.openxmlformats.org/officeDocument/2006/relationships" xmlns:p="http://schemas.openxmlformats.org/presentationml/2006/main">
-  <p:cSld>
-    <p:spTree>
-      <p:nvGrpSpPr>
-        <p:cNvPr id="1" name=""/>
-        <p:cNvGrpSpPr/>
-        <p:nvPr/>
-      </p:nvGrpSpPr>
-      <p:grpSpPr>
-        <a:xfrm>
-          <a:off x="0" y="0"/>
-          <a:ext cx="0" cy="0"/>
-          <a:chOff x="0" y="0"/>
-          <a:chExt cx="0" cy="0"/>
-        </a:xfrm>
-      </p:grpSpPr>
-      <p:sp>
-        <p:nvSpPr>
-          <p:cNvPr id="2" name="Titel 1">
-            <a:extLst>
-              <a:ext uri="{FF2B5EF4-FFF2-40B4-BE49-F238E27FC236}">
-                <a16:creationId xmlns:a16="http://schemas.microsoft.com/office/drawing/2014/main" id="{5F8A6C4C-5005-43BF-B52C-8639917F24D1}"/>
-              </a:ext>
-            </a:extLst>
-          </p:cNvPr>
-          <p:cNvSpPr>
-            <a:spLocks noGrp="1"/>
-          </p:cNvSpPr>
-          <p:nvPr>
-            <p:ph type="title"/>
-          </p:nvPr>
-        </p:nvSpPr>
-        <p:spPr>
-          <a:xfrm>
-            <a:off x="1003974" y="338126"/>
-            <a:ext cx="9884851" cy="736282"/>
-          </a:xfrm>
-        </p:spPr>
-        <p:txBody>
-          <a:bodyPr/>
-          <a:lstStyle/>
-          <a:p>
-            <a:r>
-              <a:rPr lang="de-DE" dirty="0"/>
-              <a:t>COMPARISON/2 TOPICS</a:t>
-            </a:r>
-          </a:p>
-        </p:txBody>
-      </p:sp>
-      <p:sp>
-        <p:nvSpPr>
-          <p:cNvPr id="3" name="Textplatzhalter 2">
-            <a:extLst>
-              <a:ext uri="{FF2B5EF4-FFF2-40B4-BE49-F238E27FC236}">
-                <a16:creationId xmlns:a16="http://schemas.microsoft.com/office/drawing/2014/main" id="{809E70C0-7FCB-44E6-8A9B-F561F11FC7E4}"/>
-              </a:ext>
-            </a:extLst>
-          </p:cNvPr>
-          <p:cNvSpPr>
-            <a:spLocks noGrp="1"/>
-          </p:cNvSpPr>
-          <p:nvPr>
-            <p:ph type="body" idx="1"/>
-          </p:nvPr>
-        </p:nvSpPr>
-        <p:spPr>
-          <a:xfrm>
-            <a:off x="1008639" y="1293840"/>
-            <a:ext cx="4937760" cy="736282"/>
-          </a:xfrm>
-        </p:spPr>
-        <p:txBody>
-          <a:bodyPr>
-            <a:normAutofit/>
-          </a:bodyPr>
-          <a:lstStyle/>
-          <a:p>
-            <a:r>
-              <a:rPr lang="de-DE" dirty="0"/>
-              <a:t>HEADING 1</a:t>
-            </a:r>
-          </a:p>
-        </p:txBody>
-      </p:sp>
-      <p:sp>
-        <p:nvSpPr>
-          <p:cNvPr id="5" name="Textplatzhalter 4">
-            <a:extLst>
-              <a:ext uri="{FF2B5EF4-FFF2-40B4-BE49-F238E27FC236}">
-                <a16:creationId xmlns:a16="http://schemas.microsoft.com/office/drawing/2014/main" id="{90EAE032-6D39-4260-BF6C-BF0851DFD401}"/>
-              </a:ext>
-            </a:extLst>
-          </p:cNvPr>
-          <p:cNvSpPr>
-            <a:spLocks noGrp="1"/>
-          </p:cNvSpPr>
-          <p:nvPr>
-            <p:ph type="body" sz="quarter" idx="3"/>
-          </p:nvPr>
-        </p:nvSpPr>
-        <p:spPr>
-          <a:xfrm>
-            <a:off x="6245603" y="1293840"/>
-            <a:ext cx="4937760" cy="736282"/>
-          </a:xfrm>
-        </p:spPr>
-        <p:txBody>
-          <a:bodyPr>
-            <a:normAutofit/>
-          </a:bodyPr>
-          <a:lstStyle/>
-          <a:p>
-            <a:r>
-              <a:rPr lang="de-DE" dirty="0"/>
-              <a:t>HEADING 2</a:t>
-            </a:r>
-          </a:p>
-        </p:txBody>
-      </p:sp>
-      <p:pic>
-        <p:nvPicPr>
-          <p:cNvPr id="10" name="Inhaltsplatzhalter 7" descr="Ein Bild, das Text enthält.&#10;&#10;Automatisch generierte Beschreibung">
-            <a:extLst>
-              <a:ext uri="{FF2B5EF4-FFF2-40B4-BE49-F238E27FC236}">
-                <a16:creationId xmlns:a16="http://schemas.microsoft.com/office/drawing/2014/main" id="{FE3CEE7C-419A-490A-AE05-86C0B5B5B783}"/>
-              </a:ext>
-            </a:extLst>
-          </p:cNvPr>
-          <p:cNvPicPr>
-            <a:picLocks noGrp="1" noChangeAspect="1"/>
-          </p:cNvPicPr>
-          <p:nvPr>
-            <p:ph sz="quarter" idx="4"/>
-          </p:nvPr>
-        </p:nvPicPr>
-        <p:blipFill>
-          <a:blip r:embed="rId2">
-            <a:extLst>
-              <a:ext uri="{28A0092B-C50C-407E-A947-70E740481C1C}">
-                <a14:useLocalDpi xmlns:a14="http://schemas.microsoft.com/office/drawing/2010/main" val="0"/>
-              </a:ext>
-            </a:extLst>
-          </a:blip>
-          <a:stretch>
-            <a:fillRect/>
-          </a:stretch>
-        </p:blipFill>
-        <p:spPr>
-          <a:xfrm>
-            <a:off x="1003974" y="2249554"/>
-            <a:ext cx="4476523" cy="2207317"/>
-          </a:xfrm>
-        </p:spPr>
-      </p:pic>
-      <p:pic>
-        <p:nvPicPr>
-          <p:cNvPr id="11" name="Inhaltsplatzhalter 7" descr="Ein Bild, das Text enthält.&#10;&#10;Automatisch generierte Beschreibung">
-            <a:extLst>
-              <a:ext uri="{FF2B5EF4-FFF2-40B4-BE49-F238E27FC236}">
-                <a16:creationId xmlns:a16="http://schemas.microsoft.com/office/drawing/2014/main" id="{863C98F9-71A0-456B-BEA5-746B323D4082}"/>
-              </a:ext>
-            </a:extLst>
-          </p:cNvPr>
-          <p:cNvPicPr>
-            <a:picLocks noChangeAspect="1"/>
-          </p:cNvPicPr>
-          <p:nvPr/>
-        </p:nvPicPr>
-        <p:blipFill>
-          <a:blip r:embed="rId3">
-            <a:extLst>
-              <a:ext uri="{28A0092B-C50C-407E-A947-70E740481C1C}">
-                <a14:useLocalDpi xmlns:a14="http://schemas.microsoft.com/office/drawing/2010/main" val="0"/>
-              </a:ext>
-            </a:extLst>
-          </a:blip>
-          <a:stretch>
-            <a:fillRect/>
-          </a:stretch>
-        </p:blipFill>
-        <p:spPr>
-          <a:xfrm>
-            <a:off x="6412302" y="3001315"/>
-            <a:ext cx="4476523" cy="1455556"/>
-          </a:xfrm>
-          <a:prstGeom prst="rect">
-            <a:avLst/>
-          </a:prstGeom>
-        </p:spPr>
-      </p:pic>
-      <p:sp>
-        <p:nvSpPr>
-          <p:cNvPr id="7" name="Textfeld 6">
-            <a:extLst>
-              <a:ext uri="{FF2B5EF4-FFF2-40B4-BE49-F238E27FC236}">
-                <a16:creationId xmlns:a16="http://schemas.microsoft.com/office/drawing/2014/main" id="{907B3982-B6BC-4AD8-90D6-86D5E56BD33A}"/>
-              </a:ext>
-            </a:extLst>
-          </p:cNvPr>
-          <p:cNvSpPr txBox="1"/>
-          <p:nvPr/>
-        </p:nvSpPr>
-        <p:spPr>
-          <a:xfrm>
-            <a:off x="1003974" y="5052060"/>
-            <a:ext cx="4476523" cy="369332"/>
-          </a:xfrm>
-          <a:prstGeom prst="rect">
-            <a:avLst/>
-          </a:prstGeom>
-          <a:noFill/>
-        </p:spPr>
-        <p:txBody>
-          <a:bodyPr wrap="square" rtlCol="0">
-            <a:spAutoFit/>
-          </a:bodyPr>
-          <a:lstStyle/>
-          <a:p>
-            <a:r>
-              <a:rPr lang="de-DE" dirty="0">
-                <a:latin typeface="Arial" panose="020B0604020202020204" pitchFamily="34" charset="0"/>
-                <a:cs typeface="Arial" panose="020B0604020202020204" pitchFamily="34" charset="0"/>
-              </a:rPr>
-              <a:t>TEXT</a:t>
-            </a:r>
-          </a:p>
-        </p:txBody>
-      </p:sp>
-      <p:sp>
-        <p:nvSpPr>
-          <p:cNvPr id="8" name="Textfeld 7">
-            <a:extLst>
-              <a:ext uri="{FF2B5EF4-FFF2-40B4-BE49-F238E27FC236}">
-                <a16:creationId xmlns:a16="http://schemas.microsoft.com/office/drawing/2014/main" id="{F10F6889-47FE-4B47-8283-F31BD3499FBA}"/>
-              </a:ext>
-            </a:extLst>
-          </p:cNvPr>
-          <p:cNvSpPr txBox="1"/>
-          <p:nvPr/>
-        </p:nvSpPr>
-        <p:spPr>
-          <a:xfrm>
-            <a:off x="6412302" y="5052060"/>
-            <a:ext cx="4139525" cy="369332"/>
-          </a:xfrm>
-          <a:prstGeom prst="rect">
-            <a:avLst/>
-          </a:prstGeom>
-          <a:noFill/>
-        </p:spPr>
-        <p:txBody>
-          <a:bodyPr wrap="square" rtlCol="0">
-            <a:spAutoFit/>
-          </a:bodyPr>
-          <a:lstStyle/>
-          <a:p>
-            <a:r>
-              <a:rPr lang="de-DE" dirty="0">
-                <a:latin typeface="Arial" panose="020B0604020202020204" pitchFamily="34" charset="0"/>
-                <a:cs typeface="Arial" panose="020B0604020202020204" pitchFamily="34" charset="0"/>
-              </a:rPr>
-              <a:t>TEXT</a:t>
-            </a:r>
-          </a:p>
-        </p:txBody>
-      </p:sp>
-      <p:sp>
-        <p:nvSpPr>
-          <p:cNvPr id="9" name="Foliennummernplatzhalter 8">
-            <a:extLst>
-              <a:ext uri="{FF2B5EF4-FFF2-40B4-BE49-F238E27FC236}">
-                <a16:creationId xmlns:a16="http://schemas.microsoft.com/office/drawing/2014/main" id="{52C362E0-8568-4D54-9762-607080E3D2B1}"/>
-              </a:ext>
-            </a:extLst>
-          </p:cNvPr>
-          <p:cNvSpPr>
-            <a:spLocks noGrp="1"/>
-          </p:cNvSpPr>
-          <p:nvPr>
-            <p:ph type="sldNum" sz="quarter" idx="4294967295"/>
-          </p:nvPr>
-        </p:nvSpPr>
-        <p:spPr>
-          <a:xfrm>
-            <a:off x="9843655" y="6424986"/>
-            <a:ext cx="1312025" cy="365125"/>
-          </a:xfrm>
-        </p:spPr>
-        <p:txBody>
-          <a:bodyPr/>
-          <a:lstStyle/>
-          <a:p>
-            <a:fld id="{489ECDB1-2E24-4918-B7B1-E72EEFEDE6FE}" type="slidenum">
-              <a:rPr lang="de-DE" smtClean="0"/>
-              <a:t>3</a:t>
-            </a:fld>
-            <a:endParaRPr lang="de-DE"/>
-          </a:p>
-        </p:txBody>
-      </p:sp>
-      <p:sp>
-        <p:nvSpPr>
-          <p:cNvPr id="14" name="Datumsplatzhalter 13">
-            <a:extLst>
-              <a:ext uri="{FF2B5EF4-FFF2-40B4-BE49-F238E27FC236}">
-                <a16:creationId xmlns:a16="http://schemas.microsoft.com/office/drawing/2014/main" id="{761AC343-442C-4C9F-BF7F-63805BC0AC9E}"/>
-              </a:ext>
-            </a:extLst>
-          </p:cNvPr>
-          <p:cNvSpPr>
-            <a:spLocks noGrp="1"/>
-          </p:cNvSpPr>
-          <p:nvPr>
-            <p:ph type="dt" sz="half" idx="4294967295"/>
-          </p:nvPr>
-        </p:nvSpPr>
-        <p:spPr>
-          <a:xfrm>
-            <a:off x="1093889" y="6424985"/>
-            <a:ext cx="2472271" cy="365125"/>
-          </a:xfrm>
-        </p:spPr>
-        <p:txBody>
-          <a:bodyPr/>
-          <a:lstStyle/>
-          <a:p>
-            <a:pPr algn="l"/>
-            <a:fld id="{34B7D4B0-4CCF-42E8-A263-A5B4D64906BC}" type="datetime1">
-              <a:rPr lang="de-DE" smtClean="0"/>
-              <a:t>15.09.2021</a:t>
-            </a:fld>
-            <a:endParaRPr lang="de-DE" dirty="0"/>
-          </a:p>
-        </p:txBody>
-      </p:sp>
-      <p:sp>
-        <p:nvSpPr>
-          <p:cNvPr id="15" name="Fußzeilenplatzhalter 14">
-            <a:extLst>
-              <a:ext uri="{FF2B5EF4-FFF2-40B4-BE49-F238E27FC236}">
-                <a16:creationId xmlns:a16="http://schemas.microsoft.com/office/drawing/2014/main" id="{60081690-1DE9-489F-B409-AD438B1ABB2A}"/>
-              </a:ext>
-            </a:extLst>
-          </p:cNvPr>
-          <p:cNvSpPr>
-            <a:spLocks noGrp="1"/>
-          </p:cNvSpPr>
-          <p:nvPr>
-            <p:ph type="ftr" sz="quarter" idx="4294967295"/>
-          </p:nvPr>
-        </p:nvSpPr>
-        <p:spPr>
-          <a:xfrm>
-            <a:off x="3684598" y="6424985"/>
-            <a:ext cx="4822804" cy="365125"/>
-          </a:xfrm>
-        </p:spPr>
-        <p:txBody>
-          <a:bodyPr/>
-          <a:lstStyle/>
-          <a:p>
-            <a:r>
-              <a:rPr lang="de-DE"/>
-              <a:t>Moritz Flüchter: TSN Inter-Domain Communication</a:t>
-            </a:r>
-          </a:p>
-        </p:txBody>
-      </p:sp>
-    </p:spTree>
-    <p:extLst>
-      <p:ext uri="{BB962C8B-B14F-4D97-AF65-F5344CB8AC3E}">
-        <p14:creationId xmlns:p14="http://schemas.microsoft.com/office/powerpoint/2010/main" val="2789178426"/>
-      </p:ext>
-    </p:extLst>
-  </p:cSld>
-  <p:clrMapOvr>
-    <a:masterClrMapping/>
-  </p:clrMapOvr>
-</p:sld>
-</file>
-
-<file path=ppt/slides/slide4.xml><?xml version="1.0" encoding="utf-8"?>
-<p:sld xmlns:a="http://schemas.openxmlformats.org/drawingml/2006/main" xmlns:r="http://schemas.openxmlformats.org/officeDocument/2006/relationships" xmlns:p="http://schemas.openxmlformats.org/presentationml/2006/main">
-  <p:cSld>
-    <p:spTree>
-      <p:nvGrpSpPr>
-        <p:cNvPr id="1" name=""/>
-        <p:cNvGrpSpPr/>
-        <p:nvPr/>
-      </p:nvGrpSpPr>
-      <p:grpSpPr>
-        <a:xfrm>
-          <a:off x="0" y="0"/>
-          <a:ext cx="0" cy="0"/>
-          <a:chOff x="0" y="0"/>
-          <a:chExt cx="0" cy="0"/>
-        </a:xfrm>
-      </p:grpSpPr>
-      <p:sp>
-        <p:nvSpPr>
-          <p:cNvPr id="2" name="Titel 1">
-            <a:extLst>
-              <a:ext uri="{FF2B5EF4-FFF2-40B4-BE49-F238E27FC236}">
-                <a16:creationId xmlns:a16="http://schemas.microsoft.com/office/drawing/2014/main" id="{F6E41F0A-2E2D-4FC5-9F43-4600FAEFA395}"/>
-              </a:ext>
-            </a:extLst>
-          </p:cNvPr>
-          <p:cNvSpPr>
-            <a:spLocks noGrp="1"/>
-          </p:cNvSpPr>
-          <p:nvPr>
-            <p:ph type="title"/>
-          </p:nvPr>
-        </p:nvSpPr>
-        <p:spPr/>
-        <p:txBody>
-          <a:bodyPr/>
-          <a:lstStyle/>
-          <a:p>
-            <a:r>
-              <a:rPr lang="de-DE" dirty="0"/>
-              <a:t>TEXT + IMAGE</a:t>
-            </a:r>
-          </a:p>
-        </p:txBody>
-      </p:sp>
-      <p:sp>
-        <p:nvSpPr>
-          <p:cNvPr id="3" name="Inhaltsplatzhalter 2">
-            <a:extLst>
-              <a:ext uri="{FF2B5EF4-FFF2-40B4-BE49-F238E27FC236}">
-                <a16:creationId xmlns:a16="http://schemas.microsoft.com/office/drawing/2014/main" id="{EAC75DC9-155E-4132-B159-673C386F5A43}"/>
-              </a:ext>
-            </a:extLst>
-          </p:cNvPr>
-          <p:cNvSpPr>
-            <a:spLocks noGrp="1"/>
-          </p:cNvSpPr>
-          <p:nvPr>
-            <p:ph idx="1"/>
-          </p:nvPr>
-        </p:nvSpPr>
-        <p:spPr>
-          <a:xfrm>
-            <a:off x="1097279" y="1845734"/>
-            <a:ext cx="5455843" cy="4023360"/>
-          </a:xfrm>
-        </p:spPr>
-        <p:txBody>
-          <a:bodyPr/>
-          <a:lstStyle/>
-          <a:p>
-            <a:pPr>
-              <a:buFont typeface="Arial" panose="020B0604020202020204" pitchFamily="34" charset="0"/>
-              <a:buChar char="•"/>
-            </a:pPr>
-            <a:r>
-              <a:rPr lang="de-DE" dirty="0"/>
-              <a:t>TEXT</a:t>
-            </a:r>
-          </a:p>
-        </p:txBody>
-      </p:sp>
-      <p:sp>
-        <p:nvSpPr>
-          <p:cNvPr id="4" name="Datumsplatzhalter 3">
-            <a:extLst>
-              <a:ext uri="{FF2B5EF4-FFF2-40B4-BE49-F238E27FC236}">
-                <a16:creationId xmlns:a16="http://schemas.microsoft.com/office/drawing/2014/main" id="{C463F406-173E-488D-A788-00333B5AE97E}"/>
-              </a:ext>
-            </a:extLst>
-          </p:cNvPr>
-          <p:cNvSpPr>
-            <a:spLocks noGrp="1"/>
-          </p:cNvSpPr>
-          <p:nvPr>
-            <p:ph type="dt" sz="half" idx="10"/>
-          </p:nvPr>
-        </p:nvSpPr>
-        <p:spPr/>
-        <p:txBody>
-          <a:bodyPr/>
-          <a:lstStyle/>
-          <a:p>
-            <a:fld id="{7778186D-7CAD-425C-A5EB-B223AE6329F4}" type="datetime1">
-              <a:rPr lang="de-DE" smtClean="0"/>
-              <a:t>15.09.2021</a:t>
-            </a:fld>
-            <a:endParaRPr lang="de-DE" dirty="0"/>
-          </a:p>
-        </p:txBody>
-      </p:sp>
-      <p:sp>
-        <p:nvSpPr>
-          <p:cNvPr id="5" name="Fußzeilenplatzhalter 4">
-            <a:extLst>
-              <a:ext uri="{FF2B5EF4-FFF2-40B4-BE49-F238E27FC236}">
-                <a16:creationId xmlns:a16="http://schemas.microsoft.com/office/drawing/2014/main" id="{F6590142-F7C8-4816-BA0F-F63B394887CE}"/>
-              </a:ext>
-            </a:extLst>
-          </p:cNvPr>
-          <p:cNvSpPr>
-            <a:spLocks noGrp="1"/>
-          </p:cNvSpPr>
-          <p:nvPr>
-            <p:ph type="ftr" sz="quarter" idx="11"/>
-          </p:nvPr>
-        </p:nvSpPr>
-        <p:spPr/>
-        <p:txBody>
-          <a:bodyPr/>
-          <a:lstStyle/>
-          <a:p>
-            <a:r>
-              <a:rPr lang="de-DE" dirty="0"/>
-              <a:t>Moritz Flüchter: TSN Inter-Domain Communication</a:t>
-            </a:r>
-          </a:p>
-        </p:txBody>
-      </p:sp>
-      <p:sp>
-        <p:nvSpPr>
-          <p:cNvPr id="6" name="Foliennummernplatzhalter 5">
-            <a:extLst>
-              <a:ext uri="{FF2B5EF4-FFF2-40B4-BE49-F238E27FC236}">
-                <a16:creationId xmlns:a16="http://schemas.microsoft.com/office/drawing/2014/main" id="{7E703547-174F-44ED-AE14-A037549BC75F}"/>
-              </a:ext>
-            </a:extLst>
-          </p:cNvPr>
-          <p:cNvSpPr>
-            <a:spLocks noGrp="1"/>
-          </p:cNvSpPr>
-          <p:nvPr>
-            <p:ph type="sldNum" sz="quarter" idx="12"/>
-          </p:nvPr>
-        </p:nvSpPr>
-        <p:spPr/>
-        <p:txBody>
-          <a:bodyPr/>
-          <a:lstStyle/>
-          <a:p>
-            <a:fld id="{489ECDB1-2E24-4918-B7B1-E72EEFEDE6FE}" type="slidenum">
-              <a:rPr lang="de-DE" smtClean="0"/>
-              <a:t>4</a:t>
-            </a:fld>
-            <a:endParaRPr lang="de-DE" dirty="0"/>
-          </a:p>
-        </p:txBody>
-      </p:sp>
-      <p:sp>
-        <p:nvSpPr>
-          <p:cNvPr id="9" name="Textplatzhalter 2">
-            <a:extLst>
-              <a:ext uri="{FF2B5EF4-FFF2-40B4-BE49-F238E27FC236}">
-                <a16:creationId xmlns:a16="http://schemas.microsoft.com/office/drawing/2014/main" id="{2BBB3040-5284-4B4F-A563-7C876497D4D0}"/>
-              </a:ext>
-            </a:extLst>
-          </p:cNvPr>
-          <p:cNvSpPr txBox="1">
-            <a:spLocks/>
-          </p:cNvSpPr>
-          <p:nvPr/>
-        </p:nvSpPr>
-        <p:spPr>
-          <a:xfrm>
-            <a:off x="1008638" y="1293840"/>
-            <a:ext cx="9847621" cy="736282"/>
-          </a:xfrm>
-          <a:prstGeom prst="rect">
-            <a:avLst/>
-          </a:prstGeom>
-        </p:spPr>
-        <p:txBody>
-          <a:bodyPr vert="horz" lIns="91440" tIns="45720" rIns="91440" bIns="45720" rtlCol="0" anchor="ctr">
-            <a:normAutofit/>
-          </a:bodyPr>
-          <a:lstStyle>
-            <a:lvl1pPr marL="0" indent="0" algn="l" defTabSz="914400" rtl="0" eaLnBrk="1" latinLnBrk="0" hangingPunct="1">
-              <a:lnSpc>
-                <a:spcPct val="90000"/>
-              </a:lnSpc>
-              <a:spcBef>
-                <a:spcPts val="1200"/>
-              </a:spcBef>
-              <a:spcAft>
-                <a:spcPts val="200"/>
-              </a:spcAft>
-              <a:buClr>
-                <a:schemeClr val="accent1"/>
-              </a:buClr>
-              <a:buSzPct val="100000"/>
-              <a:buFont typeface="Calibri" panose="020F0502020204030204" pitchFamily="34" charset="0"/>
-              <a:buNone/>
-              <a:defRPr sz="2000" b="0" kern="1200" cap="all" baseline="0">
-                <a:solidFill>
-                  <a:schemeClr val="tx2"/>
-                </a:solidFill>
-                <a:latin typeface="Arial" panose="020B0604020202020204" pitchFamily="34" charset="0"/>
-                <a:ea typeface="+mn-ea"/>
-                <a:cs typeface="Arial" panose="020B0604020202020204" pitchFamily="34" charset="0"/>
-              </a:defRPr>
-            </a:lvl1pPr>
-            <a:lvl2pPr marL="457200" indent="0" algn="l" defTabSz="914400" rtl="0" eaLnBrk="1" latinLnBrk="0" hangingPunct="1">
-              <a:lnSpc>
-                <a:spcPct val="90000"/>
-              </a:lnSpc>
-              <a:spcBef>
-                <a:spcPts val="200"/>
-              </a:spcBef>
-              <a:spcAft>
-                <a:spcPts val="400"/>
-              </a:spcAft>
-              <a:buClr>
-                <a:schemeClr val="accent1"/>
-              </a:buClr>
-              <a:buFont typeface="Calibri" pitchFamily="34" charset="0"/>
-              <a:buNone/>
-              <a:defRPr sz="2000" b="1" kern="1200">
-                <a:solidFill>
-                  <a:schemeClr val="tx1">
-                    <a:lumMod val="75000"/>
-                    <a:lumOff val="25000"/>
-                  </a:schemeClr>
-                </a:solidFill>
-                <a:latin typeface="Arial" panose="020B0604020202020204" pitchFamily="34" charset="0"/>
-                <a:ea typeface="+mn-ea"/>
-                <a:cs typeface="Arial" panose="020B0604020202020204" pitchFamily="34" charset="0"/>
-              </a:defRPr>
-            </a:lvl2pPr>
-            <a:lvl3pPr marL="914400" indent="0" algn="l" defTabSz="914400" rtl="0" eaLnBrk="1" latinLnBrk="0" hangingPunct="1">
-              <a:lnSpc>
-                <a:spcPct val="90000"/>
-              </a:lnSpc>
-              <a:spcBef>
-                <a:spcPts val="200"/>
-              </a:spcBef>
-              <a:spcAft>
-                <a:spcPts val="400"/>
-              </a:spcAft>
-              <a:buClr>
-                <a:schemeClr val="accent1"/>
-              </a:buClr>
-              <a:buFont typeface="Calibri" pitchFamily="34" charset="0"/>
-              <a:buNone/>
-              <a:defRPr sz="1800" b="1" kern="1200">
-                <a:solidFill>
-                  <a:schemeClr val="tx1">
-                    <a:lumMod val="75000"/>
-                    <a:lumOff val="25000"/>
-                  </a:schemeClr>
-                </a:solidFill>
-                <a:latin typeface="Arial" panose="020B0604020202020204" pitchFamily="34" charset="0"/>
-                <a:ea typeface="+mn-ea"/>
-                <a:cs typeface="Arial" panose="020B0604020202020204" pitchFamily="34" charset="0"/>
-              </a:defRPr>
-            </a:lvl3pPr>
-            <a:lvl4pPr marL="1371600" indent="0" algn="l" defTabSz="914400" rtl="0" eaLnBrk="1" latinLnBrk="0" hangingPunct="1">
-              <a:lnSpc>
-                <a:spcPct val="90000"/>
-              </a:lnSpc>
-              <a:spcBef>
-                <a:spcPts val="200"/>
-              </a:spcBef>
-              <a:spcAft>
-                <a:spcPts val="400"/>
-              </a:spcAft>
-              <a:buClr>
-                <a:schemeClr val="accent1"/>
-              </a:buClr>
-              <a:buFont typeface="Calibri" pitchFamily="34" charset="0"/>
-              <a:buNone/>
-              <a:defRPr sz="1600" b="1" kern="1200">
-                <a:solidFill>
-                  <a:schemeClr val="tx1">
-                    <a:lumMod val="75000"/>
-                    <a:lumOff val="25000"/>
-                  </a:schemeClr>
-                </a:solidFill>
-                <a:latin typeface="Arial" panose="020B0604020202020204" pitchFamily="34" charset="0"/>
-                <a:ea typeface="+mn-ea"/>
-                <a:cs typeface="Arial" panose="020B0604020202020204" pitchFamily="34" charset="0"/>
-              </a:defRPr>
-            </a:lvl4pPr>
-            <a:lvl5pPr marL="1828800" indent="0" algn="l" defTabSz="914400" rtl="0" eaLnBrk="1" latinLnBrk="0" hangingPunct="1">
-              <a:lnSpc>
-                <a:spcPct val="90000"/>
-              </a:lnSpc>
-              <a:spcBef>
-                <a:spcPts val="200"/>
-              </a:spcBef>
-              <a:spcAft>
-                <a:spcPts val="400"/>
-              </a:spcAft>
-              <a:buClr>
-                <a:schemeClr val="accent1"/>
-              </a:buClr>
-              <a:buFont typeface="Calibri" pitchFamily="34" charset="0"/>
-              <a:buNone/>
-              <a:defRPr sz="1600" b="1" kern="1200">
-                <a:solidFill>
-                  <a:schemeClr val="tx1">
-                    <a:lumMod val="75000"/>
-                    <a:lumOff val="25000"/>
-                  </a:schemeClr>
-                </a:solidFill>
-                <a:latin typeface="Arial" panose="020B0604020202020204" pitchFamily="34" charset="0"/>
-                <a:ea typeface="+mn-ea"/>
-                <a:cs typeface="Arial" panose="020B0604020202020204" pitchFamily="34" charset="0"/>
-              </a:defRPr>
-            </a:lvl5pPr>
-            <a:lvl6pPr marL="2286000" indent="0" algn="l" defTabSz="914400" rtl="0" eaLnBrk="1" latinLnBrk="0" hangingPunct="1">
-              <a:lnSpc>
-                <a:spcPct val="90000"/>
-              </a:lnSpc>
-              <a:spcBef>
-                <a:spcPts val="200"/>
-              </a:spcBef>
-              <a:spcAft>
-                <a:spcPts val="400"/>
-              </a:spcAft>
-              <a:buClr>
-                <a:schemeClr val="accent1"/>
-              </a:buClr>
-              <a:buFont typeface="Calibri" pitchFamily="34" charset="0"/>
-              <a:buNone/>
-              <a:defRPr sz="1600" b="1" kern="1200">
-                <a:solidFill>
-                  <a:schemeClr val="tx1">
-                    <a:lumMod val="75000"/>
-                    <a:lumOff val="25000"/>
-                  </a:schemeClr>
-                </a:solidFill>
-                <a:latin typeface="+mn-lt"/>
-                <a:ea typeface="+mn-ea"/>
-                <a:cs typeface="+mn-cs"/>
-              </a:defRPr>
-            </a:lvl6pPr>
-            <a:lvl7pPr marL="2743200" indent="0" algn="l" defTabSz="914400" rtl="0" eaLnBrk="1" latinLnBrk="0" hangingPunct="1">
-              <a:lnSpc>
-                <a:spcPct val="90000"/>
-              </a:lnSpc>
-              <a:spcBef>
-                <a:spcPts val="200"/>
-              </a:spcBef>
-              <a:spcAft>
-                <a:spcPts val="400"/>
-              </a:spcAft>
-              <a:buClr>
-                <a:schemeClr val="accent1"/>
-              </a:buClr>
-              <a:buFont typeface="Calibri" pitchFamily="34" charset="0"/>
-              <a:buNone/>
-              <a:defRPr sz="1600" b="1" kern="1200">
-                <a:solidFill>
-                  <a:schemeClr val="tx1">
-                    <a:lumMod val="75000"/>
-                    <a:lumOff val="25000"/>
-                  </a:schemeClr>
-                </a:solidFill>
-                <a:latin typeface="+mn-lt"/>
-                <a:ea typeface="+mn-ea"/>
-                <a:cs typeface="+mn-cs"/>
-              </a:defRPr>
-            </a:lvl7pPr>
-            <a:lvl8pPr marL="3200400" indent="0" algn="l" defTabSz="914400" rtl="0" eaLnBrk="1" latinLnBrk="0" hangingPunct="1">
-              <a:lnSpc>
-                <a:spcPct val="90000"/>
-              </a:lnSpc>
-              <a:spcBef>
-                <a:spcPts val="200"/>
-              </a:spcBef>
-              <a:spcAft>
-                <a:spcPts val="400"/>
-              </a:spcAft>
-              <a:buClr>
-                <a:schemeClr val="accent1"/>
-              </a:buClr>
-              <a:buFont typeface="Calibri" pitchFamily="34" charset="0"/>
-              <a:buNone/>
-              <a:defRPr sz="1600" b="1" kern="1200">
-                <a:solidFill>
-                  <a:schemeClr val="tx1">
-                    <a:lumMod val="75000"/>
-                    <a:lumOff val="25000"/>
-                  </a:schemeClr>
-                </a:solidFill>
-                <a:latin typeface="+mn-lt"/>
-                <a:ea typeface="+mn-ea"/>
-                <a:cs typeface="+mn-cs"/>
-              </a:defRPr>
-            </a:lvl8pPr>
-            <a:lvl9pPr marL="3657600" indent="0" algn="l" defTabSz="914400" rtl="0" eaLnBrk="1" latinLnBrk="0" hangingPunct="1">
-              <a:lnSpc>
-                <a:spcPct val="90000"/>
-              </a:lnSpc>
-              <a:spcBef>
-                <a:spcPts val="200"/>
-              </a:spcBef>
-              <a:spcAft>
-                <a:spcPts val="400"/>
-              </a:spcAft>
-              <a:buClr>
-                <a:schemeClr val="accent1"/>
-              </a:buClr>
-              <a:buFont typeface="Calibri" pitchFamily="34" charset="0"/>
-              <a:buNone/>
-              <a:defRPr sz="1600" b="1" kern="1200">
-                <a:solidFill>
-                  <a:schemeClr val="tx1">
-                    <a:lumMod val="75000"/>
-                    <a:lumOff val="25000"/>
-                  </a:schemeClr>
-                </a:solidFill>
-                <a:latin typeface="+mn-lt"/>
-                <a:ea typeface="+mn-ea"/>
-                <a:cs typeface="+mn-cs"/>
-              </a:defRPr>
-            </a:lvl9pPr>
-          </a:lstStyle>
-          <a:p>
-            <a:r>
-              <a:rPr lang="de-DE" sz="1900" dirty="0"/>
-              <a:t>HEADING</a:t>
-            </a:r>
-          </a:p>
-        </p:txBody>
-      </p:sp>
-      <p:pic>
-        <p:nvPicPr>
-          <p:cNvPr id="8" name="Grafik 7">
-            <a:extLst>
-              <a:ext uri="{FF2B5EF4-FFF2-40B4-BE49-F238E27FC236}">
-                <a16:creationId xmlns:a16="http://schemas.microsoft.com/office/drawing/2014/main" id="{AA9627ED-B0C1-41E3-B29E-1572A5BF9650}"/>
-              </a:ext>
-            </a:extLst>
-          </p:cNvPr>
-          <p:cNvPicPr>
-            <a:picLocks noChangeAspect="1"/>
-          </p:cNvPicPr>
-          <p:nvPr/>
-        </p:nvPicPr>
-        <p:blipFill>
-          <a:blip r:embed="rId3"/>
-          <a:stretch>
-            <a:fillRect/>
-          </a:stretch>
-        </p:blipFill>
-        <p:spPr>
-          <a:xfrm>
-            <a:off x="6553122" y="2030122"/>
-            <a:ext cx="4541599" cy="4084321"/>
-          </a:xfrm>
-          <a:prstGeom prst="rect">
-            <a:avLst/>
-          </a:prstGeom>
-        </p:spPr>
-      </p:pic>
-    </p:spTree>
-    <p:extLst>
-      <p:ext uri="{BB962C8B-B14F-4D97-AF65-F5344CB8AC3E}">
-        <p14:creationId xmlns:p14="http://schemas.microsoft.com/office/powerpoint/2010/main" val="411711707"/>
-      </p:ext>
-    </p:extLst>
-  </p:cSld>
-  <p:clrMapOvr>
-    <a:masterClrMapping/>
-  </p:clrMapOvr>
-</p:sld>
-</file>
-
-<file path=ppt/slides/slide5.xml><?xml version="1.0" encoding="utf-8"?>
+<file path=ppt/slides/slide10.xml><?xml version="1.0" encoding="utf-8"?>
 <p:sld xmlns:a="http://schemas.openxmlformats.org/drawingml/2006/main" xmlns:r="http://schemas.openxmlformats.org/officeDocument/2006/relationships" xmlns:p="http://schemas.openxmlformats.org/presentationml/2006/main">
   <p:cSld>
     <p:spTree>
@@ -6148,7 +5252,7 @@
           <a:p>
             <a:fld id="{489ECDB1-2E24-4918-B7B1-E72EEFEDE6FE}" type="slidenum">
               <a:rPr lang="de-DE" smtClean="0"/>
-              <a:t>5</a:t>
+              <a:t>10</a:t>
             </a:fld>
             <a:endParaRPr lang="de-DE" dirty="0"/>
           </a:p>
@@ -6177,7 +5281,7 @@
           <a:p>
             <a:fld id="{00E6FA39-AEDB-4A55-A265-855AD6460162}" type="datetime1">
               <a:rPr lang="de-DE" smtClean="0"/>
-              <a:t>15.09.2021</a:t>
+              <a:t>13.10.2021</a:t>
             </a:fld>
             <a:endParaRPr lang="de-DE" dirty="0"/>
           </a:p>
@@ -6290,6 +5394,3058 @@
     <p:extLst>
       <p:ext uri="{BB962C8B-B14F-4D97-AF65-F5344CB8AC3E}">
         <p14:creationId xmlns:p14="http://schemas.microsoft.com/office/powerpoint/2010/main" val="755861107"/>
+      </p:ext>
+    </p:extLst>
+  </p:cSld>
+  <p:clrMapOvr>
+    <a:masterClrMapping/>
+  </p:clrMapOvr>
+</p:sld>
+</file>
+
+<file path=ppt/slides/slide2.xml><?xml version="1.0" encoding="utf-8"?>
+<p:sld xmlns:a="http://schemas.openxmlformats.org/drawingml/2006/main" xmlns:r="http://schemas.openxmlformats.org/officeDocument/2006/relationships" xmlns:p="http://schemas.openxmlformats.org/presentationml/2006/main">
+  <p:cSld>
+    <p:spTree>
+      <p:nvGrpSpPr>
+        <p:cNvPr id="1" name=""/>
+        <p:cNvGrpSpPr/>
+        <p:nvPr/>
+      </p:nvGrpSpPr>
+      <p:grpSpPr>
+        <a:xfrm>
+          <a:off x="0" y="0"/>
+          <a:ext cx="0" cy="0"/>
+          <a:chOff x="0" y="0"/>
+          <a:chExt cx="0" cy="0"/>
+        </a:xfrm>
+      </p:grpSpPr>
+      <p:sp>
+        <p:nvSpPr>
+          <p:cNvPr id="2" name="Titel 1">
+            <a:extLst>
+              <a:ext uri="{FF2B5EF4-FFF2-40B4-BE49-F238E27FC236}">
+                <a16:creationId xmlns:a16="http://schemas.microsoft.com/office/drawing/2014/main" id="{F6E41F0A-2E2D-4FC5-9F43-4600FAEFA395}"/>
+              </a:ext>
+            </a:extLst>
+          </p:cNvPr>
+          <p:cNvSpPr>
+            <a:spLocks noGrp="1"/>
+          </p:cNvSpPr>
+          <p:nvPr>
+            <p:ph type="title"/>
+          </p:nvPr>
+        </p:nvSpPr>
+        <p:spPr/>
+        <p:txBody>
+          <a:bodyPr/>
+          <a:lstStyle/>
+          <a:p>
+            <a:r>
+              <a:rPr lang="de-DE" dirty="0"/>
+              <a:t>Content</a:t>
+            </a:r>
+          </a:p>
+        </p:txBody>
+      </p:sp>
+      <p:sp>
+        <p:nvSpPr>
+          <p:cNvPr id="3" name="Inhaltsplatzhalter 2">
+            <a:extLst>
+              <a:ext uri="{FF2B5EF4-FFF2-40B4-BE49-F238E27FC236}">
+                <a16:creationId xmlns:a16="http://schemas.microsoft.com/office/drawing/2014/main" id="{EAC75DC9-155E-4132-B159-673C386F5A43}"/>
+              </a:ext>
+            </a:extLst>
+          </p:cNvPr>
+          <p:cNvSpPr>
+            <a:spLocks noGrp="1"/>
+          </p:cNvSpPr>
+          <p:nvPr>
+            <p:ph idx="1"/>
+          </p:nvPr>
+        </p:nvSpPr>
+        <p:spPr>
+          <a:xfrm>
+            <a:off x="1097279" y="1845734"/>
+            <a:ext cx="9966959" cy="4023360"/>
+          </a:xfrm>
+        </p:spPr>
+        <p:txBody>
+          <a:bodyPr/>
+          <a:lstStyle/>
+          <a:p>
+            <a:pPr marL="457200" indent="-457200">
+              <a:buFont typeface="+mj-lt"/>
+              <a:buAutoNum type="arabicPeriod"/>
+            </a:pPr>
+            <a:r>
+              <a:rPr lang="de-DE" dirty="0"/>
+              <a:t> </a:t>
+            </a:r>
+            <a:r>
+              <a:rPr lang="de-DE" dirty="0" err="1"/>
+              <a:t>Creating</a:t>
+            </a:r>
+            <a:r>
+              <a:rPr lang="de-DE" dirty="0"/>
+              <a:t> a </a:t>
+            </a:r>
+            <a:r>
+              <a:rPr lang="de-DE" dirty="0" err="1"/>
+              <a:t>repository</a:t>
+            </a:r>
+            <a:endParaRPr lang="de-DE" dirty="0"/>
+          </a:p>
+          <a:p>
+            <a:pPr marL="457200" indent="-457200">
+              <a:buFont typeface="+mj-lt"/>
+              <a:buAutoNum type="arabicPeriod"/>
+            </a:pPr>
+            <a:r>
+              <a:rPr lang="de-DE" dirty="0"/>
+              <a:t> Making and </a:t>
+            </a:r>
+            <a:r>
+              <a:rPr lang="de-DE" dirty="0" err="1"/>
+              <a:t>saving</a:t>
+            </a:r>
+            <a:r>
+              <a:rPr lang="de-DE" dirty="0"/>
+              <a:t> </a:t>
+            </a:r>
+            <a:r>
+              <a:rPr lang="de-DE" dirty="0" err="1"/>
+              <a:t>changes</a:t>
+            </a:r>
+            <a:endParaRPr lang="de-DE" dirty="0"/>
+          </a:p>
+          <a:p>
+            <a:pPr marL="457200" indent="-457200">
+              <a:buFont typeface="+mj-lt"/>
+              <a:buAutoNum type="arabicPeriod"/>
+            </a:pPr>
+            <a:r>
+              <a:rPr lang="de-DE" dirty="0"/>
+              <a:t> Metafiles</a:t>
+            </a:r>
+          </a:p>
+          <a:p>
+            <a:pPr marL="457200" indent="-457200">
+              <a:buFont typeface="+mj-lt"/>
+              <a:buAutoNum type="arabicPeriod"/>
+            </a:pPr>
+            <a:r>
+              <a:rPr lang="de-DE" dirty="0"/>
+              <a:t> </a:t>
+            </a:r>
+            <a:r>
+              <a:rPr lang="de-DE" dirty="0" err="1"/>
+              <a:t>Developing</a:t>
+            </a:r>
+            <a:r>
+              <a:rPr lang="de-DE" dirty="0"/>
+              <a:t> in </a:t>
+            </a:r>
+            <a:r>
+              <a:rPr lang="de-DE" dirty="0" err="1"/>
+              <a:t>branches</a:t>
+            </a:r>
+            <a:endParaRPr lang="de-DE" dirty="0"/>
+          </a:p>
+          <a:p>
+            <a:pPr marL="457200" indent="-457200">
+              <a:buFont typeface="+mj-lt"/>
+              <a:buAutoNum type="arabicPeriod"/>
+            </a:pPr>
+            <a:r>
+              <a:rPr lang="de-DE" dirty="0"/>
+              <a:t> </a:t>
+            </a:r>
+            <a:r>
+              <a:rPr lang="de-DE" dirty="0" err="1"/>
+              <a:t>Undoing</a:t>
+            </a:r>
+            <a:r>
+              <a:rPr lang="de-DE" dirty="0"/>
+              <a:t> </a:t>
+            </a:r>
+            <a:r>
+              <a:rPr lang="de-DE" dirty="0" err="1"/>
+              <a:t>changes</a:t>
+            </a:r>
+            <a:endParaRPr lang="de-DE" dirty="0"/>
+          </a:p>
+          <a:p>
+            <a:pPr marL="457200" indent="-457200">
+              <a:buFont typeface="+mj-lt"/>
+              <a:buAutoNum type="arabicPeriod"/>
+            </a:pPr>
+            <a:r>
+              <a:rPr lang="de-DE" dirty="0"/>
+              <a:t>Other </a:t>
+            </a:r>
+            <a:r>
+              <a:rPr lang="de-DE" dirty="0" err="1"/>
+              <a:t>useful</a:t>
+            </a:r>
+            <a:r>
+              <a:rPr lang="de-DE" dirty="0"/>
+              <a:t> </a:t>
+            </a:r>
+            <a:r>
+              <a:rPr lang="de-DE" dirty="0" err="1"/>
+              <a:t>commands</a:t>
+            </a:r>
+            <a:endParaRPr lang="de-DE" dirty="0"/>
+          </a:p>
+          <a:p>
+            <a:pPr>
+              <a:buFont typeface="Arial" panose="020B0604020202020204" pitchFamily="34" charset="0"/>
+              <a:buChar char="•"/>
+            </a:pPr>
+            <a:endParaRPr lang="de-DE" dirty="0"/>
+          </a:p>
+        </p:txBody>
+      </p:sp>
+      <p:sp>
+        <p:nvSpPr>
+          <p:cNvPr id="4" name="Datumsplatzhalter 3">
+            <a:extLst>
+              <a:ext uri="{FF2B5EF4-FFF2-40B4-BE49-F238E27FC236}">
+                <a16:creationId xmlns:a16="http://schemas.microsoft.com/office/drawing/2014/main" id="{C463F406-173E-488D-A788-00333B5AE97E}"/>
+              </a:ext>
+            </a:extLst>
+          </p:cNvPr>
+          <p:cNvSpPr>
+            <a:spLocks noGrp="1"/>
+          </p:cNvSpPr>
+          <p:nvPr>
+            <p:ph type="dt" sz="half" idx="10"/>
+          </p:nvPr>
+        </p:nvSpPr>
+        <p:spPr/>
+        <p:txBody>
+          <a:bodyPr/>
+          <a:lstStyle/>
+          <a:p>
+            <a:fld id="{7778186D-7CAD-425C-A5EB-B223AE6329F4}" type="datetime1">
+              <a:rPr lang="de-DE" smtClean="0"/>
+              <a:t>13.10.2021</a:t>
+            </a:fld>
+            <a:endParaRPr lang="de-DE" dirty="0"/>
+          </a:p>
+        </p:txBody>
+      </p:sp>
+      <p:sp>
+        <p:nvSpPr>
+          <p:cNvPr id="5" name="Fußzeilenplatzhalter 4">
+            <a:extLst>
+              <a:ext uri="{FF2B5EF4-FFF2-40B4-BE49-F238E27FC236}">
+                <a16:creationId xmlns:a16="http://schemas.microsoft.com/office/drawing/2014/main" id="{F6590142-F7C8-4816-BA0F-F63B394887CE}"/>
+              </a:ext>
+            </a:extLst>
+          </p:cNvPr>
+          <p:cNvSpPr>
+            <a:spLocks noGrp="1"/>
+          </p:cNvSpPr>
+          <p:nvPr>
+            <p:ph type="ftr" sz="quarter" idx="11"/>
+          </p:nvPr>
+        </p:nvSpPr>
+        <p:spPr/>
+        <p:txBody>
+          <a:bodyPr/>
+          <a:lstStyle/>
+          <a:p>
+            <a:r>
+              <a:rPr lang="de-DE" dirty="0"/>
+              <a:t>Moritz Flüchter: TSN Inter-Domain Communication</a:t>
+            </a:r>
+          </a:p>
+        </p:txBody>
+      </p:sp>
+      <p:sp>
+        <p:nvSpPr>
+          <p:cNvPr id="6" name="Foliennummernplatzhalter 5">
+            <a:extLst>
+              <a:ext uri="{FF2B5EF4-FFF2-40B4-BE49-F238E27FC236}">
+                <a16:creationId xmlns:a16="http://schemas.microsoft.com/office/drawing/2014/main" id="{7E703547-174F-44ED-AE14-A037549BC75F}"/>
+              </a:ext>
+            </a:extLst>
+          </p:cNvPr>
+          <p:cNvSpPr>
+            <a:spLocks noGrp="1"/>
+          </p:cNvSpPr>
+          <p:nvPr>
+            <p:ph type="sldNum" sz="quarter" idx="12"/>
+          </p:nvPr>
+        </p:nvSpPr>
+        <p:spPr/>
+        <p:txBody>
+          <a:bodyPr/>
+          <a:lstStyle/>
+          <a:p>
+            <a:fld id="{489ECDB1-2E24-4918-B7B1-E72EEFEDE6FE}" type="slidenum">
+              <a:rPr lang="de-DE" smtClean="0"/>
+              <a:t>2</a:t>
+            </a:fld>
+            <a:endParaRPr lang="de-DE" dirty="0"/>
+          </a:p>
+        </p:txBody>
+      </p:sp>
+      <p:sp>
+        <p:nvSpPr>
+          <p:cNvPr id="9" name="Textplatzhalter 2">
+            <a:extLst>
+              <a:ext uri="{FF2B5EF4-FFF2-40B4-BE49-F238E27FC236}">
+                <a16:creationId xmlns:a16="http://schemas.microsoft.com/office/drawing/2014/main" id="{2BBB3040-5284-4B4F-A563-7C876497D4D0}"/>
+              </a:ext>
+            </a:extLst>
+          </p:cNvPr>
+          <p:cNvSpPr txBox="1">
+            <a:spLocks/>
+          </p:cNvSpPr>
+          <p:nvPr/>
+        </p:nvSpPr>
+        <p:spPr>
+          <a:xfrm>
+            <a:off x="1008638" y="1293840"/>
+            <a:ext cx="9847621" cy="736282"/>
+          </a:xfrm>
+          <a:prstGeom prst="rect">
+            <a:avLst/>
+          </a:prstGeom>
+        </p:spPr>
+        <p:txBody>
+          <a:bodyPr vert="horz" lIns="91440" tIns="45720" rIns="91440" bIns="45720" rtlCol="0" anchor="ctr">
+            <a:normAutofit/>
+          </a:bodyPr>
+          <a:lstStyle>
+            <a:lvl1pPr marL="0" indent="0" algn="l" defTabSz="914400" rtl="0" eaLnBrk="1" latinLnBrk="0" hangingPunct="1">
+              <a:lnSpc>
+                <a:spcPct val="90000"/>
+              </a:lnSpc>
+              <a:spcBef>
+                <a:spcPts val="1200"/>
+              </a:spcBef>
+              <a:spcAft>
+                <a:spcPts val="200"/>
+              </a:spcAft>
+              <a:buClr>
+                <a:schemeClr val="accent1"/>
+              </a:buClr>
+              <a:buSzPct val="100000"/>
+              <a:buFont typeface="Calibri" panose="020F0502020204030204" pitchFamily="34" charset="0"/>
+              <a:buNone/>
+              <a:defRPr sz="2000" b="0" kern="1200" cap="all" baseline="0">
+                <a:solidFill>
+                  <a:schemeClr val="tx2"/>
+                </a:solidFill>
+                <a:latin typeface="Arial" panose="020B0604020202020204" pitchFamily="34" charset="0"/>
+                <a:ea typeface="+mn-ea"/>
+                <a:cs typeface="Arial" panose="020B0604020202020204" pitchFamily="34" charset="0"/>
+              </a:defRPr>
+            </a:lvl1pPr>
+            <a:lvl2pPr marL="457200" indent="0" algn="l" defTabSz="914400" rtl="0" eaLnBrk="1" latinLnBrk="0" hangingPunct="1">
+              <a:lnSpc>
+                <a:spcPct val="90000"/>
+              </a:lnSpc>
+              <a:spcBef>
+                <a:spcPts val="200"/>
+              </a:spcBef>
+              <a:spcAft>
+                <a:spcPts val="400"/>
+              </a:spcAft>
+              <a:buClr>
+                <a:schemeClr val="accent1"/>
+              </a:buClr>
+              <a:buFont typeface="Calibri" pitchFamily="34" charset="0"/>
+              <a:buNone/>
+              <a:defRPr sz="2000" b="1" kern="1200">
+                <a:solidFill>
+                  <a:schemeClr val="tx1">
+                    <a:lumMod val="75000"/>
+                    <a:lumOff val="25000"/>
+                  </a:schemeClr>
+                </a:solidFill>
+                <a:latin typeface="Arial" panose="020B0604020202020204" pitchFamily="34" charset="0"/>
+                <a:ea typeface="+mn-ea"/>
+                <a:cs typeface="Arial" panose="020B0604020202020204" pitchFamily="34" charset="0"/>
+              </a:defRPr>
+            </a:lvl2pPr>
+            <a:lvl3pPr marL="914400" indent="0" algn="l" defTabSz="914400" rtl="0" eaLnBrk="1" latinLnBrk="0" hangingPunct="1">
+              <a:lnSpc>
+                <a:spcPct val="90000"/>
+              </a:lnSpc>
+              <a:spcBef>
+                <a:spcPts val="200"/>
+              </a:spcBef>
+              <a:spcAft>
+                <a:spcPts val="400"/>
+              </a:spcAft>
+              <a:buClr>
+                <a:schemeClr val="accent1"/>
+              </a:buClr>
+              <a:buFont typeface="Calibri" pitchFamily="34" charset="0"/>
+              <a:buNone/>
+              <a:defRPr sz="1800" b="1" kern="1200">
+                <a:solidFill>
+                  <a:schemeClr val="tx1">
+                    <a:lumMod val="75000"/>
+                    <a:lumOff val="25000"/>
+                  </a:schemeClr>
+                </a:solidFill>
+                <a:latin typeface="Arial" panose="020B0604020202020204" pitchFamily="34" charset="0"/>
+                <a:ea typeface="+mn-ea"/>
+                <a:cs typeface="Arial" panose="020B0604020202020204" pitchFamily="34" charset="0"/>
+              </a:defRPr>
+            </a:lvl3pPr>
+            <a:lvl4pPr marL="1371600" indent="0" algn="l" defTabSz="914400" rtl="0" eaLnBrk="1" latinLnBrk="0" hangingPunct="1">
+              <a:lnSpc>
+                <a:spcPct val="90000"/>
+              </a:lnSpc>
+              <a:spcBef>
+                <a:spcPts val="200"/>
+              </a:spcBef>
+              <a:spcAft>
+                <a:spcPts val="400"/>
+              </a:spcAft>
+              <a:buClr>
+                <a:schemeClr val="accent1"/>
+              </a:buClr>
+              <a:buFont typeface="Calibri" pitchFamily="34" charset="0"/>
+              <a:buNone/>
+              <a:defRPr sz="1600" b="1" kern="1200">
+                <a:solidFill>
+                  <a:schemeClr val="tx1">
+                    <a:lumMod val="75000"/>
+                    <a:lumOff val="25000"/>
+                  </a:schemeClr>
+                </a:solidFill>
+                <a:latin typeface="Arial" panose="020B0604020202020204" pitchFamily="34" charset="0"/>
+                <a:ea typeface="+mn-ea"/>
+                <a:cs typeface="Arial" panose="020B0604020202020204" pitchFamily="34" charset="0"/>
+              </a:defRPr>
+            </a:lvl4pPr>
+            <a:lvl5pPr marL="1828800" indent="0" algn="l" defTabSz="914400" rtl="0" eaLnBrk="1" latinLnBrk="0" hangingPunct="1">
+              <a:lnSpc>
+                <a:spcPct val="90000"/>
+              </a:lnSpc>
+              <a:spcBef>
+                <a:spcPts val="200"/>
+              </a:spcBef>
+              <a:spcAft>
+                <a:spcPts val="400"/>
+              </a:spcAft>
+              <a:buClr>
+                <a:schemeClr val="accent1"/>
+              </a:buClr>
+              <a:buFont typeface="Calibri" pitchFamily="34" charset="0"/>
+              <a:buNone/>
+              <a:defRPr sz="1600" b="1" kern="1200">
+                <a:solidFill>
+                  <a:schemeClr val="tx1">
+                    <a:lumMod val="75000"/>
+                    <a:lumOff val="25000"/>
+                  </a:schemeClr>
+                </a:solidFill>
+                <a:latin typeface="Arial" panose="020B0604020202020204" pitchFamily="34" charset="0"/>
+                <a:ea typeface="+mn-ea"/>
+                <a:cs typeface="Arial" panose="020B0604020202020204" pitchFamily="34" charset="0"/>
+              </a:defRPr>
+            </a:lvl5pPr>
+            <a:lvl6pPr marL="2286000" indent="0" algn="l" defTabSz="914400" rtl="0" eaLnBrk="1" latinLnBrk="0" hangingPunct="1">
+              <a:lnSpc>
+                <a:spcPct val="90000"/>
+              </a:lnSpc>
+              <a:spcBef>
+                <a:spcPts val="200"/>
+              </a:spcBef>
+              <a:spcAft>
+                <a:spcPts val="400"/>
+              </a:spcAft>
+              <a:buClr>
+                <a:schemeClr val="accent1"/>
+              </a:buClr>
+              <a:buFont typeface="Calibri" pitchFamily="34" charset="0"/>
+              <a:buNone/>
+              <a:defRPr sz="1600" b="1" kern="1200">
+                <a:solidFill>
+                  <a:schemeClr val="tx1">
+                    <a:lumMod val="75000"/>
+                    <a:lumOff val="25000"/>
+                  </a:schemeClr>
+                </a:solidFill>
+                <a:latin typeface="+mn-lt"/>
+                <a:ea typeface="+mn-ea"/>
+                <a:cs typeface="+mn-cs"/>
+              </a:defRPr>
+            </a:lvl6pPr>
+            <a:lvl7pPr marL="2743200" indent="0" algn="l" defTabSz="914400" rtl="0" eaLnBrk="1" latinLnBrk="0" hangingPunct="1">
+              <a:lnSpc>
+                <a:spcPct val="90000"/>
+              </a:lnSpc>
+              <a:spcBef>
+                <a:spcPts val="200"/>
+              </a:spcBef>
+              <a:spcAft>
+                <a:spcPts val="400"/>
+              </a:spcAft>
+              <a:buClr>
+                <a:schemeClr val="accent1"/>
+              </a:buClr>
+              <a:buFont typeface="Calibri" pitchFamily="34" charset="0"/>
+              <a:buNone/>
+              <a:defRPr sz="1600" b="1" kern="1200">
+                <a:solidFill>
+                  <a:schemeClr val="tx1">
+                    <a:lumMod val="75000"/>
+                    <a:lumOff val="25000"/>
+                  </a:schemeClr>
+                </a:solidFill>
+                <a:latin typeface="+mn-lt"/>
+                <a:ea typeface="+mn-ea"/>
+                <a:cs typeface="+mn-cs"/>
+              </a:defRPr>
+            </a:lvl7pPr>
+            <a:lvl8pPr marL="3200400" indent="0" algn="l" defTabSz="914400" rtl="0" eaLnBrk="1" latinLnBrk="0" hangingPunct="1">
+              <a:lnSpc>
+                <a:spcPct val="90000"/>
+              </a:lnSpc>
+              <a:spcBef>
+                <a:spcPts val="200"/>
+              </a:spcBef>
+              <a:spcAft>
+                <a:spcPts val="400"/>
+              </a:spcAft>
+              <a:buClr>
+                <a:schemeClr val="accent1"/>
+              </a:buClr>
+              <a:buFont typeface="Calibri" pitchFamily="34" charset="0"/>
+              <a:buNone/>
+              <a:defRPr sz="1600" b="1" kern="1200">
+                <a:solidFill>
+                  <a:schemeClr val="tx1">
+                    <a:lumMod val="75000"/>
+                    <a:lumOff val="25000"/>
+                  </a:schemeClr>
+                </a:solidFill>
+                <a:latin typeface="+mn-lt"/>
+                <a:ea typeface="+mn-ea"/>
+                <a:cs typeface="+mn-cs"/>
+              </a:defRPr>
+            </a:lvl8pPr>
+            <a:lvl9pPr marL="3657600" indent="0" algn="l" defTabSz="914400" rtl="0" eaLnBrk="1" latinLnBrk="0" hangingPunct="1">
+              <a:lnSpc>
+                <a:spcPct val="90000"/>
+              </a:lnSpc>
+              <a:spcBef>
+                <a:spcPts val="200"/>
+              </a:spcBef>
+              <a:spcAft>
+                <a:spcPts val="400"/>
+              </a:spcAft>
+              <a:buClr>
+                <a:schemeClr val="accent1"/>
+              </a:buClr>
+              <a:buFont typeface="Calibri" pitchFamily="34" charset="0"/>
+              <a:buNone/>
+              <a:defRPr sz="1600" b="1" kern="1200">
+                <a:solidFill>
+                  <a:schemeClr val="tx1">
+                    <a:lumMod val="75000"/>
+                    <a:lumOff val="25000"/>
+                  </a:schemeClr>
+                </a:solidFill>
+                <a:latin typeface="+mn-lt"/>
+                <a:ea typeface="+mn-ea"/>
+                <a:cs typeface="+mn-cs"/>
+              </a:defRPr>
+            </a:lvl9pPr>
+          </a:lstStyle>
+          <a:p>
+            <a:endParaRPr lang="de-DE" sz="1900" dirty="0"/>
+          </a:p>
+        </p:txBody>
+      </p:sp>
+    </p:spTree>
+    <p:extLst>
+      <p:ext uri="{BB962C8B-B14F-4D97-AF65-F5344CB8AC3E}">
+        <p14:creationId xmlns:p14="http://schemas.microsoft.com/office/powerpoint/2010/main" val="1483543906"/>
+      </p:ext>
+    </p:extLst>
+  </p:cSld>
+  <p:clrMapOvr>
+    <a:masterClrMapping/>
+  </p:clrMapOvr>
+</p:sld>
+</file>
+
+<file path=ppt/slides/slide3.xml><?xml version="1.0" encoding="utf-8"?>
+<p:sld xmlns:a="http://schemas.openxmlformats.org/drawingml/2006/main" xmlns:r="http://schemas.openxmlformats.org/officeDocument/2006/relationships" xmlns:p="http://schemas.openxmlformats.org/presentationml/2006/main">
+  <p:cSld>
+    <p:spTree>
+      <p:nvGrpSpPr>
+        <p:cNvPr id="1" name=""/>
+        <p:cNvGrpSpPr/>
+        <p:nvPr/>
+      </p:nvGrpSpPr>
+      <p:grpSpPr>
+        <a:xfrm>
+          <a:off x="0" y="0"/>
+          <a:ext cx="0" cy="0"/>
+          <a:chOff x="0" y="0"/>
+          <a:chExt cx="0" cy="0"/>
+        </a:xfrm>
+      </p:grpSpPr>
+      <p:sp>
+        <p:nvSpPr>
+          <p:cNvPr id="2" name="Titel 1">
+            <a:extLst>
+              <a:ext uri="{FF2B5EF4-FFF2-40B4-BE49-F238E27FC236}">
+                <a16:creationId xmlns:a16="http://schemas.microsoft.com/office/drawing/2014/main" id="{F6E41F0A-2E2D-4FC5-9F43-4600FAEFA395}"/>
+              </a:ext>
+            </a:extLst>
+          </p:cNvPr>
+          <p:cNvSpPr>
+            <a:spLocks noGrp="1"/>
+          </p:cNvSpPr>
+          <p:nvPr>
+            <p:ph type="title"/>
+          </p:nvPr>
+        </p:nvSpPr>
+        <p:spPr/>
+        <p:txBody>
+          <a:bodyPr/>
+          <a:lstStyle/>
+          <a:p>
+            <a:r>
+              <a:rPr lang="de-DE" dirty="0" err="1"/>
+              <a:t>Creating</a:t>
+            </a:r>
+            <a:r>
+              <a:rPr lang="de-DE" dirty="0"/>
+              <a:t> a </a:t>
+            </a:r>
+            <a:r>
+              <a:rPr lang="de-DE" dirty="0" err="1"/>
+              <a:t>repository</a:t>
+            </a:r>
+            <a:endParaRPr lang="de-DE" dirty="0"/>
+          </a:p>
+        </p:txBody>
+      </p:sp>
+      <p:sp>
+        <p:nvSpPr>
+          <p:cNvPr id="4" name="Datumsplatzhalter 3">
+            <a:extLst>
+              <a:ext uri="{FF2B5EF4-FFF2-40B4-BE49-F238E27FC236}">
+                <a16:creationId xmlns:a16="http://schemas.microsoft.com/office/drawing/2014/main" id="{C463F406-173E-488D-A788-00333B5AE97E}"/>
+              </a:ext>
+            </a:extLst>
+          </p:cNvPr>
+          <p:cNvSpPr>
+            <a:spLocks noGrp="1"/>
+          </p:cNvSpPr>
+          <p:nvPr>
+            <p:ph type="dt" sz="half" idx="10"/>
+          </p:nvPr>
+        </p:nvSpPr>
+        <p:spPr/>
+        <p:txBody>
+          <a:bodyPr/>
+          <a:lstStyle/>
+          <a:p>
+            <a:fld id="{7778186D-7CAD-425C-A5EB-B223AE6329F4}" type="datetime1">
+              <a:rPr lang="de-DE" smtClean="0"/>
+              <a:t>13.10.2021</a:t>
+            </a:fld>
+            <a:endParaRPr lang="de-DE" dirty="0"/>
+          </a:p>
+        </p:txBody>
+      </p:sp>
+      <p:sp>
+        <p:nvSpPr>
+          <p:cNvPr id="5" name="Fußzeilenplatzhalter 4">
+            <a:extLst>
+              <a:ext uri="{FF2B5EF4-FFF2-40B4-BE49-F238E27FC236}">
+                <a16:creationId xmlns:a16="http://schemas.microsoft.com/office/drawing/2014/main" id="{F6590142-F7C8-4816-BA0F-F63B394887CE}"/>
+              </a:ext>
+            </a:extLst>
+          </p:cNvPr>
+          <p:cNvSpPr>
+            <a:spLocks noGrp="1"/>
+          </p:cNvSpPr>
+          <p:nvPr>
+            <p:ph type="ftr" sz="quarter" idx="11"/>
+          </p:nvPr>
+        </p:nvSpPr>
+        <p:spPr/>
+        <p:txBody>
+          <a:bodyPr/>
+          <a:lstStyle/>
+          <a:p>
+            <a:r>
+              <a:rPr lang="de-DE" dirty="0"/>
+              <a:t>Moritz Flüchter: TSN Inter-Domain Communication</a:t>
+            </a:r>
+          </a:p>
+        </p:txBody>
+      </p:sp>
+      <p:sp>
+        <p:nvSpPr>
+          <p:cNvPr id="6" name="Foliennummernplatzhalter 5">
+            <a:extLst>
+              <a:ext uri="{FF2B5EF4-FFF2-40B4-BE49-F238E27FC236}">
+                <a16:creationId xmlns:a16="http://schemas.microsoft.com/office/drawing/2014/main" id="{7E703547-174F-44ED-AE14-A037549BC75F}"/>
+              </a:ext>
+            </a:extLst>
+          </p:cNvPr>
+          <p:cNvSpPr>
+            <a:spLocks noGrp="1"/>
+          </p:cNvSpPr>
+          <p:nvPr>
+            <p:ph type="sldNum" sz="quarter" idx="12"/>
+          </p:nvPr>
+        </p:nvSpPr>
+        <p:spPr/>
+        <p:txBody>
+          <a:bodyPr/>
+          <a:lstStyle/>
+          <a:p>
+            <a:fld id="{489ECDB1-2E24-4918-B7B1-E72EEFEDE6FE}" type="slidenum">
+              <a:rPr lang="de-DE" smtClean="0"/>
+              <a:t>3</a:t>
+            </a:fld>
+            <a:endParaRPr lang="de-DE" dirty="0"/>
+          </a:p>
+        </p:txBody>
+      </p:sp>
+      <p:sp>
+        <p:nvSpPr>
+          <p:cNvPr id="9" name="Textplatzhalter 2">
+            <a:extLst>
+              <a:ext uri="{FF2B5EF4-FFF2-40B4-BE49-F238E27FC236}">
+                <a16:creationId xmlns:a16="http://schemas.microsoft.com/office/drawing/2014/main" id="{2BBB3040-5284-4B4F-A563-7C876497D4D0}"/>
+              </a:ext>
+            </a:extLst>
+          </p:cNvPr>
+          <p:cNvSpPr txBox="1">
+            <a:spLocks/>
+          </p:cNvSpPr>
+          <p:nvPr/>
+        </p:nvSpPr>
+        <p:spPr>
+          <a:xfrm>
+            <a:off x="1008638" y="1293840"/>
+            <a:ext cx="9847621" cy="736282"/>
+          </a:xfrm>
+          <a:prstGeom prst="rect">
+            <a:avLst/>
+          </a:prstGeom>
+        </p:spPr>
+        <p:txBody>
+          <a:bodyPr vert="horz" lIns="91440" tIns="45720" rIns="91440" bIns="45720" rtlCol="0" anchor="ctr">
+            <a:normAutofit/>
+          </a:bodyPr>
+          <a:lstStyle>
+            <a:lvl1pPr marL="0" indent="0" algn="l" defTabSz="914400" rtl="0" eaLnBrk="1" latinLnBrk="0" hangingPunct="1">
+              <a:lnSpc>
+                <a:spcPct val="90000"/>
+              </a:lnSpc>
+              <a:spcBef>
+                <a:spcPts val="1200"/>
+              </a:spcBef>
+              <a:spcAft>
+                <a:spcPts val="200"/>
+              </a:spcAft>
+              <a:buClr>
+                <a:schemeClr val="accent1"/>
+              </a:buClr>
+              <a:buSzPct val="100000"/>
+              <a:buFont typeface="Calibri" panose="020F0502020204030204" pitchFamily="34" charset="0"/>
+              <a:buNone/>
+              <a:defRPr sz="2000" b="0" kern="1200" cap="all" baseline="0">
+                <a:solidFill>
+                  <a:schemeClr val="tx2"/>
+                </a:solidFill>
+                <a:latin typeface="Arial" panose="020B0604020202020204" pitchFamily="34" charset="0"/>
+                <a:ea typeface="+mn-ea"/>
+                <a:cs typeface="Arial" panose="020B0604020202020204" pitchFamily="34" charset="0"/>
+              </a:defRPr>
+            </a:lvl1pPr>
+            <a:lvl2pPr marL="457200" indent="0" algn="l" defTabSz="914400" rtl="0" eaLnBrk="1" latinLnBrk="0" hangingPunct="1">
+              <a:lnSpc>
+                <a:spcPct val="90000"/>
+              </a:lnSpc>
+              <a:spcBef>
+                <a:spcPts val="200"/>
+              </a:spcBef>
+              <a:spcAft>
+                <a:spcPts val="400"/>
+              </a:spcAft>
+              <a:buClr>
+                <a:schemeClr val="accent1"/>
+              </a:buClr>
+              <a:buFont typeface="Calibri" pitchFamily="34" charset="0"/>
+              <a:buNone/>
+              <a:defRPr sz="2000" b="1" kern="1200">
+                <a:solidFill>
+                  <a:schemeClr val="tx1">
+                    <a:lumMod val="75000"/>
+                    <a:lumOff val="25000"/>
+                  </a:schemeClr>
+                </a:solidFill>
+                <a:latin typeface="Arial" panose="020B0604020202020204" pitchFamily="34" charset="0"/>
+                <a:ea typeface="+mn-ea"/>
+                <a:cs typeface="Arial" panose="020B0604020202020204" pitchFamily="34" charset="0"/>
+              </a:defRPr>
+            </a:lvl2pPr>
+            <a:lvl3pPr marL="914400" indent="0" algn="l" defTabSz="914400" rtl="0" eaLnBrk="1" latinLnBrk="0" hangingPunct="1">
+              <a:lnSpc>
+                <a:spcPct val="90000"/>
+              </a:lnSpc>
+              <a:spcBef>
+                <a:spcPts val="200"/>
+              </a:spcBef>
+              <a:spcAft>
+                <a:spcPts val="400"/>
+              </a:spcAft>
+              <a:buClr>
+                <a:schemeClr val="accent1"/>
+              </a:buClr>
+              <a:buFont typeface="Calibri" pitchFamily="34" charset="0"/>
+              <a:buNone/>
+              <a:defRPr sz="1800" b="1" kern="1200">
+                <a:solidFill>
+                  <a:schemeClr val="tx1">
+                    <a:lumMod val="75000"/>
+                    <a:lumOff val="25000"/>
+                  </a:schemeClr>
+                </a:solidFill>
+                <a:latin typeface="Arial" panose="020B0604020202020204" pitchFamily="34" charset="0"/>
+                <a:ea typeface="+mn-ea"/>
+                <a:cs typeface="Arial" panose="020B0604020202020204" pitchFamily="34" charset="0"/>
+              </a:defRPr>
+            </a:lvl3pPr>
+            <a:lvl4pPr marL="1371600" indent="0" algn="l" defTabSz="914400" rtl="0" eaLnBrk="1" latinLnBrk="0" hangingPunct="1">
+              <a:lnSpc>
+                <a:spcPct val="90000"/>
+              </a:lnSpc>
+              <a:spcBef>
+                <a:spcPts val="200"/>
+              </a:spcBef>
+              <a:spcAft>
+                <a:spcPts val="400"/>
+              </a:spcAft>
+              <a:buClr>
+                <a:schemeClr val="accent1"/>
+              </a:buClr>
+              <a:buFont typeface="Calibri" pitchFamily="34" charset="0"/>
+              <a:buNone/>
+              <a:defRPr sz="1600" b="1" kern="1200">
+                <a:solidFill>
+                  <a:schemeClr val="tx1">
+                    <a:lumMod val="75000"/>
+                    <a:lumOff val="25000"/>
+                  </a:schemeClr>
+                </a:solidFill>
+                <a:latin typeface="Arial" panose="020B0604020202020204" pitchFamily="34" charset="0"/>
+                <a:ea typeface="+mn-ea"/>
+                <a:cs typeface="Arial" panose="020B0604020202020204" pitchFamily="34" charset="0"/>
+              </a:defRPr>
+            </a:lvl4pPr>
+            <a:lvl5pPr marL="1828800" indent="0" algn="l" defTabSz="914400" rtl="0" eaLnBrk="1" latinLnBrk="0" hangingPunct="1">
+              <a:lnSpc>
+                <a:spcPct val="90000"/>
+              </a:lnSpc>
+              <a:spcBef>
+                <a:spcPts val="200"/>
+              </a:spcBef>
+              <a:spcAft>
+                <a:spcPts val="400"/>
+              </a:spcAft>
+              <a:buClr>
+                <a:schemeClr val="accent1"/>
+              </a:buClr>
+              <a:buFont typeface="Calibri" pitchFamily="34" charset="0"/>
+              <a:buNone/>
+              <a:defRPr sz="1600" b="1" kern="1200">
+                <a:solidFill>
+                  <a:schemeClr val="tx1">
+                    <a:lumMod val="75000"/>
+                    <a:lumOff val="25000"/>
+                  </a:schemeClr>
+                </a:solidFill>
+                <a:latin typeface="Arial" panose="020B0604020202020204" pitchFamily="34" charset="0"/>
+                <a:ea typeface="+mn-ea"/>
+                <a:cs typeface="Arial" panose="020B0604020202020204" pitchFamily="34" charset="0"/>
+              </a:defRPr>
+            </a:lvl5pPr>
+            <a:lvl6pPr marL="2286000" indent="0" algn="l" defTabSz="914400" rtl="0" eaLnBrk="1" latinLnBrk="0" hangingPunct="1">
+              <a:lnSpc>
+                <a:spcPct val="90000"/>
+              </a:lnSpc>
+              <a:spcBef>
+                <a:spcPts val="200"/>
+              </a:spcBef>
+              <a:spcAft>
+                <a:spcPts val="400"/>
+              </a:spcAft>
+              <a:buClr>
+                <a:schemeClr val="accent1"/>
+              </a:buClr>
+              <a:buFont typeface="Calibri" pitchFamily="34" charset="0"/>
+              <a:buNone/>
+              <a:defRPr sz="1600" b="1" kern="1200">
+                <a:solidFill>
+                  <a:schemeClr val="tx1">
+                    <a:lumMod val="75000"/>
+                    <a:lumOff val="25000"/>
+                  </a:schemeClr>
+                </a:solidFill>
+                <a:latin typeface="+mn-lt"/>
+                <a:ea typeface="+mn-ea"/>
+                <a:cs typeface="+mn-cs"/>
+              </a:defRPr>
+            </a:lvl6pPr>
+            <a:lvl7pPr marL="2743200" indent="0" algn="l" defTabSz="914400" rtl="0" eaLnBrk="1" latinLnBrk="0" hangingPunct="1">
+              <a:lnSpc>
+                <a:spcPct val="90000"/>
+              </a:lnSpc>
+              <a:spcBef>
+                <a:spcPts val="200"/>
+              </a:spcBef>
+              <a:spcAft>
+                <a:spcPts val="400"/>
+              </a:spcAft>
+              <a:buClr>
+                <a:schemeClr val="accent1"/>
+              </a:buClr>
+              <a:buFont typeface="Calibri" pitchFamily="34" charset="0"/>
+              <a:buNone/>
+              <a:defRPr sz="1600" b="1" kern="1200">
+                <a:solidFill>
+                  <a:schemeClr val="tx1">
+                    <a:lumMod val="75000"/>
+                    <a:lumOff val="25000"/>
+                  </a:schemeClr>
+                </a:solidFill>
+                <a:latin typeface="+mn-lt"/>
+                <a:ea typeface="+mn-ea"/>
+                <a:cs typeface="+mn-cs"/>
+              </a:defRPr>
+            </a:lvl7pPr>
+            <a:lvl8pPr marL="3200400" indent="0" algn="l" defTabSz="914400" rtl="0" eaLnBrk="1" latinLnBrk="0" hangingPunct="1">
+              <a:lnSpc>
+                <a:spcPct val="90000"/>
+              </a:lnSpc>
+              <a:spcBef>
+                <a:spcPts val="200"/>
+              </a:spcBef>
+              <a:spcAft>
+                <a:spcPts val="400"/>
+              </a:spcAft>
+              <a:buClr>
+                <a:schemeClr val="accent1"/>
+              </a:buClr>
+              <a:buFont typeface="Calibri" pitchFamily="34" charset="0"/>
+              <a:buNone/>
+              <a:defRPr sz="1600" b="1" kern="1200">
+                <a:solidFill>
+                  <a:schemeClr val="tx1">
+                    <a:lumMod val="75000"/>
+                    <a:lumOff val="25000"/>
+                  </a:schemeClr>
+                </a:solidFill>
+                <a:latin typeface="+mn-lt"/>
+                <a:ea typeface="+mn-ea"/>
+                <a:cs typeface="+mn-cs"/>
+              </a:defRPr>
+            </a:lvl8pPr>
+            <a:lvl9pPr marL="3657600" indent="0" algn="l" defTabSz="914400" rtl="0" eaLnBrk="1" latinLnBrk="0" hangingPunct="1">
+              <a:lnSpc>
+                <a:spcPct val="90000"/>
+              </a:lnSpc>
+              <a:spcBef>
+                <a:spcPts val="200"/>
+              </a:spcBef>
+              <a:spcAft>
+                <a:spcPts val="400"/>
+              </a:spcAft>
+              <a:buClr>
+                <a:schemeClr val="accent1"/>
+              </a:buClr>
+              <a:buFont typeface="Calibri" pitchFamily="34" charset="0"/>
+              <a:buNone/>
+              <a:defRPr sz="1600" b="1" kern="1200">
+                <a:solidFill>
+                  <a:schemeClr val="tx1">
+                    <a:lumMod val="75000"/>
+                    <a:lumOff val="25000"/>
+                  </a:schemeClr>
+                </a:solidFill>
+                <a:latin typeface="+mn-lt"/>
+                <a:ea typeface="+mn-ea"/>
+                <a:cs typeface="+mn-cs"/>
+              </a:defRPr>
+            </a:lvl9pPr>
+          </a:lstStyle>
+          <a:p>
+            <a:endParaRPr lang="de-DE" sz="1900" dirty="0"/>
+          </a:p>
+        </p:txBody>
+      </p:sp>
+      <p:pic>
+        <p:nvPicPr>
+          <p:cNvPr id="8" name="Grafik 7">
+            <a:extLst>
+              <a:ext uri="{FF2B5EF4-FFF2-40B4-BE49-F238E27FC236}">
+                <a16:creationId xmlns:a16="http://schemas.microsoft.com/office/drawing/2014/main" id="{9CA199AD-45DF-487D-9760-E4BD31B49CBE}"/>
+              </a:ext>
+            </a:extLst>
+          </p:cNvPr>
+          <p:cNvPicPr>
+            <a:picLocks noChangeAspect="1"/>
+          </p:cNvPicPr>
+          <p:nvPr/>
+        </p:nvPicPr>
+        <p:blipFill rotWithShape="1">
+          <a:blip r:embed="rId3"/>
+          <a:srcRect t="2659"/>
+          <a:stretch/>
+        </p:blipFill>
+        <p:spPr>
+          <a:xfrm>
+            <a:off x="3715078" y="1931158"/>
+            <a:ext cx="4018629" cy="3567055"/>
+          </a:xfrm>
+          <a:prstGeom prst="rect">
+            <a:avLst/>
+          </a:prstGeom>
+        </p:spPr>
+      </p:pic>
+      <p:sp>
+        <p:nvSpPr>
+          <p:cNvPr id="11" name="Pfeil: nach unten 10">
+            <a:extLst>
+              <a:ext uri="{FF2B5EF4-FFF2-40B4-BE49-F238E27FC236}">
+                <a16:creationId xmlns:a16="http://schemas.microsoft.com/office/drawing/2014/main" id="{40EE52E0-C2AA-4653-9995-8C5A8638B130}"/>
+              </a:ext>
+            </a:extLst>
+          </p:cNvPr>
+          <p:cNvSpPr/>
+          <p:nvPr/>
+        </p:nvSpPr>
+        <p:spPr>
+          <a:xfrm rot="2284553">
+            <a:off x="7292489" y="2517656"/>
+            <a:ext cx="465513" cy="897775"/>
+          </a:xfrm>
+          <a:prstGeom prst="downArrow">
+            <a:avLst/>
+          </a:prstGeom>
+          <a:solidFill>
+            <a:srgbClr val="FF0000"/>
+          </a:solidFill>
+        </p:spPr>
+        <p:style>
+          <a:lnRef idx="2">
+            <a:schemeClr val="accent1">
+              <a:shade val="50000"/>
+            </a:schemeClr>
+          </a:lnRef>
+          <a:fillRef idx="1">
+            <a:schemeClr val="accent1"/>
+          </a:fillRef>
+          <a:effectRef idx="0">
+            <a:schemeClr val="accent1"/>
+          </a:effectRef>
+          <a:fontRef idx="minor">
+            <a:schemeClr val="lt1"/>
+          </a:fontRef>
+        </p:style>
+        <p:txBody>
+          <a:bodyPr rtlCol="0" anchor="ctr"/>
+          <a:lstStyle/>
+          <a:p>
+            <a:pPr algn="ctr"/>
+            <a:endParaRPr lang="en-GB"/>
+          </a:p>
+        </p:txBody>
+      </p:sp>
+    </p:spTree>
+    <p:extLst>
+      <p:ext uri="{BB962C8B-B14F-4D97-AF65-F5344CB8AC3E}">
+        <p14:creationId xmlns:p14="http://schemas.microsoft.com/office/powerpoint/2010/main" val="385946684"/>
+      </p:ext>
+    </p:extLst>
+  </p:cSld>
+  <p:clrMapOvr>
+    <a:masterClrMapping/>
+  </p:clrMapOvr>
+</p:sld>
+</file>
+
+<file path=ppt/slides/slide4.xml><?xml version="1.0" encoding="utf-8"?>
+<p:sld xmlns:a="http://schemas.openxmlformats.org/drawingml/2006/main" xmlns:r="http://schemas.openxmlformats.org/officeDocument/2006/relationships" xmlns:p="http://schemas.openxmlformats.org/presentationml/2006/main">
+  <p:cSld>
+    <p:spTree>
+      <p:nvGrpSpPr>
+        <p:cNvPr id="1" name=""/>
+        <p:cNvGrpSpPr/>
+        <p:nvPr/>
+      </p:nvGrpSpPr>
+      <p:grpSpPr>
+        <a:xfrm>
+          <a:off x="0" y="0"/>
+          <a:ext cx="0" cy="0"/>
+          <a:chOff x="0" y="0"/>
+          <a:chExt cx="0" cy="0"/>
+        </a:xfrm>
+      </p:grpSpPr>
+      <p:sp>
+        <p:nvSpPr>
+          <p:cNvPr id="2" name="Titel 1">
+            <a:extLst>
+              <a:ext uri="{FF2B5EF4-FFF2-40B4-BE49-F238E27FC236}">
+                <a16:creationId xmlns:a16="http://schemas.microsoft.com/office/drawing/2014/main" id="{F6E41F0A-2E2D-4FC5-9F43-4600FAEFA395}"/>
+              </a:ext>
+            </a:extLst>
+          </p:cNvPr>
+          <p:cNvSpPr>
+            <a:spLocks noGrp="1"/>
+          </p:cNvSpPr>
+          <p:nvPr>
+            <p:ph type="title"/>
+          </p:nvPr>
+        </p:nvSpPr>
+        <p:spPr/>
+        <p:txBody>
+          <a:bodyPr/>
+          <a:lstStyle/>
+          <a:p>
+            <a:r>
+              <a:rPr lang="de-DE" dirty="0" err="1"/>
+              <a:t>Creating</a:t>
+            </a:r>
+            <a:r>
+              <a:rPr lang="de-DE" dirty="0"/>
+              <a:t> a </a:t>
+            </a:r>
+            <a:r>
+              <a:rPr lang="de-DE" dirty="0" err="1"/>
+              <a:t>repository</a:t>
+            </a:r>
+            <a:endParaRPr lang="de-DE" dirty="0"/>
+          </a:p>
+        </p:txBody>
+      </p:sp>
+      <p:sp>
+        <p:nvSpPr>
+          <p:cNvPr id="4" name="Datumsplatzhalter 3">
+            <a:extLst>
+              <a:ext uri="{FF2B5EF4-FFF2-40B4-BE49-F238E27FC236}">
+                <a16:creationId xmlns:a16="http://schemas.microsoft.com/office/drawing/2014/main" id="{C463F406-173E-488D-A788-00333B5AE97E}"/>
+              </a:ext>
+            </a:extLst>
+          </p:cNvPr>
+          <p:cNvSpPr>
+            <a:spLocks noGrp="1"/>
+          </p:cNvSpPr>
+          <p:nvPr>
+            <p:ph type="dt" sz="half" idx="10"/>
+          </p:nvPr>
+        </p:nvSpPr>
+        <p:spPr/>
+        <p:txBody>
+          <a:bodyPr/>
+          <a:lstStyle/>
+          <a:p>
+            <a:fld id="{7778186D-7CAD-425C-A5EB-B223AE6329F4}" type="datetime1">
+              <a:rPr lang="de-DE" smtClean="0"/>
+              <a:t>13.10.2021</a:t>
+            </a:fld>
+            <a:endParaRPr lang="de-DE" dirty="0"/>
+          </a:p>
+        </p:txBody>
+      </p:sp>
+      <p:sp>
+        <p:nvSpPr>
+          <p:cNvPr id="5" name="Fußzeilenplatzhalter 4">
+            <a:extLst>
+              <a:ext uri="{FF2B5EF4-FFF2-40B4-BE49-F238E27FC236}">
+                <a16:creationId xmlns:a16="http://schemas.microsoft.com/office/drawing/2014/main" id="{F6590142-F7C8-4816-BA0F-F63B394887CE}"/>
+              </a:ext>
+            </a:extLst>
+          </p:cNvPr>
+          <p:cNvSpPr>
+            <a:spLocks noGrp="1"/>
+          </p:cNvSpPr>
+          <p:nvPr>
+            <p:ph type="ftr" sz="quarter" idx="11"/>
+          </p:nvPr>
+        </p:nvSpPr>
+        <p:spPr/>
+        <p:txBody>
+          <a:bodyPr/>
+          <a:lstStyle/>
+          <a:p>
+            <a:r>
+              <a:rPr lang="de-DE" dirty="0"/>
+              <a:t>Moritz Flüchter: TSN Inter-Domain Communication</a:t>
+            </a:r>
+          </a:p>
+        </p:txBody>
+      </p:sp>
+      <p:sp>
+        <p:nvSpPr>
+          <p:cNvPr id="6" name="Foliennummernplatzhalter 5">
+            <a:extLst>
+              <a:ext uri="{FF2B5EF4-FFF2-40B4-BE49-F238E27FC236}">
+                <a16:creationId xmlns:a16="http://schemas.microsoft.com/office/drawing/2014/main" id="{7E703547-174F-44ED-AE14-A037549BC75F}"/>
+              </a:ext>
+            </a:extLst>
+          </p:cNvPr>
+          <p:cNvSpPr>
+            <a:spLocks noGrp="1"/>
+          </p:cNvSpPr>
+          <p:nvPr>
+            <p:ph type="sldNum" sz="quarter" idx="12"/>
+          </p:nvPr>
+        </p:nvSpPr>
+        <p:spPr/>
+        <p:txBody>
+          <a:bodyPr/>
+          <a:lstStyle/>
+          <a:p>
+            <a:fld id="{489ECDB1-2E24-4918-B7B1-E72EEFEDE6FE}" type="slidenum">
+              <a:rPr lang="de-DE" smtClean="0"/>
+              <a:t>4</a:t>
+            </a:fld>
+            <a:endParaRPr lang="de-DE" dirty="0"/>
+          </a:p>
+        </p:txBody>
+      </p:sp>
+      <p:sp>
+        <p:nvSpPr>
+          <p:cNvPr id="11" name="Pfeil: nach unten 10">
+            <a:extLst>
+              <a:ext uri="{FF2B5EF4-FFF2-40B4-BE49-F238E27FC236}">
+                <a16:creationId xmlns:a16="http://schemas.microsoft.com/office/drawing/2014/main" id="{40EE52E0-C2AA-4653-9995-8C5A8638B130}"/>
+              </a:ext>
+            </a:extLst>
+          </p:cNvPr>
+          <p:cNvSpPr/>
+          <p:nvPr/>
+        </p:nvSpPr>
+        <p:spPr>
+          <a:xfrm rot="2284553">
+            <a:off x="7530483" y="2836074"/>
+            <a:ext cx="465513" cy="897775"/>
+          </a:xfrm>
+          <a:prstGeom prst="downArrow">
+            <a:avLst/>
+          </a:prstGeom>
+          <a:solidFill>
+            <a:srgbClr val="FF0000"/>
+          </a:solidFill>
+        </p:spPr>
+        <p:style>
+          <a:lnRef idx="2">
+            <a:schemeClr val="accent1">
+              <a:shade val="50000"/>
+            </a:schemeClr>
+          </a:lnRef>
+          <a:fillRef idx="1">
+            <a:schemeClr val="accent1"/>
+          </a:fillRef>
+          <a:effectRef idx="0">
+            <a:schemeClr val="accent1"/>
+          </a:effectRef>
+          <a:fontRef idx="minor">
+            <a:schemeClr val="lt1"/>
+          </a:fontRef>
+        </p:style>
+        <p:txBody>
+          <a:bodyPr rtlCol="0" anchor="ctr"/>
+          <a:lstStyle/>
+          <a:p>
+            <a:pPr algn="ctr"/>
+            <a:endParaRPr lang="en-GB"/>
+          </a:p>
+        </p:txBody>
+      </p:sp>
+      <p:pic>
+        <p:nvPicPr>
+          <p:cNvPr id="7" name="Grafik 6">
+            <a:extLst>
+              <a:ext uri="{FF2B5EF4-FFF2-40B4-BE49-F238E27FC236}">
+                <a16:creationId xmlns:a16="http://schemas.microsoft.com/office/drawing/2014/main" id="{135D0227-A847-4A67-9DCB-E3AA0FF2B2B5}"/>
+              </a:ext>
+            </a:extLst>
+          </p:cNvPr>
+          <p:cNvPicPr>
+            <a:picLocks noChangeAspect="1"/>
+          </p:cNvPicPr>
+          <p:nvPr/>
+        </p:nvPicPr>
+        <p:blipFill>
+          <a:blip r:embed="rId3"/>
+          <a:stretch>
+            <a:fillRect/>
+          </a:stretch>
+        </p:blipFill>
+        <p:spPr>
+          <a:xfrm>
+            <a:off x="3630473" y="1256461"/>
+            <a:ext cx="4713961" cy="4978105"/>
+          </a:xfrm>
+          <a:prstGeom prst="rect">
+            <a:avLst/>
+          </a:prstGeom>
+        </p:spPr>
+      </p:pic>
+    </p:spTree>
+    <p:extLst>
+      <p:ext uri="{BB962C8B-B14F-4D97-AF65-F5344CB8AC3E}">
+        <p14:creationId xmlns:p14="http://schemas.microsoft.com/office/powerpoint/2010/main" val="66346232"/>
+      </p:ext>
+    </p:extLst>
+  </p:cSld>
+  <p:clrMapOvr>
+    <a:masterClrMapping/>
+  </p:clrMapOvr>
+</p:sld>
+</file>
+
+<file path=ppt/slides/slide5.xml><?xml version="1.0" encoding="utf-8"?>
+<p:sld xmlns:a="http://schemas.openxmlformats.org/drawingml/2006/main" xmlns:r="http://schemas.openxmlformats.org/officeDocument/2006/relationships" xmlns:p="http://schemas.openxmlformats.org/presentationml/2006/main">
+  <p:cSld>
+    <p:spTree>
+      <p:nvGrpSpPr>
+        <p:cNvPr id="1" name=""/>
+        <p:cNvGrpSpPr/>
+        <p:nvPr/>
+      </p:nvGrpSpPr>
+      <p:grpSpPr>
+        <a:xfrm>
+          <a:off x="0" y="0"/>
+          <a:ext cx="0" cy="0"/>
+          <a:chOff x="0" y="0"/>
+          <a:chExt cx="0" cy="0"/>
+        </a:xfrm>
+      </p:grpSpPr>
+      <p:sp>
+        <p:nvSpPr>
+          <p:cNvPr id="2" name="Titel 1">
+            <a:extLst>
+              <a:ext uri="{FF2B5EF4-FFF2-40B4-BE49-F238E27FC236}">
+                <a16:creationId xmlns:a16="http://schemas.microsoft.com/office/drawing/2014/main" id="{F6E41F0A-2E2D-4FC5-9F43-4600FAEFA395}"/>
+              </a:ext>
+            </a:extLst>
+          </p:cNvPr>
+          <p:cNvSpPr>
+            <a:spLocks noGrp="1"/>
+          </p:cNvSpPr>
+          <p:nvPr>
+            <p:ph type="title"/>
+          </p:nvPr>
+        </p:nvSpPr>
+        <p:spPr/>
+        <p:txBody>
+          <a:bodyPr/>
+          <a:lstStyle/>
+          <a:p>
+            <a:r>
+              <a:rPr lang="de-DE" dirty="0" err="1"/>
+              <a:t>Creating</a:t>
+            </a:r>
+            <a:r>
+              <a:rPr lang="de-DE" dirty="0"/>
+              <a:t> a </a:t>
+            </a:r>
+            <a:r>
+              <a:rPr lang="de-DE" dirty="0" err="1"/>
+              <a:t>repository</a:t>
+            </a:r>
+            <a:endParaRPr lang="de-DE" dirty="0"/>
+          </a:p>
+        </p:txBody>
+      </p:sp>
+      <p:sp>
+        <p:nvSpPr>
+          <p:cNvPr id="4" name="Datumsplatzhalter 3">
+            <a:extLst>
+              <a:ext uri="{FF2B5EF4-FFF2-40B4-BE49-F238E27FC236}">
+                <a16:creationId xmlns:a16="http://schemas.microsoft.com/office/drawing/2014/main" id="{C463F406-173E-488D-A788-00333B5AE97E}"/>
+              </a:ext>
+            </a:extLst>
+          </p:cNvPr>
+          <p:cNvSpPr>
+            <a:spLocks noGrp="1"/>
+          </p:cNvSpPr>
+          <p:nvPr>
+            <p:ph type="dt" sz="half" idx="10"/>
+          </p:nvPr>
+        </p:nvSpPr>
+        <p:spPr/>
+        <p:txBody>
+          <a:bodyPr/>
+          <a:lstStyle/>
+          <a:p>
+            <a:fld id="{7778186D-7CAD-425C-A5EB-B223AE6329F4}" type="datetime1">
+              <a:rPr lang="de-DE" smtClean="0"/>
+              <a:t>13.10.2021</a:t>
+            </a:fld>
+            <a:endParaRPr lang="de-DE" dirty="0"/>
+          </a:p>
+        </p:txBody>
+      </p:sp>
+      <p:sp>
+        <p:nvSpPr>
+          <p:cNvPr id="5" name="Fußzeilenplatzhalter 4">
+            <a:extLst>
+              <a:ext uri="{FF2B5EF4-FFF2-40B4-BE49-F238E27FC236}">
+                <a16:creationId xmlns:a16="http://schemas.microsoft.com/office/drawing/2014/main" id="{F6590142-F7C8-4816-BA0F-F63B394887CE}"/>
+              </a:ext>
+            </a:extLst>
+          </p:cNvPr>
+          <p:cNvSpPr>
+            <a:spLocks noGrp="1"/>
+          </p:cNvSpPr>
+          <p:nvPr>
+            <p:ph type="ftr" sz="quarter" idx="11"/>
+          </p:nvPr>
+        </p:nvSpPr>
+        <p:spPr/>
+        <p:txBody>
+          <a:bodyPr/>
+          <a:lstStyle/>
+          <a:p>
+            <a:r>
+              <a:rPr lang="de-DE" dirty="0"/>
+              <a:t>Moritz Flüchter: TSN Inter-Domain Communication</a:t>
+            </a:r>
+          </a:p>
+        </p:txBody>
+      </p:sp>
+      <p:sp>
+        <p:nvSpPr>
+          <p:cNvPr id="6" name="Foliennummernplatzhalter 5">
+            <a:extLst>
+              <a:ext uri="{FF2B5EF4-FFF2-40B4-BE49-F238E27FC236}">
+                <a16:creationId xmlns:a16="http://schemas.microsoft.com/office/drawing/2014/main" id="{7E703547-174F-44ED-AE14-A037549BC75F}"/>
+              </a:ext>
+            </a:extLst>
+          </p:cNvPr>
+          <p:cNvSpPr>
+            <a:spLocks noGrp="1"/>
+          </p:cNvSpPr>
+          <p:nvPr>
+            <p:ph type="sldNum" sz="quarter" idx="12"/>
+          </p:nvPr>
+        </p:nvSpPr>
+        <p:spPr/>
+        <p:txBody>
+          <a:bodyPr/>
+          <a:lstStyle/>
+          <a:p>
+            <a:fld id="{489ECDB1-2E24-4918-B7B1-E72EEFEDE6FE}" type="slidenum">
+              <a:rPr lang="de-DE" smtClean="0"/>
+              <a:t>5</a:t>
+            </a:fld>
+            <a:endParaRPr lang="de-DE" dirty="0"/>
+          </a:p>
+        </p:txBody>
+      </p:sp>
+      <p:pic>
+        <p:nvPicPr>
+          <p:cNvPr id="8" name="Grafik 7">
+            <a:extLst>
+              <a:ext uri="{FF2B5EF4-FFF2-40B4-BE49-F238E27FC236}">
+                <a16:creationId xmlns:a16="http://schemas.microsoft.com/office/drawing/2014/main" id="{23F91151-91CB-4D4C-B0AE-994FD25E9223}"/>
+              </a:ext>
+            </a:extLst>
+          </p:cNvPr>
+          <p:cNvPicPr>
+            <a:picLocks noChangeAspect="1"/>
+          </p:cNvPicPr>
+          <p:nvPr/>
+        </p:nvPicPr>
+        <p:blipFill>
+          <a:blip r:embed="rId3"/>
+          <a:stretch>
+            <a:fillRect/>
+          </a:stretch>
+        </p:blipFill>
+        <p:spPr>
+          <a:xfrm>
+            <a:off x="2938907" y="1268611"/>
+            <a:ext cx="6097094" cy="4948280"/>
+          </a:xfrm>
+          <a:prstGeom prst="rect">
+            <a:avLst/>
+          </a:prstGeom>
+        </p:spPr>
+      </p:pic>
+    </p:spTree>
+    <p:extLst>
+      <p:ext uri="{BB962C8B-B14F-4D97-AF65-F5344CB8AC3E}">
+        <p14:creationId xmlns:p14="http://schemas.microsoft.com/office/powerpoint/2010/main" val="2325429317"/>
+      </p:ext>
+    </p:extLst>
+  </p:cSld>
+  <p:clrMapOvr>
+    <a:masterClrMapping/>
+  </p:clrMapOvr>
+</p:sld>
+</file>
+
+<file path=ppt/slides/slide6.xml><?xml version="1.0" encoding="utf-8"?>
+<p:sld xmlns:a="http://schemas.openxmlformats.org/drawingml/2006/main" xmlns:r="http://schemas.openxmlformats.org/officeDocument/2006/relationships" xmlns:p="http://schemas.openxmlformats.org/presentationml/2006/main">
+  <p:cSld>
+    <p:spTree>
+      <p:nvGrpSpPr>
+        <p:cNvPr id="1" name=""/>
+        <p:cNvGrpSpPr/>
+        <p:nvPr/>
+      </p:nvGrpSpPr>
+      <p:grpSpPr>
+        <a:xfrm>
+          <a:off x="0" y="0"/>
+          <a:ext cx="0" cy="0"/>
+          <a:chOff x="0" y="0"/>
+          <a:chExt cx="0" cy="0"/>
+        </a:xfrm>
+      </p:grpSpPr>
+      <p:sp>
+        <p:nvSpPr>
+          <p:cNvPr id="2" name="Titel 1">
+            <a:extLst>
+              <a:ext uri="{FF2B5EF4-FFF2-40B4-BE49-F238E27FC236}">
+                <a16:creationId xmlns:a16="http://schemas.microsoft.com/office/drawing/2014/main" id="{F6E41F0A-2E2D-4FC5-9F43-4600FAEFA395}"/>
+              </a:ext>
+            </a:extLst>
+          </p:cNvPr>
+          <p:cNvSpPr>
+            <a:spLocks noGrp="1"/>
+          </p:cNvSpPr>
+          <p:nvPr>
+            <p:ph type="title"/>
+          </p:nvPr>
+        </p:nvSpPr>
+        <p:spPr/>
+        <p:txBody>
+          <a:bodyPr/>
+          <a:lstStyle/>
+          <a:p>
+            <a:r>
+              <a:rPr lang="de-DE" dirty="0" err="1"/>
+              <a:t>Creating</a:t>
+            </a:r>
+            <a:r>
+              <a:rPr lang="de-DE" dirty="0"/>
+              <a:t> a </a:t>
+            </a:r>
+            <a:r>
+              <a:rPr lang="de-DE" dirty="0" err="1"/>
+              <a:t>repository</a:t>
+            </a:r>
+            <a:r>
+              <a:rPr lang="de-DE" dirty="0"/>
+              <a:t> – </a:t>
+            </a:r>
+            <a:r>
+              <a:rPr lang="de-DE" dirty="0" err="1"/>
+              <a:t>Adding</a:t>
+            </a:r>
+            <a:r>
+              <a:rPr lang="de-DE" dirty="0"/>
+              <a:t> People</a:t>
+            </a:r>
+          </a:p>
+        </p:txBody>
+      </p:sp>
+      <p:sp>
+        <p:nvSpPr>
+          <p:cNvPr id="4" name="Datumsplatzhalter 3">
+            <a:extLst>
+              <a:ext uri="{FF2B5EF4-FFF2-40B4-BE49-F238E27FC236}">
+                <a16:creationId xmlns:a16="http://schemas.microsoft.com/office/drawing/2014/main" id="{C463F406-173E-488D-A788-00333B5AE97E}"/>
+              </a:ext>
+            </a:extLst>
+          </p:cNvPr>
+          <p:cNvSpPr>
+            <a:spLocks noGrp="1"/>
+          </p:cNvSpPr>
+          <p:nvPr>
+            <p:ph type="dt" sz="half" idx="10"/>
+          </p:nvPr>
+        </p:nvSpPr>
+        <p:spPr/>
+        <p:txBody>
+          <a:bodyPr/>
+          <a:lstStyle/>
+          <a:p>
+            <a:fld id="{7778186D-7CAD-425C-A5EB-B223AE6329F4}" type="datetime1">
+              <a:rPr lang="de-DE" smtClean="0"/>
+              <a:t>13.10.2021</a:t>
+            </a:fld>
+            <a:endParaRPr lang="de-DE" dirty="0"/>
+          </a:p>
+        </p:txBody>
+      </p:sp>
+      <p:sp>
+        <p:nvSpPr>
+          <p:cNvPr id="5" name="Fußzeilenplatzhalter 4">
+            <a:extLst>
+              <a:ext uri="{FF2B5EF4-FFF2-40B4-BE49-F238E27FC236}">
+                <a16:creationId xmlns:a16="http://schemas.microsoft.com/office/drawing/2014/main" id="{F6590142-F7C8-4816-BA0F-F63B394887CE}"/>
+              </a:ext>
+            </a:extLst>
+          </p:cNvPr>
+          <p:cNvSpPr>
+            <a:spLocks noGrp="1"/>
+          </p:cNvSpPr>
+          <p:nvPr>
+            <p:ph type="ftr" sz="quarter" idx="11"/>
+          </p:nvPr>
+        </p:nvSpPr>
+        <p:spPr/>
+        <p:txBody>
+          <a:bodyPr/>
+          <a:lstStyle/>
+          <a:p>
+            <a:r>
+              <a:rPr lang="de-DE" dirty="0"/>
+              <a:t>Moritz Flüchter: TSN Inter-Domain Communication</a:t>
+            </a:r>
+          </a:p>
+        </p:txBody>
+      </p:sp>
+      <p:sp>
+        <p:nvSpPr>
+          <p:cNvPr id="6" name="Foliennummernplatzhalter 5">
+            <a:extLst>
+              <a:ext uri="{FF2B5EF4-FFF2-40B4-BE49-F238E27FC236}">
+                <a16:creationId xmlns:a16="http://schemas.microsoft.com/office/drawing/2014/main" id="{7E703547-174F-44ED-AE14-A037549BC75F}"/>
+              </a:ext>
+            </a:extLst>
+          </p:cNvPr>
+          <p:cNvSpPr>
+            <a:spLocks noGrp="1"/>
+          </p:cNvSpPr>
+          <p:nvPr>
+            <p:ph type="sldNum" sz="quarter" idx="12"/>
+          </p:nvPr>
+        </p:nvSpPr>
+        <p:spPr/>
+        <p:txBody>
+          <a:bodyPr/>
+          <a:lstStyle/>
+          <a:p>
+            <a:fld id="{489ECDB1-2E24-4918-B7B1-E72EEFEDE6FE}" type="slidenum">
+              <a:rPr lang="de-DE" smtClean="0"/>
+              <a:t>6</a:t>
+            </a:fld>
+            <a:endParaRPr lang="de-DE" dirty="0"/>
+          </a:p>
+        </p:txBody>
+      </p:sp>
+      <p:pic>
+        <p:nvPicPr>
+          <p:cNvPr id="7" name="Grafik 6">
+            <a:extLst>
+              <a:ext uri="{FF2B5EF4-FFF2-40B4-BE49-F238E27FC236}">
+                <a16:creationId xmlns:a16="http://schemas.microsoft.com/office/drawing/2014/main" id="{57CBA999-B05E-4239-B98D-B2D696911AA8}"/>
+              </a:ext>
+            </a:extLst>
+          </p:cNvPr>
+          <p:cNvPicPr>
+            <a:picLocks noChangeAspect="1"/>
+          </p:cNvPicPr>
+          <p:nvPr/>
+        </p:nvPicPr>
+        <p:blipFill>
+          <a:blip r:embed="rId3"/>
+          <a:stretch>
+            <a:fillRect/>
+          </a:stretch>
+        </p:blipFill>
+        <p:spPr>
+          <a:xfrm>
+            <a:off x="2472384" y="1348137"/>
+            <a:ext cx="7247231" cy="4789229"/>
+          </a:xfrm>
+          <a:prstGeom prst="rect">
+            <a:avLst/>
+          </a:prstGeom>
+        </p:spPr>
+      </p:pic>
+    </p:spTree>
+    <p:extLst>
+      <p:ext uri="{BB962C8B-B14F-4D97-AF65-F5344CB8AC3E}">
+        <p14:creationId xmlns:p14="http://schemas.microsoft.com/office/powerpoint/2010/main" val="4116014007"/>
+      </p:ext>
+    </p:extLst>
+  </p:cSld>
+  <p:clrMapOvr>
+    <a:masterClrMapping/>
+  </p:clrMapOvr>
+</p:sld>
+</file>
+
+<file path=ppt/slides/slide7.xml><?xml version="1.0" encoding="utf-8"?>
+<p:sld xmlns:a="http://schemas.openxmlformats.org/drawingml/2006/main" xmlns:r="http://schemas.openxmlformats.org/officeDocument/2006/relationships" xmlns:p="http://schemas.openxmlformats.org/presentationml/2006/main">
+  <p:cSld>
+    <p:spTree>
+      <p:nvGrpSpPr>
+        <p:cNvPr id="1" name=""/>
+        <p:cNvGrpSpPr/>
+        <p:nvPr/>
+      </p:nvGrpSpPr>
+      <p:grpSpPr>
+        <a:xfrm>
+          <a:off x="0" y="0"/>
+          <a:ext cx="0" cy="0"/>
+          <a:chOff x="0" y="0"/>
+          <a:chExt cx="0" cy="0"/>
+        </a:xfrm>
+      </p:grpSpPr>
+      <p:sp>
+        <p:nvSpPr>
+          <p:cNvPr id="2" name="Titel 1">
+            <a:extLst>
+              <a:ext uri="{FF2B5EF4-FFF2-40B4-BE49-F238E27FC236}">
+                <a16:creationId xmlns:a16="http://schemas.microsoft.com/office/drawing/2014/main" id="{F6E41F0A-2E2D-4FC5-9F43-4600FAEFA395}"/>
+              </a:ext>
+            </a:extLst>
+          </p:cNvPr>
+          <p:cNvSpPr>
+            <a:spLocks noGrp="1"/>
+          </p:cNvSpPr>
+          <p:nvPr>
+            <p:ph type="title"/>
+          </p:nvPr>
+        </p:nvSpPr>
+        <p:spPr/>
+        <p:txBody>
+          <a:bodyPr/>
+          <a:lstStyle/>
+          <a:p>
+            <a:r>
+              <a:rPr lang="de-DE" dirty="0"/>
+              <a:t>Content</a:t>
+            </a:r>
+          </a:p>
+        </p:txBody>
+      </p:sp>
+      <p:sp>
+        <p:nvSpPr>
+          <p:cNvPr id="3" name="Inhaltsplatzhalter 2">
+            <a:extLst>
+              <a:ext uri="{FF2B5EF4-FFF2-40B4-BE49-F238E27FC236}">
+                <a16:creationId xmlns:a16="http://schemas.microsoft.com/office/drawing/2014/main" id="{EAC75DC9-155E-4132-B159-673C386F5A43}"/>
+              </a:ext>
+            </a:extLst>
+          </p:cNvPr>
+          <p:cNvSpPr>
+            <a:spLocks noGrp="1"/>
+          </p:cNvSpPr>
+          <p:nvPr>
+            <p:ph idx="1"/>
+          </p:nvPr>
+        </p:nvSpPr>
+        <p:spPr>
+          <a:xfrm>
+            <a:off x="1097279" y="1845734"/>
+            <a:ext cx="9966959" cy="4023360"/>
+          </a:xfrm>
+        </p:spPr>
+        <p:txBody>
+          <a:bodyPr/>
+          <a:lstStyle/>
+          <a:p>
+            <a:pPr>
+              <a:buFont typeface="Arial" panose="020B0604020202020204" pitchFamily="34" charset="0"/>
+              <a:buChar char="•"/>
+            </a:pPr>
+            <a:r>
+              <a:rPr lang="de-DE" dirty="0"/>
+              <a:t>Was </a:t>
+            </a:r>
+            <a:r>
+              <a:rPr lang="de-DE" dirty="0" err="1"/>
+              <a:t>Git</a:t>
+            </a:r>
+            <a:r>
+              <a:rPr lang="de-DE" dirty="0"/>
+              <a:t> nicht macht: automatisch nach </a:t>
+            </a:r>
+            <a:r>
+              <a:rPr lang="de-DE" dirty="0" err="1"/>
+              <a:t>updates</a:t>
+            </a:r>
+            <a:r>
+              <a:rPr lang="de-DE" dirty="0"/>
+              <a:t> checken im </a:t>
+            </a:r>
+            <a:r>
+              <a:rPr lang="de-DE" dirty="0" err="1"/>
+              <a:t>repository</a:t>
+            </a:r>
+            <a:r>
+              <a:rPr lang="de-DE" dirty="0"/>
+              <a:t>, immer erst </a:t>
+            </a:r>
+            <a:r>
+              <a:rPr lang="de-DE" dirty="0" err="1"/>
+              <a:t>git</a:t>
+            </a:r>
+            <a:r>
+              <a:rPr lang="de-DE" dirty="0"/>
+              <a:t> pullen</a:t>
+            </a:r>
+          </a:p>
+        </p:txBody>
+      </p:sp>
+      <p:sp>
+        <p:nvSpPr>
+          <p:cNvPr id="4" name="Datumsplatzhalter 3">
+            <a:extLst>
+              <a:ext uri="{FF2B5EF4-FFF2-40B4-BE49-F238E27FC236}">
+                <a16:creationId xmlns:a16="http://schemas.microsoft.com/office/drawing/2014/main" id="{C463F406-173E-488D-A788-00333B5AE97E}"/>
+              </a:ext>
+            </a:extLst>
+          </p:cNvPr>
+          <p:cNvSpPr>
+            <a:spLocks noGrp="1"/>
+          </p:cNvSpPr>
+          <p:nvPr>
+            <p:ph type="dt" sz="half" idx="10"/>
+          </p:nvPr>
+        </p:nvSpPr>
+        <p:spPr/>
+        <p:txBody>
+          <a:bodyPr/>
+          <a:lstStyle/>
+          <a:p>
+            <a:fld id="{7778186D-7CAD-425C-A5EB-B223AE6329F4}" type="datetime1">
+              <a:rPr lang="de-DE" smtClean="0"/>
+              <a:t>13.10.2021</a:t>
+            </a:fld>
+            <a:endParaRPr lang="de-DE" dirty="0"/>
+          </a:p>
+        </p:txBody>
+      </p:sp>
+      <p:sp>
+        <p:nvSpPr>
+          <p:cNvPr id="5" name="Fußzeilenplatzhalter 4">
+            <a:extLst>
+              <a:ext uri="{FF2B5EF4-FFF2-40B4-BE49-F238E27FC236}">
+                <a16:creationId xmlns:a16="http://schemas.microsoft.com/office/drawing/2014/main" id="{F6590142-F7C8-4816-BA0F-F63B394887CE}"/>
+              </a:ext>
+            </a:extLst>
+          </p:cNvPr>
+          <p:cNvSpPr>
+            <a:spLocks noGrp="1"/>
+          </p:cNvSpPr>
+          <p:nvPr>
+            <p:ph type="ftr" sz="quarter" idx="11"/>
+          </p:nvPr>
+        </p:nvSpPr>
+        <p:spPr/>
+        <p:txBody>
+          <a:bodyPr/>
+          <a:lstStyle/>
+          <a:p>
+            <a:r>
+              <a:rPr lang="de-DE" dirty="0"/>
+              <a:t>Moritz Flüchter: TSN Inter-Domain Communication</a:t>
+            </a:r>
+          </a:p>
+        </p:txBody>
+      </p:sp>
+      <p:sp>
+        <p:nvSpPr>
+          <p:cNvPr id="6" name="Foliennummernplatzhalter 5">
+            <a:extLst>
+              <a:ext uri="{FF2B5EF4-FFF2-40B4-BE49-F238E27FC236}">
+                <a16:creationId xmlns:a16="http://schemas.microsoft.com/office/drawing/2014/main" id="{7E703547-174F-44ED-AE14-A037549BC75F}"/>
+              </a:ext>
+            </a:extLst>
+          </p:cNvPr>
+          <p:cNvSpPr>
+            <a:spLocks noGrp="1"/>
+          </p:cNvSpPr>
+          <p:nvPr>
+            <p:ph type="sldNum" sz="quarter" idx="12"/>
+          </p:nvPr>
+        </p:nvSpPr>
+        <p:spPr/>
+        <p:txBody>
+          <a:bodyPr/>
+          <a:lstStyle/>
+          <a:p>
+            <a:fld id="{489ECDB1-2E24-4918-B7B1-E72EEFEDE6FE}" type="slidenum">
+              <a:rPr lang="de-DE" smtClean="0"/>
+              <a:t>7</a:t>
+            </a:fld>
+            <a:endParaRPr lang="de-DE" dirty="0"/>
+          </a:p>
+        </p:txBody>
+      </p:sp>
+      <p:sp>
+        <p:nvSpPr>
+          <p:cNvPr id="9" name="Textplatzhalter 2">
+            <a:extLst>
+              <a:ext uri="{FF2B5EF4-FFF2-40B4-BE49-F238E27FC236}">
+                <a16:creationId xmlns:a16="http://schemas.microsoft.com/office/drawing/2014/main" id="{2BBB3040-5284-4B4F-A563-7C876497D4D0}"/>
+              </a:ext>
+            </a:extLst>
+          </p:cNvPr>
+          <p:cNvSpPr txBox="1">
+            <a:spLocks/>
+          </p:cNvSpPr>
+          <p:nvPr/>
+        </p:nvSpPr>
+        <p:spPr>
+          <a:xfrm>
+            <a:off x="1008638" y="1293840"/>
+            <a:ext cx="9847621" cy="736282"/>
+          </a:xfrm>
+          <a:prstGeom prst="rect">
+            <a:avLst/>
+          </a:prstGeom>
+        </p:spPr>
+        <p:txBody>
+          <a:bodyPr vert="horz" lIns="91440" tIns="45720" rIns="91440" bIns="45720" rtlCol="0" anchor="ctr">
+            <a:normAutofit/>
+          </a:bodyPr>
+          <a:lstStyle>
+            <a:lvl1pPr marL="0" indent="0" algn="l" defTabSz="914400" rtl="0" eaLnBrk="1" latinLnBrk="0" hangingPunct="1">
+              <a:lnSpc>
+                <a:spcPct val="90000"/>
+              </a:lnSpc>
+              <a:spcBef>
+                <a:spcPts val="1200"/>
+              </a:spcBef>
+              <a:spcAft>
+                <a:spcPts val="200"/>
+              </a:spcAft>
+              <a:buClr>
+                <a:schemeClr val="accent1"/>
+              </a:buClr>
+              <a:buSzPct val="100000"/>
+              <a:buFont typeface="Calibri" panose="020F0502020204030204" pitchFamily="34" charset="0"/>
+              <a:buNone/>
+              <a:defRPr sz="2000" b="0" kern="1200" cap="all" baseline="0">
+                <a:solidFill>
+                  <a:schemeClr val="tx2"/>
+                </a:solidFill>
+                <a:latin typeface="Arial" panose="020B0604020202020204" pitchFamily="34" charset="0"/>
+                <a:ea typeface="+mn-ea"/>
+                <a:cs typeface="Arial" panose="020B0604020202020204" pitchFamily="34" charset="0"/>
+              </a:defRPr>
+            </a:lvl1pPr>
+            <a:lvl2pPr marL="457200" indent="0" algn="l" defTabSz="914400" rtl="0" eaLnBrk="1" latinLnBrk="0" hangingPunct="1">
+              <a:lnSpc>
+                <a:spcPct val="90000"/>
+              </a:lnSpc>
+              <a:spcBef>
+                <a:spcPts val="200"/>
+              </a:spcBef>
+              <a:spcAft>
+                <a:spcPts val="400"/>
+              </a:spcAft>
+              <a:buClr>
+                <a:schemeClr val="accent1"/>
+              </a:buClr>
+              <a:buFont typeface="Calibri" pitchFamily="34" charset="0"/>
+              <a:buNone/>
+              <a:defRPr sz="2000" b="1" kern="1200">
+                <a:solidFill>
+                  <a:schemeClr val="tx1">
+                    <a:lumMod val="75000"/>
+                    <a:lumOff val="25000"/>
+                  </a:schemeClr>
+                </a:solidFill>
+                <a:latin typeface="Arial" panose="020B0604020202020204" pitchFamily="34" charset="0"/>
+                <a:ea typeface="+mn-ea"/>
+                <a:cs typeface="Arial" panose="020B0604020202020204" pitchFamily="34" charset="0"/>
+              </a:defRPr>
+            </a:lvl2pPr>
+            <a:lvl3pPr marL="914400" indent="0" algn="l" defTabSz="914400" rtl="0" eaLnBrk="1" latinLnBrk="0" hangingPunct="1">
+              <a:lnSpc>
+                <a:spcPct val="90000"/>
+              </a:lnSpc>
+              <a:spcBef>
+                <a:spcPts val="200"/>
+              </a:spcBef>
+              <a:spcAft>
+                <a:spcPts val="400"/>
+              </a:spcAft>
+              <a:buClr>
+                <a:schemeClr val="accent1"/>
+              </a:buClr>
+              <a:buFont typeface="Calibri" pitchFamily="34" charset="0"/>
+              <a:buNone/>
+              <a:defRPr sz="1800" b="1" kern="1200">
+                <a:solidFill>
+                  <a:schemeClr val="tx1">
+                    <a:lumMod val="75000"/>
+                    <a:lumOff val="25000"/>
+                  </a:schemeClr>
+                </a:solidFill>
+                <a:latin typeface="Arial" panose="020B0604020202020204" pitchFamily="34" charset="0"/>
+                <a:ea typeface="+mn-ea"/>
+                <a:cs typeface="Arial" panose="020B0604020202020204" pitchFamily="34" charset="0"/>
+              </a:defRPr>
+            </a:lvl3pPr>
+            <a:lvl4pPr marL="1371600" indent="0" algn="l" defTabSz="914400" rtl="0" eaLnBrk="1" latinLnBrk="0" hangingPunct="1">
+              <a:lnSpc>
+                <a:spcPct val="90000"/>
+              </a:lnSpc>
+              <a:spcBef>
+                <a:spcPts val="200"/>
+              </a:spcBef>
+              <a:spcAft>
+                <a:spcPts val="400"/>
+              </a:spcAft>
+              <a:buClr>
+                <a:schemeClr val="accent1"/>
+              </a:buClr>
+              <a:buFont typeface="Calibri" pitchFamily="34" charset="0"/>
+              <a:buNone/>
+              <a:defRPr sz="1600" b="1" kern="1200">
+                <a:solidFill>
+                  <a:schemeClr val="tx1">
+                    <a:lumMod val="75000"/>
+                    <a:lumOff val="25000"/>
+                  </a:schemeClr>
+                </a:solidFill>
+                <a:latin typeface="Arial" panose="020B0604020202020204" pitchFamily="34" charset="0"/>
+                <a:ea typeface="+mn-ea"/>
+                <a:cs typeface="Arial" panose="020B0604020202020204" pitchFamily="34" charset="0"/>
+              </a:defRPr>
+            </a:lvl4pPr>
+            <a:lvl5pPr marL="1828800" indent="0" algn="l" defTabSz="914400" rtl="0" eaLnBrk="1" latinLnBrk="0" hangingPunct="1">
+              <a:lnSpc>
+                <a:spcPct val="90000"/>
+              </a:lnSpc>
+              <a:spcBef>
+                <a:spcPts val="200"/>
+              </a:spcBef>
+              <a:spcAft>
+                <a:spcPts val="400"/>
+              </a:spcAft>
+              <a:buClr>
+                <a:schemeClr val="accent1"/>
+              </a:buClr>
+              <a:buFont typeface="Calibri" pitchFamily="34" charset="0"/>
+              <a:buNone/>
+              <a:defRPr sz="1600" b="1" kern="1200">
+                <a:solidFill>
+                  <a:schemeClr val="tx1">
+                    <a:lumMod val="75000"/>
+                    <a:lumOff val="25000"/>
+                  </a:schemeClr>
+                </a:solidFill>
+                <a:latin typeface="Arial" panose="020B0604020202020204" pitchFamily="34" charset="0"/>
+                <a:ea typeface="+mn-ea"/>
+                <a:cs typeface="Arial" panose="020B0604020202020204" pitchFamily="34" charset="0"/>
+              </a:defRPr>
+            </a:lvl5pPr>
+            <a:lvl6pPr marL="2286000" indent="0" algn="l" defTabSz="914400" rtl="0" eaLnBrk="1" latinLnBrk="0" hangingPunct="1">
+              <a:lnSpc>
+                <a:spcPct val="90000"/>
+              </a:lnSpc>
+              <a:spcBef>
+                <a:spcPts val="200"/>
+              </a:spcBef>
+              <a:spcAft>
+                <a:spcPts val="400"/>
+              </a:spcAft>
+              <a:buClr>
+                <a:schemeClr val="accent1"/>
+              </a:buClr>
+              <a:buFont typeface="Calibri" pitchFamily="34" charset="0"/>
+              <a:buNone/>
+              <a:defRPr sz="1600" b="1" kern="1200">
+                <a:solidFill>
+                  <a:schemeClr val="tx1">
+                    <a:lumMod val="75000"/>
+                    <a:lumOff val="25000"/>
+                  </a:schemeClr>
+                </a:solidFill>
+                <a:latin typeface="+mn-lt"/>
+                <a:ea typeface="+mn-ea"/>
+                <a:cs typeface="+mn-cs"/>
+              </a:defRPr>
+            </a:lvl6pPr>
+            <a:lvl7pPr marL="2743200" indent="0" algn="l" defTabSz="914400" rtl="0" eaLnBrk="1" latinLnBrk="0" hangingPunct="1">
+              <a:lnSpc>
+                <a:spcPct val="90000"/>
+              </a:lnSpc>
+              <a:spcBef>
+                <a:spcPts val="200"/>
+              </a:spcBef>
+              <a:spcAft>
+                <a:spcPts val="400"/>
+              </a:spcAft>
+              <a:buClr>
+                <a:schemeClr val="accent1"/>
+              </a:buClr>
+              <a:buFont typeface="Calibri" pitchFamily="34" charset="0"/>
+              <a:buNone/>
+              <a:defRPr sz="1600" b="1" kern="1200">
+                <a:solidFill>
+                  <a:schemeClr val="tx1">
+                    <a:lumMod val="75000"/>
+                    <a:lumOff val="25000"/>
+                  </a:schemeClr>
+                </a:solidFill>
+                <a:latin typeface="+mn-lt"/>
+                <a:ea typeface="+mn-ea"/>
+                <a:cs typeface="+mn-cs"/>
+              </a:defRPr>
+            </a:lvl7pPr>
+            <a:lvl8pPr marL="3200400" indent="0" algn="l" defTabSz="914400" rtl="0" eaLnBrk="1" latinLnBrk="0" hangingPunct="1">
+              <a:lnSpc>
+                <a:spcPct val="90000"/>
+              </a:lnSpc>
+              <a:spcBef>
+                <a:spcPts val="200"/>
+              </a:spcBef>
+              <a:spcAft>
+                <a:spcPts val="400"/>
+              </a:spcAft>
+              <a:buClr>
+                <a:schemeClr val="accent1"/>
+              </a:buClr>
+              <a:buFont typeface="Calibri" pitchFamily="34" charset="0"/>
+              <a:buNone/>
+              <a:defRPr sz="1600" b="1" kern="1200">
+                <a:solidFill>
+                  <a:schemeClr val="tx1">
+                    <a:lumMod val="75000"/>
+                    <a:lumOff val="25000"/>
+                  </a:schemeClr>
+                </a:solidFill>
+                <a:latin typeface="+mn-lt"/>
+                <a:ea typeface="+mn-ea"/>
+                <a:cs typeface="+mn-cs"/>
+              </a:defRPr>
+            </a:lvl8pPr>
+            <a:lvl9pPr marL="3657600" indent="0" algn="l" defTabSz="914400" rtl="0" eaLnBrk="1" latinLnBrk="0" hangingPunct="1">
+              <a:lnSpc>
+                <a:spcPct val="90000"/>
+              </a:lnSpc>
+              <a:spcBef>
+                <a:spcPts val="200"/>
+              </a:spcBef>
+              <a:spcAft>
+                <a:spcPts val="400"/>
+              </a:spcAft>
+              <a:buClr>
+                <a:schemeClr val="accent1"/>
+              </a:buClr>
+              <a:buFont typeface="Calibri" pitchFamily="34" charset="0"/>
+              <a:buNone/>
+              <a:defRPr sz="1600" b="1" kern="1200">
+                <a:solidFill>
+                  <a:schemeClr val="tx1">
+                    <a:lumMod val="75000"/>
+                    <a:lumOff val="25000"/>
+                  </a:schemeClr>
+                </a:solidFill>
+                <a:latin typeface="+mn-lt"/>
+                <a:ea typeface="+mn-ea"/>
+                <a:cs typeface="+mn-cs"/>
+              </a:defRPr>
+            </a:lvl9pPr>
+          </a:lstStyle>
+          <a:p>
+            <a:endParaRPr lang="de-DE" sz="1900" dirty="0"/>
+          </a:p>
+        </p:txBody>
+      </p:sp>
+    </p:spTree>
+    <p:extLst>
+      <p:ext uri="{BB962C8B-B14F-4D97-AF65-F5344CB8AC3E}">
+        <p14:creationId xmlns:p14="http://schemas.microsoft.com/office/powerpoint/2010/main" val="4272137799"/>
+      </p:ext>
+    </p:extLst>
+  </p:cSld>
+  <p:clrMapOvr>
+    <a:masterClrMapping/>
+  </p:clrMapOvr>
+</p:sld>
+</file>
+
+<file path=ppt/slides/slide8.xml><?xml version="1.0" encoding="utf-8"?>
+<p:sld xmlns:a="http://schemas.openxmlformats.org/drawingml/2006/main" xmlns:r="http://schemas.openxmlformats.org/officeDocument/2006/relationships" xmlns:p="http://schemas.openxmlformats.org/presentationml/2006/main">
+  <p:cSld>
+    <p:spTree>
+      <p:nvGrpSpPr>
+        <p:cNvPr id="1" name=""/>
+        <p:cNvGrpSpPr/>
+        <p:nvPr/>
+      </p:nvGrpSpPr>
+      <p:grpSpPr>
+        <a:xfrm>
+          <a:off x="0" y="0"/>
+          <a:ext cx="0" cy="0"/>
+          <a:chOff x="0" y="0"/>
+          <a:chExt cx="0" cy="0"/>
+        </a:xfrm>
+      </p:grpSpPr>
+      <p:sp>
+        <p:nvSpPr>
+          <p:cNvPr id="2" name="Titel 1">
+            <a:extLst>
+              <a:ext uri="{FF2B5EF4-FFF2-40B4-BE49-F238E27FC236}">
+                <a16:creationId xmlns:a16="http://schemas.microsoft.com/office/drawing/2014/main" id="{5F8A6C4C-5005-43BF-B52C-8639917F24D1}"/>
+              </a:ext>
+            </a:extLst>
+          </p:cNvPr>
+          <p:cNvSpPr>
+            <a:spLocks noGrp="1"/>
+          </p:cNvSpPr>
+          <p:nvPr>
+            <p:ph type="title"/>
+          </p:nvPr>
+        </p:nvSpPr>
+        <p:spPr>
+          <a:xfrm>
+            <a:off x="1003974" y="338126"/>
+            <a:ext cx="9884851" cy="736282"/>
+          </a:xfrm>
+        </p:spPr>
+        <p:txBody>
+          <a:bodyPr/>
+          <a:lstStyle/>
+          <a:p>
+            <a:r>
+              <a:rPr lang="de-DE" dirty="0"/>
+              <a:t>COMPARISON/2 TOPICS</a:t>
+            </a:r>
+          </a:p>
+        </p:txBody>
+      </p:sp>
+      <p:sp>
+        <p:nvSpPr>
+          <p:cNvPr id="3" name="Textplatzhalter 2">
+            <a:extLst>
+              <a:ext uri="{FF2B5EF4-FFF2-40B4-BE49-F238E27FC236}">
+                <a16:creationId xmlns:a16="http://schemas.microsoft.com/office/drawing/2014/main" id="{809E70C0-7FCB-44E6-8A9B-F561F11FC7E4}"/>
+              </a:ext>
+            </a:extLst>
+          </p:cNvPr>
+          <p:cNvSpPr>
+            <a:spLocks noGrp="1"/>
+          </p:cNvSpPr>
+          <p:nvPr>
+            <p:ph type="body" idx="1"/>
+          </p:nvPr>
+        </p:nvSpPr>
+        <p:spPr>
+          <a:xfrm>
+            <a:off x="1008639" y="1293840"/>
+            <a:ext cx="4937760" cy="736282"/>
+          </a:xfrm>
+        </p:spPr>
+        <p:txBody>
+          <a:bodyPr>
+            <a:normAutofit/>
+          </a:bodyPr>
+          <a:lstStyle/>
+          <a:p>
+            <a:r>
+              <a:rPr lang="de-DE" dirty="0"/>
+              <a:t>HEADING 1</a:t>
+            </a:r>
+          </a:p>
+        </p:txBody>
+      </p:sp>
+      <p:sp>
+        <p:nvSpPr>
+          <p:cNvPr id="5" name="Textplatzhalter 4">
+            <a:extLst>
+              <a:ext uri="{FF2B5EF4-FFF2-40B4-BE49-F238E27FC236}">
+                <a16:creationId xmlns:a16="http://schemas.microsoft.com/office/drawing/2014/main" id="{90EAE032-6D39-4260-BF6C-BF0851DFD401}"/>
+              </a:ext>
+            </a:extLst>
+          </p:cNvPr>
+          <p:cNvSpPr>
+            <a:spLocks noGrp="1"/>
+          </p:cNvSpPr>
+          <p:nvPr>
+            <p:ph type="body" sz="quarter" idx="3"/>
+          </p:nvPr>
+        </p:nvSpPr>
+        <p:spPr>
+          <a:xfrm>
+            <a:off x="6245603" y="1293840"/>
+            <a:ext cx="4937760" cy="736282"/>
+          </a:xfrm>
+        </p:spPr>
+        <p:txBody>
+          <a:bodyPr>
+            <a:normAutofit/>
+          </a:bodyPr>
+          <a:lstStyle/>
+          <a:p>
+            <a:r>
+              <a:rPr lang="de-DE" dirty="0"/>
+              <a:t>HEADING 2</a:t>
+            </a:r>
+          </a:p>
+        </p:txBody>
+      </p:sp>
+      <p:pic>
+        <p:nvPicPr>
+          <p:cNvPr id="10" name="Inhaltsplatzhalter 7" descr="Ein Bild, das Text enthält.&#10;&#10;Automatisch generierte Beschreibung">
+            <a:extLst>
+              <a:ext uri="{FF2B5EF4-FFF2-40B4-BE49-F238E27FC236}">
+                <a16:creationId xmlns:a16="http://schemas.microsoft.com/office/drawing/2014/main" id="{FE3CEE7C-419A-490A-AE05-86C0B5B5B783}"/>
+              </a:ext>
+            </a:extLst>
+          </p:cNvPr>
+          <p:cNvPicPr>
+            <a:picLocks noGrp="1" noChangeAspect="1"/>
+          </p:cNvPicPr>
+          <p:nvPr>
+            <p:ph sz="quarter" idx="4"/>
+          </p:nvPr>
+        </p:nvPicPr>
+        <p:blipFill>
+          <a:blip r:embed="rId2">
+            <a:extLst>
+              <a:ext uri="{28A0092B-C50C-407E-A947-70E740481C1C}">
+                <a14:useLocalDpi xmlns:a14="http://schemas.microsoft.com/office/drawing/2010/main" val="0"/>
+              </a:ext>
+            </a:extLst>
+          </a:blip>
+          <a:stretch>
+            <a:fillRect/>
+          </a:stretch>
+        </p:blipFill>
+        <p:spPr>
+          <a:xfrm>
+            <a:off x="1003974" y="2249554"/>
+            <a:ext cx="4476523" cy="2207317"/>
+          </a:xfrm>
+        </p:spPr>
+      </p:pic>
+      <p:pic>
+        <p:nvPicPr>
+          <p:cNvPr id="11" name="Inhaltsplatzhalter 7" descr="Ein Bild, das Text enthält.&#10;&#10;Automatisch generierte Beschreibung">
+            <a:extLst>
+              <a:ext uri="{FF2B5EF4-FFF2-40B4-BE49-F238E27FC236}">
+                <a16:creationId xmlns:a16="http://schemas.microsoft.com/office/drawing/2014/main" id="{863C98F9-71A0-456B-BEA5-746B323D4082}"/>
+              </a:ext>
+            </a:extLst>
+          </p:cNvPr>
+          <p:cNvPicPr>
+            <a:picLocks noChangeAspect="1"/>
+          </p:cNvPicPr>
+          <p:nvPr/>
+        </p:nvPicPr>
+        <p:blipFill>
+          <a:blip r:embed="rId3">
+            <a:extLst>
+              <a:ext uri="{28A0092B-C50C-407E-A947-70E740481C1C}">
+                <a14:useLocalDpi xmlns:a14="http://schemas.microsoft.com/office/drawing/2010/main" val="0"/>
+              </a:ext>
+            </a:extLst>
+          </a:blip>
+          <a:stretch>
+            <a:fillRect/>
+          </a:stretch>
+        </p:blipFill>
+        <p:spPr>
+          <a:xfrm>
+            <a:off x="6412302" y="3001315"/>
+            <a:ext cx="4476523" cy="1455556"/>
+          </a:xfrm>
+          <a:prstGeom prst="rect">
+            <a:avLst/>
+          </a:prstGeom>
+        </p:spPr>
+      </p:pic>
+      <p:sp>
+        <p:nvSpPr>
+          <p:cNvPr id="7" name="Textfeld 6">
+            <a:extLst>
+              <a:ext uri="{FF2B5EF4-FFF2-40B4-BE49-F238E27FC236}">
+                <a16:creationId xmlns:a16="http://schemas.microsoft.com/office/drawing/2014/main" id="{907B3982-B6BC-4AD8-90D6-86D5E56BD33A}"/>
+              </a:ext>
+            </a:extLst>
+          </p:cNvPr>
+          <p:cNvSpPr txBox="1"/>
+          <p:nvPr/>
+        </p:nvSpPr>
+        <p:spPr>
+          <a:xfrm>
+            <a:off x="1003974" y="5052060"/>
+            <a:ext cx="4476523" cy="369332"/>
+          </a:xfrm>
+          <a:prstGeom prst="rect">
+            <a:avLst/>
+          </a:prstGeom>
+          <a:noFill/>
+        </p:spPr>
+        <p:txBody>
+          <a:bodyPr wrap="square" rtlCol="0">
+            <a:spAutoFit/>
+          </a:bodyPr>
+          <a:lstStyle/>
+          <a:p>
+            <a:r>
+              <a:rPr lang="de-DE" dirty="0">
+                <a:latin typeface="Arial" panose="020B0604020202020204" pitchFamily="34" charset="0"/>
+                <a:cs typeface="Arial" panose="020B0604020202020204" pitchFamily="34" charset="0"/>
+              </a:rPr>
+              <a:t>TEXT</a:t>
+            </a:r>
+          </a:p>
+        </p:txBody>
+      </p:sp>
+      <p:sp>
+        <p:nvSpPr>
+          <p:cNvPr id="8" name="Textfeld 7">
+            <a:extLst>
+              <a:ext uri="{FF2B5EF4-FFF2-40B4-BE49-F238E27FC236}">
+                <a16:creationId xmlns:a16="http://schemas.microsoft.com/office/drawing/2014/main" id="{F10F6889-47FE-4B47-8283-F31BD3499FBA}"/>
+              </a:ext>
+            </a:extLst>
+          </p:cNvPr>
+          <p:cNvSpPr txBox="1"/>
+          <p:nvPr/>
+        </p:nvSpPr>
+        <p:spPr>
+          <a:xfrm>
+            <a:off x="6412302" y="5052060"/>
+            <a:ext cx="4139525" cy="369332"/>
+          </a:xfrm>
+          <a:prstGeom prst="rect">
+            <a:avLst/>
+          </a:prstGeom>
+          <a:noFill/>
+        </p:spPr>
+        <p:txBody>
+          <a:bodyPr wrap="square" rtlCol="0">
+            <a:spAutoFit/>
+          </a:bodyPr>
+          <a:lstStyle/>
+          <a:p>
+            <a:r>
+              <a:rPr lang="de-DE" dirty="0">
+                <a:latin typeface="Arial" panose="020B0604020202020204" pitchFamily="34" charset="0"/>
+                <a:cs typeface="Arial" panose="020B0604020202020204" pitchFamily="34" charset="0"/>
+              </a:rPr>
+              <a:t>TEXT</a:t>
+            </a:r>
+          </a:p>
+        </p:txBody>
+      </p:sp>
+      <p:sp>
+        <p:nvSpPr>
+          <p:cNvPr id="9" name="Foliennummernplatzhalter 8">
+            <a:extLst>
+              <a:ext uri="{FF2B5EF4-FFF2-40B4-BE49-F238E27FC236}">
+                <a16:creationId xmlns:a16="http://schemas.microsoft.com/office/drawing/2014/main" id="{52C362E0-8568-4D54-9762-607080E3D2B1}"/>
+              </a:ext>
+            </a:extLst>
+          </p:cNvPr>
+          <p:cNvSpPr>
+            <a:spLocks noGrp="1"/>
+          </p:cNvSpPr>
+          <p:nvPr>
+            <p:ph type="sldNum" sz="quarter" idx="4294967295"/>
+          </p:nvPr>
+        </p:nvSpPr>
+        <p:spPr>
+          <a:xfrm>
+            <a:off x="9843655" y="6424986"/>
+            <a:ext cx="1312025" cy="365125"/>
+          </a:xfrm>
+        </p:spPr>
+        <p:txBody>
+          <a:bodyPr/>
+          <a:lstStyle/>
+          <a:p>
+            <a:fld id="{489ECDB1-2E24-4918-B7B1-E72EEFEDE6FE}" type="slidenum">
+              <a:rPr lang="de-DE" smtClean="0"/>
+              <a:t>8</a:t>
+            </a:fld>
+            <a:endParaRPr lang="de-DE"/>
+          </a:p>
+        </p:txBody>
+      </p:sp>
+      <p:sp>
+        <p:nvSpPr>
+          <p:cNvPr id="14" name="Datumsplatzhalter 13">
+            <a:extLst>
+              <a:ext uri="{FF2B5EF4-FFF2-40B4-BE49-F238E27FC236}">
+                <a16:creationId xmlns:a16="http://schemas.microsoft.com/office/drawing/2014/main" id="{761AC343-442C-4C9F-BF7F-63805BC0AC9E}"/>
+              </a:ext>
+            </a:extLst>
+          </p:cNvPr>
+          <p:cNvSpPr>
+            <a:spLocks noGrp="1"/>
+          </p:cNvSpPr>
+          <p:nvPr>
+            <p:ph type="dt" sz="half" idx="4294967295"/>
+          </p:nvPr>
+        </p:nvSpPr>
+        <p:spPr>
+          <a:xfrm>
+            <a:off x="1093889" y="6424985"/>
+            <a:ext cx="2472271" cy="365125"/>
+          </a:xfrm>
+        </p:spPr>
+        <p:txBody>
+          <a:bodyPr/>
+          <a:lstStyle/>
+          <a:p>
+            <a:pPr algn="l"/>
+            <a:fld id="{34B7D4B0-4CCF-42E8-A263-A5B4D64906BC}" type="datetime1">
+              <a:rPr lang="de-DE" smtClean="0"/>
+              <a:t>13.10.2021</a:t>
+            </a:fld>
+            <a:endParaRPr lang="de-DE" dirty="0"/>
+          </a:p>
+        </p:txBody>
+      </p:sp>
+      <p:sp>
+        <p:nvSpPr>
+          <p:cNvPr id="15" name="Fußzeilenplatzhalter 14">
+            <a:extLst>
+              <a:ext uri="{FF2B5EF4-FFF2-40B4-BE49-F238E27FC236}">
+                <a16:creationId xmlns:a16="http://schemas.microsoft.com/office/drawing/2014/main" id="{60081690-1DE9-489F-B409-AD438B1ABB2A}"/>
+              </a:ext>
+            </a:extLst>
+          </p:cNvPr>
+          <p:cNvSpPr>
+            <a:spLocks noGrp="1"/>
+          </p:cNvSpPr>
+          <p:nvPr>
+            <p:ph type="ftr" sz="quarter" idx="4294967295"/>
+          </p:nvPr>
+        </p:nvSpPr>
+        <p:spPr>
+          <a:xfrm>
+            <a:off x="3684598" y="6424985"/>
+            <a:ext cx="4822804" cy="365125"/>
+          </a:xfrm>
+        </p:spPr>
+        <p:txBody>
+          <a:bodyPr/>
+          <a:lstStyle/>
+          <a:p>
+            <a:r>
+              <a:rPr lang="de-DE"/>
+              <a:t>Moritz Flüchter: TSN Inter-Domain Communication</a:t>
+            </a:r>
+          </a:p>
+        </p:txBody>
+      </p:sp>
+    </p:spTree>
+    <p:extLst>
+      <p:ext uri="{BB962C8B-B14F-4D97-AF65-F5344CB8AC3E}">
+        <p14:creationId xmlns:p14="http://schemas.microsoft.com/office/powerpoint/2010/main" val="2789178426"/>
+      </p:ext>
+    </p:extLst>
+  </p:cSld>
+  <p:clrMapOvr>
+    <a:masterClrMapping/>
+  </p:clrMapOvr>
+</p:sld>
+</file>
+
+<file path=ppt/slides/slide9.xml><?xml version="1.0" encoding="utf-8"?>
+<p:sld xmlns:a="http://schemas.openxmlformats.org/drawingml/2006/main" xmlns:r="http://schemas.openxmlformats.org/officeDocument/2006/relationships" xmlns:p="http://schemas.openxmlformats.org/presentationml/2006/main">
+  <p:cSld>
+    <p:spTree>
+      <p:nvGrpSpPr>
+        <p:cNvPr id="1" name=""/>
+        <p:cNvGrpSpPr/>
+        <p:nvPr/>
+      </p:nvGrpSpPr>
+      <p:grpSpPr>
+        <a:xfrm>
+          <a:off x="0" y="0"/>
+          <a:ext cx="0" cy="0"/>
+          <a:chOff x="0" y="0"/>
+          <a:chExt cx="0" cy="0"/>
+        </a:xfrm>
+      </p:grpSpPr>
+      <p:sp>
+        <p:nvSpPr>
+          <p:cNvPr id="2" name="Titel 1">
+            <a:extLst>
+              <a:ext uri="{FF2B5EF4-FFF2-40B4-BE49-F238E27FC236}">
+                <a16:creationId xmlns:a16="http://schemas.microsoft.com/office/drawing/2014/main" id="{F6E41F0A-2E2D-4FC5-9F43-4600FAEFA395}"/>
+              </a:ext>
+            </a:extLst>
+          </p:cNvPr>
+          <p:cNvSpPr>
+            <a:spLocks noGrp="1"/>
+          </p:cNvSpPr>
+          <p:nvPr>
+            <p:ph type="title"/>
+          </p:nvPr>
+        </p:nvSpPr>
+        <p:spPr/>
+        <p:txBody>
+          <a:bodyPr/>
+          <a:lstStyle/>
+          <a:p>
+            <a:r>
+              <a:rPr lang="de-DE" dirty="0"/>
+              <a:t>TEXT + IMAGE</a:t>
+            </a:r>
+          </a:p>
+        </p:txBody>
+      </p:sp>
+      <p:sp>
+        <p:nvSpPr>
+          <p:cNvPr id="3" name="Inhaltsplatzhalter 2">
+            <a:extLst>
+              <a:ext uri="{FF2B5EF4-FFF2-40B4-BE49-F238E27FC236}">
+                <a16:creationId xmlns:a16="http://schemas.microsoft.com/office/drawing/2014/main" id="{EAC75DC9-155E-4132-B159-673C386F5A43}"/>
+              </a:ext>
+            </a:extLst>
+          </p:cNvPr>
+          <p:cNvSpPr>
+            <a:spLocks noGrp="1"/>
+          </p:cNvSpPr>
+          <p:nvPr>
+            <p:ph idx="1"/>
+          </p:nvPr>
+        </p:nvSpPr>
+        <p:spPr>
+          <a:xfrm>
+            <a:off x="1097279" y="1845734"/>
+            <a:ext cx="5455843" cy="4023360"/>
+          </a:xfrm>
+        </p:spPr>
+        <p:txBody>
+          <a:bodyPr/>
+          <a:lstStyle/>
+          <a:p>
+            <a:pPr>
+              <a:buFont typeface="Arial" panose="020B0604020202020204" pitchFamily="34" charset="0"/>
+              <a:buChar char="•"/>
+            </a:pPr>
+            <a:r>
+              <a:rPr lang="de-DE" dirty="0"/>
+              <a:t>TEXT</a:t>
+            </a:r>
+          </a:p>
+        </p:txBody>
+      </p:sp>
+      <p:sp>
+        <p:nvSpPr>
+          <p:cNvPr id="4" name="Datumsplatzhalter 3">
+            <a:extLst>
+              <a:ext uri="{FF2B5EF4-FFF2-40B4-BE49-F238E27FC236}">
+                <a16:creationId xmlns:a16="http://schemas.microsoft.com/office/drawing/2014/main" id="{C463F406-173E-488D-A788-00333B5AE97E}"/>
+              </a:ext>
+            </a:extLst>
+          </p:cNvPr>
+          <p:cNvSpPr>
+            <a:spLocks noGrp="1"/>
+          </p:cNvSpPr>
+          <p:nvPr>
+            <p:ph type="dt" sz="half" idx="10"/>
+          </p:nvPr>
+        </p:nvSpPr>
+        <p:spPr/>
+        <p:txBody>
+          <a:bodyPr/>
+          <a:lstStyle/>
+          <a:p>
+            <a:fld id="{7778186D-7CAD-425C-A5EB-B223AE6329F4}" type="datetime1">
+              <a:rPr lang="de-DE" smtClean="0"/>
+              <a:t>13.10.2021</a:t>
+            </a:fld>
+            <a:endParaRPr lang="de-DE" dirty="0"/>
+          </a:p>
+        </p:txBody>
+      </p:sp>
+      <p:sp>
+        <p:nvSpPr>
+          <p:cNvPr id="5" name="Fußzeilenplatzhalter 4">
+            <a:extLst>
+              <a:ext uri="{FF2B5EF4-FFF2-40B4-BE49-F238E27FC236}">
+                <a16:creationId xmlns:a16="http://schemas.microsoft.com/office/drawing/2014/main" id="{F6590142-F7C8-4816-BA0F-F63B394887CE}"/>
+              </a:ext>
+            </a:extLst>
+          </p:cNvPr>
+          <p:cNvSpPr>
+            <a:spLocks noGrp="1"/>
+          </p:cNvSpPr>
+          <p:nvPr>
+            <p:ph type="ftr" sz="quarter" idx="11"/>
+          </p:nvPr>
+        </p:nvSpPr>
+        <p:spPr/>
+        <p:txBody>
+          <a:bodyPr/>
+          <a:lstStyle/>
+          <a:p>
+            <a:r>
+              <a:rPr lang="de-DE" dirty="0"/>
+              <a:t>Moritz Flüchter: TSN Inter-Domain Communication</a:t>
+            </a:r>
+          </a:p>
+        </p:txBody>
+      </p:sp>
+      <p:sp>
+        <p:nvSpPr>
+          <p:cNvPr id="6" name="Foliennummernplatzhalter 5">
+            <a:extLst>
+              <a:ext uri="{FF2B5EF4-FFF2-40B4-BE49-F238E27FC236}">
+                <a16:creationId xmlns:a16="http://schemas.microsoft.com/office/drawing/2014/main" id="{7E703547-174F-44ED-AE14-A037549BC75F}"/>
+              </a:ext>
+            </a:extLst>
+          </p:cNvPr>
+          <p:cNvSpPr>
+            <a:spLocks noGrp="1"/>
+          </p:cNvSpPr>
+          <p:nvPr>
+            <p:ph type="sldNum" sz="quarter" idx="12"/>
+          </p:nvPr>
+        </p:nvSpPr>
+        <p:spPr/>
+        <p:txBody>
+          <a:bodyPr/>
+          <a:lstStyle/>
+          <a:p>
+            <a:fld id="{489ECDB1-2E24-4918-B7B1-E72EEFEDE6FE}" type="slidenum">
+              <a:rPr lang="de-DE" smtClean="0"/>
+              <a:t>9</a:t>
+            </a:fld>
+            <a:endParaRPr lang="de-DE" dirty="0"/>
+          </a:p>
+        </p:txBody>
+      </p:sp>
+      <p:sp>
+        <p:nvSpPr>
+          <p:cNvPr id="9" name="Textplatzhalter 2">
+            <a:extLst>
+              <a:ext uri="{FF2B5EF4-FFF2-40B4-BE49-F238E27FC236}">
+                <a16:creationId xmlns:a16="http://schemas.microsoft.com/office/drawing/2014/main" id="{2BBB3040-5284-4B4F-A563-7C876497D4D0}"/>
+              </a:ext>
+            </a:extLst>
+          </p:cNvPr>
+          <p:cNvSpPr txBox="1">
+            <a:spLocks/>
+          </p:cNvSpPr>
+          <p:nvPr/>
+        </p:nvSpPr>
+        <p:spPr>
+          <a:xfrm>
+            <a:off x="1008638" y="1293840"/>
+            <a:ext cx="9847621" cy="736282"/>
+          </a:xfrm>
+          <a:prstGeom prst="rect">
+            <a:avLst/>
+          </a:prstGeom>
+        </p:spPr>
+        <p:txBody>
+          <a:bodyPr vert="horz" lIns="91440" tIns="45720" rIns="91440" bIns="45720" rtlCol="0" anchor="ctr">
+            <a:normAutofit/>
+          </a:bodyPr>
+          <a:lstStyle>
+            <a:lvl1pPr marL="0" indent="0" algn="l" defTabSz="914400" rtl="0" eaLnBrk="1" latinLnBrk="0" hangingPunct="1">
+              <a:lnSpc>
+                <a:spcPct val="90000"/>
+              </a:lnSpc>
+              <a:spcBef>
+                <a:spcPts val="1200"/>
+              </a:spcBef>
+              <a:spcAft>
+                <a:spcPts val="200"/>
+              </a:spcAft>
+              <a:buClr>
+                <a:schemeClr val="accent1"/>
+              </a:buClr>
+              <a:buSzPct val="100000"/>
+              <a:buFont typeface="Calibri" panose="020F0502020204030204" pitchFamily="34" charset="0"/>
+              <a:buNone/>
+              <a:defRPr sz="2000" b="0" kern="1200" cap="all" baseline="0">
+                <a:solidFill>
+                  <a:schemeClr val="tx2"/>
+                </a:solidFill>
+                <a:latin typeface="Arial" panose="020B0604020202020204" pitchFamily="34" charset="0"/>
+                <a:ea typeface="+mn-ea"/>
+                <a:cs typeface="Arial" panose="020B0604020202020204" pitchFamily="34" charset="0"/>
+              </a:defRPr>
+            </a:lvl1pPr>
+            <a:lvl2pPr marL="457200" indent="0" algn="l" defTabSz="914400" rtl="0" eaLnBrk="1" latinLnBrk="0" hangingPunct="1">
+              <a:lnSpc>
+                <a:spcPct val="90000"/>
+              </a:lnSpc>
+              <a:spcBef>
+                <a:spcPts val="200"/>
+              </a:spcBef>
+              <a:spcAft>
+                <a:spcPts val="400"/>
+              </a:spcAft>
+              <a:buClr>
+                <a:schemeClr val="accent1"/>
+              </a:buClr>
+              <a:buFont typeface="Calibri" pitchFamily="34" charset="0"/>
+              <a:buNone/>
+              <a:defRPr sz="2000" b="1" kern="1200">
+                <a:solidFill>
+                  <a:schemeClr val="tx1">
+                    <a:lumMod val="75000"/>
+                    <a:lumOff val="25000"/>
+                  </a:schemeClr>
+                </a:solidFill>
+                <a:latin typeface="Arial" panose="020B0604020202020204" pitchFamily="34" charset="0"/>
+                <a:ea typeface="+mn-ea"/>
+                <a:cs typeface="Arial" panose="020B0604020202020204" pitchFamily="34" charset="0"/>
+              </a:defRPr>
+            </a:lvl2pPr>
+            <a:lvl3pPr marL="914400" indent="0" algn="l" defTabSz="914400" rtl="0" eaLnBrk="1" latinLnBrk="0" hangingPunct="1">
+              <a:lnSpc>
+                <a:spcPct val="90000"/>
+              </a:lnSpc>
+              <a:spcBef>
+                <a:spcPts val="200"/>
+              </a:spcBef>
+              <a:spcAft>
+                <a:spcPts val="400"/>
+              </a:spcAft>
+              <a:buClr>
+                <a:schemeClr val="accent1"/>
+              </a:buClr>
+              <a:buFont typeface="Calibri" pitchFamily="34" charset="0"/>
+              <a:buNone/>
+              <a:defRPr sz="1800" b="1" kern="1200">
+                <a:solidFill>
+                  <a:schemeClr val="tx1">
+                    <a:lumMod val="75000"/>
+                    <a:lumOff val="25000"/>
+                  </a:schemeClr>
+                </a:solidFill>
+                <a:latin typeface="Arial" panose="020B0604020202020204" pitchFamily="34" charset="0"/>
+                <a:ea typeface="+mn-ea"/>
+                <a:cs typeface="Arial" panose="020B0604020202020204" pitchFamily="34" charset="0"/>
+              </a:defRPr>
+            </a:lvl3pPr>
+            <a:lvl4pPr marL="1371600" indent="0" algn="l" defTabSz="914400" rtl="0" eaLnBrk="1" latinLnBrk="0" hangingPunct="1">
+              <a:lnSpc>
+                <a:spcPct val="90000"/>
+              </a:lnSpc>
+              <a:spcBef>
+                <a:spcPts val="200"/>
+              </a:spcBef>
+              <a:spcAft>
+                <a:spcPts val="400"/>
+              </a:spcAft>
+              <a:buClr>
+                <a:schemeClr val="accent1"/>
+              </a:buClr>
+              <a:buFont typeface="Calibri" pitchFamily="34" charset="0"/>
+              <a:buNone/>
+              <a:defRPr sz="1600" b="1" kern="1200">
+                <a:solidFill>
+                  <a:schemeClr val="tx1">
+                    <a:lumMod val="75000"/>
+                    <a:lumOff val="25000"/>
+                  </a:schemeClr>
+                </a:solidFill>
+                <a:latin typeface="Arial" panose="020B0604020202020204" pitchFamily="34" charset="0"/>
+                <a:ea typeface="+mn-ea"/>
+                <a:cs typeface="Arial" panose="020B0604020202020204" pitchFamily="34" charset="0"/>
+              </a:defRPr>
+            </a:lvl4pPr>
+            <a:lvl5pPr marL="1828800" indent="0" algn="l" defTabSz="914400" rtl="0" eaLnBrk="1" latinLnBrk="0" hangingPunct="1">
+              <a:lnSpc>
+                <a:spcPct val="90000"/>
+              </a:lnSpc>
+              <a:spcBef>
+                <a:spcPts val="200"/>
+              </a:spcBef>
+              <a:spcAft>
+                <a:spcPts val="400"/>
+              </a:spcAft>
+              <a:buClr>
+                <a:schemeClr val="accent1"/>
+              </a:buClr>
+              <a:buFont typeface="Calibri" pitchFamily="34" charset="0"/>
+              <a:buNone/>
+              <a:defRPr sz="1600" b="1" kern="1200">
+                <a:solidFill>
+                  <a:schemeClr val="tx1">
+                    <a:lumMod val="75000"/>
+                    <a:lumOff val="25000"/>
+                  </a:schemeClr>
+                </a:solidFill>
+                <a:latin typeface="Arial" panose="020B0604020202020204" pitchFamily="34" charset="0"/>
+                <a:ea typeface="+mn-ea"/>
+                <a:cs typeface="Arial" panose="020B0604020202020204" pitchFamily="34" charset="0"/>
+              </a:defRPr>
+            </a:lvl5pPr>
+            <a:lvl6pPr marL="2286000" indent="0" algn="l" defTabSz="914400" rtl="0" eaLnBrk="1" latinLnBrk="0" hangingPunct="1">
+              <a:lnSpc>
+                <a:spcPct val="90000"/>
+              </a:lnSpc>
+              <a:spcBef>
+                <a:spcPts val="200"/>
+              </a:spcBef>
+              <a:spcAft>
+                <a:spcPts val="400"/>
+              </a:spcAft>
+              <a:buClr>
+                <a:schemeClr val="accent1"/>
+              </a:buClr>
+              <a:buFont typeface="Calibri" pitchFamily="34" charset="0"/>
+              <a:buNone/>
+              <a:defRPr sz="1600" b="1" kern="1200">
+                <a:solidFill>
+                  <a:schemeClr val="tx1">
+                    <a:lumMod val="75000"/>
+                    <a:lumOff val="25000"/>
+                  </a:schemeClr>
+                </a:solidFill>
+                <a:latin typeface="+mn-lt"/>
+                <a:ea typeface="+mn-ea"/>
+                <a:cs typeface="+mn-cs"/>
+              </a:defRPr>
+            </a:lvl6pPr>
+            <a:lvl7pPr marL="2743200" indent="0" algn="l" defTabSz="914400" rtl="0" eaLnBrk="1" latinLnBrk="0" hangingPunct="1">
+              <a:lnSpc>
+                <a:spcPct val="90000"/>
+              </a:lnSpc>
+              <a:spcBef>
+                <a:spcPts val="200"/>
+              </a:spcBef>
+              <a:spcAft>
+                <a:spcPts val="400"/>
+              </a:spcAft>
+              <a:buClr>
+                <a:schemeClr val="accent1"/>
+              </a:buClr>
+              <a:buFont typeface="Calibri" pitchFamily="34" charset="0"/>
+              <a:buNone/>
+              <a:defRPr sz="1600" b="1" kern="1200">
+                <a:solidFill>
+                  <a:schemeClr val="tx1">
+                    <a:lumMod val="75000"/>
+                    <a:lumOff val="25000"/>
+                  </a:schemeClr>
+                </a:solidFill>
+                <a:latin typeface="+mn-lt"/>
+                <a:ea typeface="+mn-ea"/>
+                <a:cs typeface="+mn-cs"/>
+              </a:defRPr>
+            </a:lvl7pPr>
+            <a:lvl8pPr marL="3200400" indent="0" algn="l" defTabSz="914400" rtl="0" eaLnBrk="1" latinLnBrk="0" hangingPunct="1">
+              <a:lnSpc>
+                <a:spcPct val="90000"/>
+              </a:lnSpc>
+              <a:spcBef>
+                <a:spcPts val="200"/>
+              </a:spcBef>
+              <a:spcAft>
+                <a:spcPts val="400"/>
+              </a:spcAft>
+              <a:buClr>
+                <a:schemeClr val="accent1"/>
+              </a:buClr>
+              <a:buFont typeface="Calibri" pitchFamily="34" charset="0"/>
+              <a:buNone/>
+              <a:defRPr sz="1600" b="1" kern="1200">
+                <a:solidFill>
+                  <a:schemeClr val="tx1">
+                    <a:lumMod val="75000"/>
+                    <a:lumOff val="25000"/>
+                  </a:schemeClr>
+                </a:solidFill>
+                <a:latin typeface="+mn-lt"/>
+                <a:ea typeface="+mn-ea"/>
+                <a:cs typeface="+mn-cs"/>
+              </a:defRPr>
+            </a:lvl8pPr>
+            <a:lvl9pPr marL="3657600" indent="0" algn="l" defTabSz="914400" rtl="0" eaLnBrk="1" latinLnBrk="0" hangingPunct="1">
+              <a:lnSpc>
+                <a:spcPct val="90000"/>
+              </a:lnSpc>
+              <a:spcBef>
+                <a:spcPts val="200"/>
+              </a:spcBef>
+              <a:spcAft>
+                <a:spcPts val="400"/>
+              </a:spcAft>
+              <a:buClr>
+                <a:schemeClr val="accent1"/>
+              </a:buClr>
+              <a:buFont typeface="Calibri" pitchFamily="34" charset="0"/>
+              <a:buNone/>
+              <a:defRPr sz="1600" b="1" kern="1200">
+                <a:solidFill>
+                  <a:schemeClr val="tx1">
+                    <a:lumMod val="75000"/>
+                    <a:lumOff val="25000"/>
+                  </a:schemeClr>
+                </a:solidFill>
+                <a:latin typeface="+mn-lt"/>
+                <a:ea typeface="+mn-ea"/>
+                <a:cs typeface="+mn-cs"/>
+              </a:defRPr>
+            </a:lvl9pPr>
+          </a:lstStyle>
+          <a:p>
+            <a:r>
+              <a:rPr lang="de-DE" sz="1900" dirty="0"/>
+              <a:t>HEADING</a:t>
+            </a:r>
+          </a:p>
+        </p:txBody>
+      </p:sp>
+      <p:pic>
+        <p:nvPicPr>
+          <p:cNvPr id="8" name="Grafik 7">
+            <a:extLst>
+              <a:ext uri="{FF2B5EF4-FFF2-40B4-BE49-F238E27FC236}">
+                <a16:creationId xmlns:a16="http://schemas.microsoft.com/office/drawing/2014/main" id="{AA9627ED-B0C1-41E3-B29E-1572A5BF9650}"/>
+              </a:ext>
+            </a:extLst>
+          </p:cNvPr>
+          <p:cNvPicPr>
+            <a:picLocks noChangeAspect="1"/>
+          </p:cNvPicPr>
+          <p:nvPr/>
+        </p:nvPicPr>
+        <p:blipFill>
+          <a:blip r:embed="rId3"/>
+          <a:stretch>
+            <a:fillRect/>
+          </a:stretch>
+        </p:blipFill>
+        <p:spPr>
+          <a:xfrm>
+            <a:off x="6553122" y="2030122"/>
+            <a:ext cx="4541599" cy="4084321"/>
+          </a:xfrm>
+          <a:prstGeom prst="rect">
+            <a:avLst/>
+          </a:prstGeom>
+        </p:spPr>
+      </p:pic>
+    </p:spTree>
+    <p:extLst>
+      <p:ext uri="{BB962C8B-B14F-4D97-AF65-F5344CB8AC3E}">
+        <p14:creationId xmlns:p14="http://schemas.microsoft.com/office/powerpoint/2010/main" val="411711707"/>
       </p:ext>
     </p:extLst>
   </p:cSld>

</xml_diff>

<commit_message>
Added Best practices part
</commit_message>
<xml_diff>
--- a/Presentation/02 - First Steps.pptx
+++ b/Presentation/02 - First Steps.pptx
@@ -2523,7 +2523,7 @@
             </a:lvl1pPr>
           </a:lstStyle>
           <a:p>
-            <a:fld id="{D252E8F7-771C-44A4-BEBF-CC2E3470BEE3}" type="datetime1">
+            <a:fld id="{39BB9848-761F-4A65-A96B-3D2D7D9AD2E8}" type="datetime1">
               <a:rPr lang="de-DE" smtClean="0"/>
               <a:t>13.10.2021</a:t>
             </a:fld>
@@ -2556,7 +2556,7 @@
           <a:p>
             <a:r>
               <a:rPr lang="de-DE"/>
-              <a:t>Moritz Flüchter: TSN Inter-Domain Communication</a:t>
+              <a:t>Moritz Flüchter: Git - First Steps</a:t>
             </a:r>
             <a:endParaRPr lang="de-DE" dirty="0"/>
           </a:p>
@@ -2751,7 +2751,7 @@
           <a:bodyPr/>
           <a:lstStyle/>
           <a:p>
-            <a:fld id="{0E29679B-A22C-460F-97FA-D29310F4F9CA}" type="datetime1">
+            <a:fld id="{4CFAD2AC-0FA7-4220-A4BF-29DDCA8E21CB}" type="datetime1">
               <a:rPr lang="de-DE" smtClean="0"/>
               <a:t>13.10.2021</a:t>
             </a:fld>
@@ -2784,7 +2784,7 @@
           <a:p>
             <a:r>
               <a:rPr lang="de-DE"/>
-              <a:t>Moritz Flüchter: TSN Inter-Domain Communication</a:t>
+              <a:t>Moritz Flüchter: Git - First Steps</a:t>
             </a:r>
           </a:p>
         </p:txBody>
@@ -3026,7 +3026,7 @@
           <a:bodyPr/>
           <a:lstStyle/>
           <a:p>
-            <a:fld id="{BA071D2A-9FD6-4E1A-974F-D1F0E036738A}" type="datetime1">
+            <a:fld id="{21A1FE75-D502-4323-A1A4-074143C57E0E}" type="datetime1">
               <a:rPr lang="de-DE" smtClean="0"/>
               <a:t>13.10.2021</a:t>
             </a:fld>
@@ -3059,7 +3059,7 @@
           <a:p>
             <a:r>
               <a:rPr lang="de-DE"/>
-              <a:t>Moritz Flüchter: TSN Inter-Domain Communication</a:t>
+              <a:t>Moritz Flüchter: Git - First Steps</a:t>
             </a:r>
           </a:p>
         </p:txBody>
@@ -3223,7 +3223,7 @@
             </a:lvl1pPr>
           </a:lstStyle>
           <a:p>
-            <a:fld id="{7778186D-7CAD-425C-A5EB-B223AE6329F4}" type="datetime1">
+            <a:fld id="{694BDC86-65EA-4072-B5D0-F7D748BE147B}" type="datetime1">
               <a:rPr lang="de-DE" smtClean="0"/>
               <a:t>13.10.2021</a:t>
             </a:fld>
@@ -3260,7 +3260,7 @@
           <a:p>
             <a:r>
               <a:rPr lang="de-DE"/>
-              <a:t>Moritz Flüchter: TSN Inter-Domain Communication</a:t>
+              <a:t>Moritz Flüchter: Git - First Steps</a:t>
             </a:r>
           </a:p>
         </p:txBody>
@@ -3660,7 +3660,7 @@
             </a:lvl1pPr>
           </a:lstStyle>
           <a:p>
-            <a:fld id="{431330C1-C74B-49E7-BFEE-CFFFDCD11AC1}" type="datetime1">
+            <a:fld id="{A5CC409C-3CFC-450A-8C7C-71F415A3E3A0}" type="datetime1">
               <a:rPr lang="de-DE" smtClean="0"/>
               <a:t>13.10.2021</a:t>
             </a:fld>
@@ -3699,7 +3699,7 @@
           <a:p>
             <a:r>
               <a:rPr lang="de-DE"/>
-              <a:t>Moritz Flüchter: TSN Inter-Domain Communication</a:t>
+              <a:t>Moritz Flüchter: Git - First Steps</a:t>
             </a:r>
             <a:endParaRPr lang="de-DE" dirty="0"/>
           </a:p>
@@ -4295,7 +4295,7 @@
           <a:bodyPr/>
           <a:lstStyle/>
           <a:p>
-            <a:fld id="{B5379164-64D3-4DBF-A35A-0193A17390D6}" type="datetime1">
+            <a:fld id="{24A61D8C-B988-4FF5-85EF-FDE57E5ABD11}" type="datetime1">
               <a:rPr lang="de-DE" smtClean="0"/>
               <a:t>13.10.2021</a:t>
             </a:fld>
@@ -4328,7 +4328,7 @@
           <a:p>
             <a:r>
               <a:rPr lang="de-DE"/>
-              <a:t>Moritz Flüchter: TSN Inter-Domain Communication</a:t>
+              <a:t>Moritz Flüchter: Git - First Steps</a:t>
             </a:r>
           </a:p>
         </p:txBody>
@@ -4485,7 +4485,7 @@
           <a:bodyPr/>
           <a:lstStyle/>
           <a:p>
-            <a:fld id="{CE1B32AF-E997-41D3-9EB7-CBF2DBF5A72B}" type="datetime1">
+            <a:fld id="{8D4C4486-B418-4A65-8E08-10DA38289F1A}" type="datetime1">
               <a:rPr lang="de-DE" smtClean="0"/>
               <a:t>13.10.2021</a:t>
             </a:fld>
@@ -4526,7 +4526,7 @@
           <a:p>
             <a:r>
               <a:rPr lang="de-DE"/>
-              <a:t>Moritz Flüchter: TSN Inter-Domain Communication</a:t>
+              <a:t>Moritz Flüchter: Git - First Steps</a:t>
             </a:r>
           </a:p>
         </p:txBody>
@@ -4853,7 +4853,7 @@
             </a:lvl1pPr>
           </a:lstStyle>
           <a:p>
-            <a:fld id="{F3EF3E2E-44DA-428A-849A-0C00F4B856E5}" type="datetime1">
+            <a:fld id="{BE3DBD09-A031-4328-8DE9-11B1F1A05866}" type="datetime1">
               <a:rPr lang="de-DE" smtClean="0"/>
               <a:t>13.10.2021</a:t>
             </a:fld>
@@ -4894,7 +4894,7 @@
           <a:p>
             <a:r>
               <a:rPr lang="de-DE"/>
-              <a:t>Moritz Flüchter: TSN Inter-Domain Communication</a:t>
+              <a:t>Moritz Flüchter: Git - First Steps</a:t>
             </a:r>
           </a:p>
         </p:txBody>
@@ -5249,7 +5249,7 @@
           <a:bodyPr/>
           <a:lstStyle/>
           <a:p>
-            <a:fld id="{A8F5AFF9-D60D-4BF2-893C-19D3B6C1F40C}" type="datetime1">
+            <a:fld id="{9732FD36-B69E-4C7F-ADFA-270B36C0DDD5}" type="datetime1">
               <a:rPr lang="de-DE" smtClean="0"/>
               <a:t>13.10.2021</a:t>
             </a:fld>
@@ -5282,7 +5282,7 @@
           <a:p>
             <a:r>
               <a:rPr lang="de-DE"/>
-              <a:t>Moritz Flüchter: TSN Inter-Domain Communication</a:t>
+              <a:t>Moritz Flüchter: Git - First Steps</a:t>
             </a:r>
           </a:p>
         </p:txBody>
@@ -5584,7 +5584,7 @@
             </a:lvl1pPr>
           </a:lstStyle>
           <a:p>
-            <a:fld id="{3662B911-C7FF-498F-8649-7D98DE155FD2}" type="datetime1">
+            <a:fld id="{30E146F7-DC87-4E3F-8192-62C9645FD12C}" type="datetime1">
               <a:rPr lang="de-DE" smtClean="0"/>
               <a:t>13.10.2021</a:t>
             </a:fld>
@@ -5627,7 +5627,7 @@
           <a:p>
             <a:r>
               <a:rPr lang="de-DE"/>
-              <a:t>Moritz Flüchter: TSN Inter-Domain Communication</a:t>
+              <a:t>Moritz Flüchter: Git - First Steps</a:t>
             </a:r>
             <a:endParaRPr lang="de-DE" dirty="0"/>
           </a:p>
@@ -6199,7 +6199,7 @@
           <a:bodyPr/>
           <a:lstStyle/>
           <a:p>
-            <a:fld id="{7778186D-7CAD-425C-A5EB-B223AE6329F4}" type="datetime1">
+            <a:fld id="{337324AF-622D-4B17-812C-E6F1D8E80C5F}" type="datetime1">
               <a:rPr lang="de-DE" smtClean="0"/>
               <a:t>13.10.2021</a:t>
             </a:fld>
@@ -6229,9 +6229,10 @@
           <a:lstStyle/>
           <a:p>
             <a:r>
-              <a:rPr lang="de-DE" dirty="0"/>
-              <a:t>Moritz Flüchter: TSN Inter-Domain Communication</a:t>
-            </a:r>
+              <a:rPr lang="de-DE"/>
+              <a:t>Moritz Flüchter: Git - First Steps</a:t>
+            </a:r>
+            <a:endParaRPr lang="de-DE" dirty="0"/>
           </a:p>
         </p:txBody>
       </p:sp>
@@ -6973,7 +6974,7 @@
           <a:bodyPr/>
           <a:lstStyle/>
           <a:p>
-            <a:fld id="{7778186D-7CAD-425C-A5EB-B223AE6329F4}" type="datetime1">
+            <a:fld id="{3C6561FF-752E-4C2A-BA21-81E37A25D72B}" type="datetime1">
               <a:rPr lang="de-DE" smtClean="0"/>
               <a:t>13.10.2021</a:t>
             </a:fld>
@@ -7003,9 +7004,10 @@
           <a:lstStyle/>
           <a:p>
             <a:r>
-              <a:rPr lang="de-DE" dirty="0"/>
-              <a:t>Moritz Flüchter: TSN Inter-Domain Communication</a:t>
-            </a:r>
+              <a:rPr lang="de-DE"/>
+              <a:t>Moritz Flüchter: Git - First Steps</a:t>
+            </a:r>
+            <a:endParaRPr lang="de-DE" dirty="0"/>
           </a:p>
         </p:txBody>
       </p:sp>
@@ -7321,7 +7323,7 @@
           <a:bodyPr/>
           <a:lstStyle/>
           <a:p>
-            <a:fld id="{7778186D-7CAD-425C-A5EB-B223AE6329F4}" type="datetime1">
+            <a:fld id="{23F24410-F929-4EDF-8296-66D8F439899A}" type="datetime1">
               <a:rPr lang="de-DE" smtClean="0"/>
               <a:t>13.10.2021</a:t>
             </a:fld>
@@ -7351,9 +7353,10 @@
           <a:lstStyle/>
           <a:p>
             <a:r>
-              <a:rPr lang="de-DE" dirty="0"/>
-              <a:t>Moritz Flüchter: TSN Inter-Domain Communication</a:t>
-            </a:r>
+              <a:rPr lang="de-DE"/>
+              <a:t>Moritz Flüchter: Git - First Steps</a:t>
+            </a:r>
+            <a:endParaRPr lang="de-DE" dirty="0"/>
           </a:p>
         </p:txBody>
       </p:sp>
@@ -7661,7 +7664,7 @@
           <a:bodyPr/>
           <a:lstStyle/>
           <a:p>
-            <a:fld id="{7778186D-7CAD-425C-A5EB-B223AE6329F4}" type="datetime1">
+            <a:fld id="{7C064261-5C55-426C-8993-6B91932C395B}" type="datetime1">
               <a:rPr lang="de-DE" smtClean="0"/>
               <a:t>13.10.2021</a:t>
             </a:fld>
@@ -7691,9 +7694,10 @@
           <a:lstStyle/>
           <a:p>
             <a:r>
-              <a:rPr lang="de-DE" dirty="0"/>
-              <a:t>Moritz Flüchter: TSN Inter-Domain Communication</a:t>
-            </a:r>
+              <a:rPr lang="de-DE"/>
+              <a:t>Moritz Flüchter: Git - First Steps</a:t>
+            </a:r>
+            <a:endParaRPr lang="de-DE" dirty="0"/>
           </a:p>
         </p:txBody>
       </p:sp>
@@ -8009,7 +8013,7 @@
           <a:bodyPr/>
           <a:lstStyle/>
           <a:p>
-            <a:fld id="{7778186D-7CAD-425C-A5EB-B223AE6329F4}" type="datetime1">
+            <a:fld id="{68351400-0A03-42B6-AA94-479B90904879}" type="datetime1">
               <a:rPr lang="de-DE" smtClean="0"/>
               <a:t>13.10.2021</a:t>
             </a:fld>
@@ -8039,9 +8043,10 @@
           <a:lstStyle/>
           <a:p>
             <a:r>
-              <a:rPr lang="de-DE" dirty="0"/>
-              <a:t>Moritz Flüchter: TSN Inter-Domain Communication</a:t>
-            </a:r>
+              <a:rPr lang="de-DE"/>
+              <a:t>Moritz Flüchter: Git - First Steps</a:t>
+            </a:r>
+            <a:endParaRPr lang="de-DE" dirty="0"/>
           </a:p>
         </p:txBody>
       </p:sp>
@@ -8988,7 +8993,7 @@
           <a:bodyPr/>
           <a:lstStyle/>
           <a:p>
-            <a:fld id="{7778186D-7CAD-425C-A5EB-B223AE6329F4}" type="datetime1">
+            <a:fld id="{2DABFA76-413A-4719-BAC9-5618241CFC26}" type="datetime1">
               <a:rPr lang="de-DE" smtClean="0"/>
               <a:t>13.10.2021</a:t>
             </a:fld>
@@ -9018,9 +9023,10 @@
           <a:lstStyle/>
           <a:p>
             <a:r>
-              <a:rPr lang="de-DE" dirty="0"/>
-              <a:t>Moritz Flüchter: TSN Inter-Domain Communication</a:t>
-            </a:r>
+              <a:rPr lang="de-DE"/>
+              <a:t>Moritz Flüchter: Git - First Steps</a:t>
+            </a:r>
+            <a:endParaRPr lang="de-DE" dirty="0"/>
           </a:p>
         </p:txBody>
       </p:sp>
@@ -9911,7 +9917,7 @@
           <a:bodyPr/>
           <a:lstStyle/>
           <a:p>
-            <a:fld id="{7778186D-7CAD-425C-A5EB-B223AE6329F4}" type="datetime1">
+            <a:fld id="{7A59A926-791C-4F6E-B816-91A1A0784AA8}" type="datetime1">
               <a:rPr lang="de-DE" smtClean="0"/>
               <a:t>13.10.2021</a:t>
             </a:fld>
@@ -9941,9 +9947,10 @@
           <a:lstStyle/>
           <a:p>
             <a:r>
-              <a:rPr lang="de-DE" dirty="0"/>
-              <a:t>Moritz Flüchter: TSN Inter-Domain Communication</a:t>
-            </a:r>
+              <a:rPr lang="de-DE"/>
+              <a:t>Moritz Flüchter: Git - First Steps</a:t>
+            </a:r>
+            <a:endParaRPr lang="de-DE" dirty="0"/>
           </a:p>
         </p:txBody>
       </p:sp>
@@ -10788,7 +10795,7 @@
           <a:bodyPr/>
           <a:lstStyle/>
           <a:p>
-            <a:fld id="{7778186D-7CAD-425C-A5EB-B223AE6329F4}" type="datetime1">
+            <a:fld id="{B779B125-A703-4712-8429-68A91095AD88}" type="datetime1">
               <a:rPr lang="de-DE" smtClean="0"/>
               <a:t>13.10.2021</a:t>
             </a:fld>
@@ -10818,9 +10825,10 @@
           <a:lstStyle/>
           <a:p>
             <a:r>
-              <a:rPr lang="de-DE" dirty="0"/>
-              <a:t>Moritz Flüchter: TSN Inter-Domain Communication</a:t>
-            </a:r>
+              <a:rPr lang="de-DE"/>
+              <a:t>Moritz Flüchter: Git - First Steps</a:t>
+            </a:r>
+            <a:endParaRPr lang="de-DE" dirty="0"/>
           </a:p>
         </p:txBody>
       </p:sp>
@@ -11216,7 +11224,7 @@
           <a:bodyPr/>
           <a:lstStyle/>
           <a:p>
-            <a:fld id="{7778186D-7CAD-425C-A5EB-B223AE6329F4}" type="datetime1">
+            <a:fld id="{31C45B5A-31B5-4B8B-A381-BA99E3766967}" type="datetime1">
               <a:rPr lang="de-DE" smtClean="0"/>
               <a:t>13.10.2021</a:t>
             </a:fld>
@@ -11246,9 +11254,10 @@
           <a:lstStyle/>
           <a:p>
             <a:r>
-              <a:rPr lang="de-DE" dirty="0"/>
-              <a:t>Moritz Flüchter: TSN Inter-Domain Communication</a:t>
-            </a:r>
+              <a:rPr lang="de-DE"/>
+              <a:t>Moritz Flüchter: Git - First Steps</a:t>
+            </a:r>
+            <a:endParaRPr lang="de-DE" dirty="0"/>
           </a:p>
         </p:txBody>
       </p:sp>
@@ -11722,7 +11731,7 @@
           <a:bodyPr/>
           <a:lstStyle/>
           <a:p>
-            <a:fld id="{7778186D-7CAD-425C-A5EB-B223AE6329F4}" type="datetime1">
+            <a:fld id="{3B05E942-A66D-418D-8FFB-D731407A95F7}" type="datetime1">
               <a:rPr lang="de-DE" smtClean="0"/>
               <a:t>13.10.2021</a:t>
             </a:fld>
@@ -11752,9 +11761,10 @@
           <a:lstStyle/>
           <a:p>
             <a:r>
-              <a:rPr lang="de-DE" dirty="0"/>
-              <a:t>Moritz Flüchter: TSN Inter-Domain Communication</a:t>
-            </a:r>
+              <a:rPr lang="de-DE"/>
+              <a:t>Moritz Flüchter: Git - First Steps</a:t>
+            </a:r>
+            <a:endParaRPr lang="de-DE" dirty="0"/>
           </a:p>
         </p:txBody>
       </p:sp>
@@ -11954,7 +11964,7 @@
           <a:bodyPr/>
           <a:lstStyle/>
           <a:p>
-            <a:fld id="{7778186D-7CAD-425C-A5EB-B223AE6329F4}" type="datetime1">
+            <a:fld id="{BFB21593-FB71-4138-9BBA-DD3A6182CCE3}" type="datetime1">
               <a:rPr lang="de-DE" smtClean="0"/>
               <a:t>13.10.2021</a:t>
             </a:fld>
@@ -11984,9 +11994,10 @@
           <a:lstStyle/>
           <a:p>
             <a:r>
-              <a:rPr lang="de-DE" dirty="0"/>
-              <a:t>Moritz Flüchter: TSN Inter-Domain Communication</a:t>
-            </a:r>
+              <a:rPr lang="de-DE"/>
+              <a:t>Moritz Flüchter: Git - First Steps</a:t>
+            </a:r>
+            <a:endParaRPr lang="de-DE" dirty="0"/>
           </a:p>
         </p:txBody>
       </p:sp>
@@ -12245,7 +12256,7 @@
           <a:bodyPr/>
           <a:lstStyle/>
           <a:p>
-            <a:fld id="{7778186D-7CAD-425C-A5EB-B223AE6329F4}" type="datetime1">
+            <a:fld id="{C7B63C3F-C8DA-497A-AB4B-96461302BBFE}" type="datetime1">
               <a:rPr lang="de-DE" smtClean="0"/>
               <a:t>13.10.2021</a:t>
             </a:fld>
@@ -12275,9 +12286,10 @@
           <a:lstStyle/>
           <a:p>
             <a:r>
-              <a:rPr lang="de-DE" dirty="0"/>
-              <a:t>Moritz Flüchter: TSN Inter-Domain Communication</a:t>
-            </a:r>
+              <a:rPr lang="de-DE"/>
+              <a:t>Moritz Flüchter: Git - First Steps</a:t>
+            </a:r>
+            <a:endParaRPr lang="de-DE" dirty="0"/>
           </a:p>
         </p:txBody>
       </p:sp>
@@ -12444,7 +12456,7 @@
           <a:bodyPr/>
           <a:lstStyle/>
           <a:p>
-            <a:fld id="{7778186D-7CAD-425C-A5EB-B223AE6329F4}" type="datetime1">
+            <a:fld id="{2777BDCA-B0F3-49FF-8927-CF9058038D70}" type="datetime1">
               <a:rPr lang="de-DE" smtClean="0"/>
               <a:t>13.10.2021</a:t>
             </a:fld>
@@ -12474,9 +12486,10 @@
           <a:lstStyle/>
           <a:p>
             <a:r>
-              <a:rPr lang="de-DE" dirty="0"/>
-              <a:t>Moritz Flüchter: TSN Inter-Domain Communication</a:t>
-            </a:r>
+              <a:rPr lang="de-DE"/>
+              <a:t>Moritz Flüchter: Git - First Steps</a:t>
+            </a:r>
+            <a:endParaRPr lang="de-DE" dirty="0"/>
           </a:p>
         </p:txBody>
       </p:sp>
@@ -13083,7 +13096,7 @@
           <a:bodyPr/>
           <a:lstStyle/>
           <a:p>
-            <a:fld id="{7778186D-7CAD-425C-A5EB-B223AE6329F4}" type="datetime1">
+            <a:fld id="{3792F27E-4422-4BDA-9030-75902877635E}" type="datetime1">
               <a:rPr lang="de-DE" smtClean="0"/>
               <a:t>13.10.2021</a:t>
             </a:fld>
@@ -13113,9 +13126,10 @@
           <a:lstStyle/>
           <a:p>
             <a:r>
-              <a:rPr lang="de-DE" dirty="0"/>
-              <a:t>Moritz Flüchter: TSN Inter-Domain Communication</a:t>
-            </a:r>
+              <a:rPr lang="de-DE"/>
+              <a:t>Moritz Flüchter: Git - First Steps</a:t>
+            </a:r>
+            <a:endParaRPr lang="de-DE" dirty="0"/>
           </a:p>
         </p:txBody>
       </p:sp>
@@ -13425,7 +13439,7 @@
           <a:bodyPr/>
           <a:lstStyle/>
           <a:p>
-            <a:fld id="{7778186D-7CAD-425C-A5EB-B223AE6329F4}" type="datetime1">
+            <a:fld id="{7D263612-DDE3-4504-BF06-A02DA96E48AC}" type="datetime1">
               <a:rPr lang="de-DE" smtClean="0"/>
               <a:t>13.10.2021</a:t>
             </a:fld>
@@ -13455,9 +13469,10 @@
           <a:lstStyle/>
           <a:p>
             <a:r>
-              <a:rPr lang="de-DE" dirty="0"/>
-              <a:t>Moritz Flüchter: TSN Inter-Domain Communication</a:t>
-            </a:r>
+              <a:rPr lang="de-DE"/>
+              <a:t>Moritz Flüchter: Git - First Steps</a:t>
+            </a:r>
+            <a:endParaRPr lang="de-DE" dirty="0"/>
           </a:p>
         </p:txBody>
       </p:sp>

</xml_diff>